<commit_message>
MAJ 13/02/2018 Signed-off-by: DrBlaf <chauveau.aurelien.76@gmail.com>
</commit_message>
<xml_diff>
--- a/Rapport/Benjamin/RevueDeProjet.pptx
+++ b/Rapport/Benjamin/RevueDeProjet.pptx
@@ -20,6 +20,8 @@
     <p:sldId id="269" r:id="rId14"/>
     <p:sldId id="270" r:id="rId15"/>
     <p:sldId id="271" r:id="rId16"/>
+    <p:sldId id="273" r:id="rId17"/>
+    <p:sldId id="272" r:id="rId18"/>
   </p:sldIdLst>
   <p:sldSz cx="9144000" cy="5715000" type="screen16x10"/>
   <p:notesSz cx="6858000" cy="9144000"/>
@@ -506,7 +508,7 @@
             <a:fld id="{7385B5F2-299D-41E4-81B4-55AECBC730DC}" type="datetimeFigureOut">
               <a:rPr lang="fr-FR" smtClean="0"/>
               <a:pPr/>
-              <a:t>12/02/2018</a:t>
+              <a:t>13/02/2018</a:t>
             </a:fld>
             <a:endParaRPr lang="fr-FR"/>
           </a:p>
@@ -673,7 +675,7 @@
             <a:fld id="{7385B5F2-299D-41E4-81B4-55AECBC730DC}" type="datetimeFigureOut">
               <a:rPr lang="fr-FR" smtClean="0"/>
               <a:pPr/>
-              <a:t>12/02/2018</a:t>
+              <a:t>13/02/2018</a:t>
             </a:fld>
             <a:endParaRPr lang="fr-FR"/>
           </a:p>
@@ -850,7 +852,7 @@
             <a:fld id="{7385B5F2-299D-41E4-81B4-55AECBC730DC}" type="datetimeFigureOut">
               <a:rPr lang="fr-FR" smtClean="0"/>
               <a:pPr/>
-              <a:t>12/02/2018</a:t>
+              <a:t>13/02/2018</a:t>
             </a:fld>
             <a:endParaRPr lang="fr-FR"/>
           </a:p>
@@ -1021,7 +1023,7 @@
             <a:fld id="{7385B5F2-299D-41E4-81B4-55AECBC730DC}" type="datetimeFigureOut">
               <a:rPr lang="fr-FR" smtClean="0"/>
               <a:pPr/>
-              <a:t>12/02/2018</a:t>
+              <a:t>13/02/2018</a:t>
             </a:fld>
             <a:endParaRPr lang="fr-FR"/>
           </a:p>
@@ -1485,7 +1487,7 @@
             <a:fld id="{7385B5F2-299D-41E4-81B4-55AECBC730DC}" type="datetimeFigureOut">
               <a:rPr lang="fr-FR" smtClean="0"/>
               <a:pPr/>
-              <a:t>12/02/2018</a:t>
+              <a:t>13/02/2018</a:t>
             </a:fld>
             <a:endParaRPr lang="fr-FR"/>
           </a:p>
@@ -1751,7 +1753,7 @@
             <a:fld id="{7385B5F2-299D-41E4-81B4-55AECBC730DC}" type="datetimeFigureOut">
               <a:rPr lang="fr-FR" smtClean="0"/>
               <a:pPr/>
-              <a:t>12/02/2018</a:t>
+              <a:t>13/02/2018</a:t>
             </a:fld>
             <a:endParaRPr lang="fr-FR"/>
           </a:p>
@@ -2127,7 +2129,7 @@
             <a:fld id="{7385B5F2-299D-41E4-81B4-55AECBC730DC}" type="datetimeFigureOut">
               <a:rPr lang="fr-FR" smtClean="0"/>
               <a:pPr/>
-              <a:t>12/02/2018</a:t>
+              <a:t>13/02/2018</a:t>
             </a:fld>
             <a:endParaRPr lang="fr-FR"/>
           </a:p>
@@ -2251,7 +2253,7 @@
             <a:fld id="{7385B5F2-299D-41E4-81B4-55AECBC730DC}" type="datetimeFigureOut">
               <a:rPr lang="fr-FR" smtClean="0"/>
               <a:pPr/>
-              <a:t>12/02/2018</a:t>
+              <a:t>13/02/2018</a:t>
             </a:fld>
             <a:endParaRPr lang="fr-FR"/>
           </a:p>
@@ -2343,7 +2345,7 @@
             <a:fld id="{7385B5F2-299D-41E4-81B4-55AECBC730DC}" type="datetimeFigureOut">
               <a:rPr lang="fr-FR" smtClean="0"/>
               <a:pPr/>
-              <a:t>12/02/2018</a:t>
+              <a:t>13/02/2018</a:t>
             </a:fld>
             <a:endParaRPr lang="fr-FR"/>
           </a:p>
@@ -2594,7 +2596,7 @@
             <a:fld id="{7385B5F2-299D-41E4-81B4-55AECBC730DC}" type="datetimeFigureOut">
               <a:rPr lang="fr-FR" smtClean="0"/>
               <a:pPr/>
-              <a:t>12/02/2018</a:t>
+              <a:t>13/02/2018</a:t>
             </a:fld>
             <a:endParaRPr lang="fr-FR"/>
           </a:p>
@@ -2855,7 +2857,7 @@
             <a:fld id="{7385B5F2-299D-41E4-81B4-55AECBC730DC}" type="datetimeFigureOut">
               <a:rPr lang="fr-FR" smtClean="0"/>
               <a:pPr/>
-              <a:t>12/02/2018</a:t>
+              <a:t>13/02/2018</a:t>
             </a:fld>
             <a:endParaRPr lang="fr-FR"/>
           </a:p>
@@ -3261,7 +3263,7 @@
             <a:fld id="{7385B5F2-299D-41E4-81B4-55AECBC730DC}" type="datetimeFigureOut">
               <a:rPr lang="fr-FR" smtClean="0"/>
               <a:pPr/>
-              <a:t>12/02/2018</a:t>
+              <a:t>13/02/2018</a:t>
             </a:fld>
             <a:endParaRPr lang="fr-FR"/>
           </a:p>
@@ -4311,8 +4313,14 @@
                   </a:solidFill>
                 </a:ln>
               </a:rPr>
-              <a:t>)			impulsion du </a:t>
-            </a:r>
+              <a:t>)			impulsion du compteur</a:t>
+            </a:r>
+          </a:p>
+          <a:p>
+            <a:pPr>
+              <a:buFont typeface="Wingdings" pitchFamily="2" charset="2"/>
+              <a:buChar char="v"/>
+            </a:pPr>
             <a:r>
               <a:rPr lang="fr-FR" sz="2400" dirty="0" smtClean="0">
                 <a:ln>
@@ -4321,43 +4329,7 @@
                   </a:solidFill>
                 </a:ln>
               </a:rPr>
-              <a:t>compteur</a:t>
-            </a:r>
-          </a:p>
-          <a:p>
-            <a:pPr>
-              <a:buFont typeface="Wingdings" pitchFamily="2" charset="2"/>
-              <a:buChar char="v"/>
-            </a:pPr>
-            <a:r>
-              <a:rPr lang="fr-FR" sz="2400" dirty="0" smtClean="0">
-                <a:ln>
-                  <a:solidFill>
-                    <a:schemeClr val="bg2"/>
-                  </a:solidFill>
-                </a:ln>
-              </a:rPr>
-              <a:t>Dat(jour)			impulsion </a:t>
-            </a:r>
-            <a:r>
-              <a:rPr lang="fr-FR" sz="2400" dirty="0" smtClean="0">
-                <a:ln>
-                  <a:solidFill>
-                    <a:schemeClr val="bg2"/>
-                  </a:solidFill>
-                </a:ln>
-              </a:rPr>
-              <a:t>du </a:t>
-            </a:r>
-            <a:r>
-              <a:rPr lang="fr-FR" sz="2400" dirty="0" smtClean="0">
-                <a:ln>
-                  <a:solidFill>
-                    <a:schemeClr val="bg2"/>
-                  </a:solidFill>
-                </a:ln>
-              </a:rPr>
-              <a:t>compteur</a:t>
+              <a:t>Dat(jour)			impulsion du compteur</a:t>
             </a:r>
             <a:endParaRPr lang="fr-FR" dirty="0" smtClean="0">
               <a:ln>
@@ -4971,6 +4943,13 @@
   <p:clrMapOvr>
     <a:masterClrMapping/>
   </p:clrMapOvr>
+  <p:timing>
+    <p:tnLst>
+      <p:par>
+        <p:cTn id="1" dur="indefinite" restart="never" nodeType="tmRoot"/>
+      </p:par>
+    </p:tnLst>
+  </p:timing>
 </p:sld>
 </file>
 
@@ -5050,7 +5029,7 @@
       </p:pic>
       <p:pic>
         <p:nvPicPr>
-          <p:cNvPr id="26627" name="Picture 3"/>
+          <p:cNvPr id="26628" name="Picture 4" descr="Q:\Projet_Domotique_GITBTS\Materiels\Benjamin\CapteurMouv\schema.png"/>
           <p:cNvPicPr>
             <a:picLocks noChangeAspect="1" noChangeArrowheads="1"/>
           </p:cNvPicPr>
@@ -5065,8 +5044,72 @@
         </p:blipFill>
         <p:spPr bwMode="auto">
           <a:xfrm>
-            <a:off x="4357686" y="2786062"/>
-            <a:ext cx="3859083" cy="2214558"/>
+            <a:off x="571472" y="3500442"/>
+            <a:ext cx="3000396" cy="1494338"/>
+          </a:xfrm>
+          <a:prstGeom prst="rect">
+            <a:avLst/>
+          </a:prstGeom>
+          <a:noFill/>
+          <a:ln>
+            <a:solidFill>
+              <a:schemeClr val="accent6">
+                <a:lumMod val="60000"/>
+                <a:lumOff val="40000"/>
+              </a:schemeClr>
+            </a:solidFill>
+          </a:ln>
+        </p:spPr>
+      </p:pic>
+      <p:sp>
+        <p:nvSpPr>
+          <p:cNvPr id="7" name="ZoneTexte 6"/>
+          <p:cNvSpPr txBox="1"/>
+          <p:nvPr/>
+        </p:nvSpPr>
+        <p:spPr>
+          <a:xfrm>
+            <a:off x="642910" y="1214426"/>
+            <a:ext cx="2903359" cy="369332"/>
+          </a:xfrm>
+          <a:prstGeom prst="rect">
+            <a:avLst/>
+          </a:prstGeom>
+          <a:noFill/>
+        </p:spPr>
+        <p:txBody>
+          <a:bodyPr wrap="none" rtlCol="0">
+            <a:spAutoFit/>
+          </a:bodyPr>
+          <a:lstStyle/>
+          <a:p>
+            <a:r>
+              <a:rPr lang="fr-FR" dirty="0" smtClean="0"/>
+              <a:t>Détecteur de mouvement :</a:t>
+            </a:r>
+            <a:endParaRPr lang="fr-FR" dirty="0"/>
+          </a:p>
+        </p:txBody>
+      </p:sp>
+      <p:pic>
+        <p:nvPicPr>
+          <p:cNvPr id="2050" name="Picture 2"/>
+          <p:cNvPicPr>
+            <a:picLocks noChangeAspect="1" noChangeArrowheads="1"/>
+          </p:cNvPicPr>
+          <p:nvPr/>
+        </p:nvPicPr>
+        <p:blipFill>
+          <a:blip r:embed="rId4"/>
+          <a:srcRect/>
+          <a:stretch>
+            <a:fillRect/>
+          </a:stretch>
+        </p:blipFill>
+        <p:spPr bwMode="auto">
+          <a:xfrm>
+            <a:off x="5072066" y="2143120"/>
+            <a:ext cx="2071702" cy="2610235"/>
           </a:xfrm>
           <a:prstGeom prst="rect">
             <a:avLst/>
@@ -5086,75 +5129,18 @@
           <a:effectLst/>
         </p:spPr>
       </p:pic>
-      <p:pic>
-        <p:nvPicPr>
-          <p:cNvPr id="26628" name="Picture 4" descr="Q:\Projet_Domotique_GITBTS\Materiels\Benjamin\CapteurMouv\schema.png"/>
-          <p:cNvPicPr>
-            <a:picLocks noChangeAspect="1" noChangeArrowheads="1"/>
-          </p:cNvPicPr>
-          <p:nvPr/>
-        </p:nvPicPr>
-        <p:blipFill>
-          <a:blip r:embed="rId4"/>
-          <a:srcRect/>
-          <a:stretch>
-            <a:fillRect/>
-          </a:stretch>
-        </p:blipFill>
-        <p:spPr bwMode="auto">
-          <a:xfrm>
-            <a:off x="571472" y="3500442"/>
-            <a:ext cx="3000396" cy="1494338"/>
-          </a:xfrm>
-          <a:prstGeom prst="rect">
-            <a:avLst/>
-          </a:prstGeom>
-          <a:noFill/>
-          <a:ln>
-            <a:solidFill>
-              <a:schemeClr val="accent6">
-                <a:lumMod val="60000"/>
-                <a:lumOff val="40000"/>
-              </a:schemeClr>
-            </a:solidFill>
-          </a:ln>
-        </p:spPr>
-      </p:pic>
-      <p:sp>
-        <p:nvSpPr>
-          <p:cNvPr id="7" name="ZoneTexte 6"/>
-          <p:cNvSpPr txBox="1"/>
-          <p:nvPr/>
-        </p:nvSpPr>
-        <p:spPr>
-          <a:xfrm>
-            <a:off x="642910" y="1214426"/>
-            <a:ext cx="2903359" cy="369332"/>
-          </a:xfrm>
-          <a:prstGeom prst="rect">
-            <a:avLst/>
-          </a:prstGeom>
-          <a:noFill/>
-        </p:spPr>
-        <p:txBody>
-          <a:bodyPr wrap="none" rtlCol="0">
-            <a:spAutoFit/>
-          </a:bodyPr>
-          <a:lstStyle/>
-          <a:p>
-            <a:r>
-              <a:rPr lang="fr-FR" dirty="0" smtClean="0"/>
-              <a:t>Détecteur de mouvement :</a:t>
-            </a:r>
-            <a:endParaRPr lang="fr-FR" dirty="0"/>
-          </a:p>
-        </p:txBody>
-      </p:sp>
     </p:spTree>
   </p:cSld>
   <p:clrMapOvr>
     <a:masterClrMapping/>
   </p:clrMapOvr>
+  <p:timing>
+    <p:tnLst>
+      <p:par>
+        <p:cTn id="1" dur="indefinite" restart="never" nodeType="tmRoot"/>
+      </p:par>
+    </p:tnLst>
+  </p:timing>
 </p:sld>
 </file>
 
@@ -5233,11 +5219,563 @@
           </a:p>
         </p:txBody>
       </p:sp>
+      <p:pic>
+        <p:nvPicPr>
+          <p:cNvPr id="1028" name="Picture 4"/>
+          <p:cNvPicPr>
+            <a:picLocks noChangeAspect="1" noChangeArrowheads="1"/>
+          </p:cNvPicPr>
+          <p:nvPr/>
+        </p:nvPicPr>
+        <p:blipFill>
+          <a:blip r:embed="rId2"/>
+          <a:srcRect/>
+          <a:stretch>
+            <a:fillRect/>
+          </a:stretch>
+        </p:blipFill>
+        <p:spPr bwMode="auto">
+          <a:xfrm>
+            <a:off x="3286116" y="2786062"/>
+            <a:ext cx="2459215" cy="1014335"/>
+          </a:xfrm>
+          <a:prstGeom prst="rect">
+            <a:avLst/>
+          </a:prstGeom>
+          <a:noFill/>
+          <a:ln w="9525">
+            <a:solidFill>
+              <a:schemeClr val="accent6">
+                <a:lumMod val="60000"/>
+                <a:lumOff val="40000"/>
+              </a:schemeClr>
+            </a:solidFill>
+            <a:miter lim="800000"/>
+            <a:headEnd/>
+            <a:tailEnd/>
+          </a:ln>
+          <a:effectLst/>
+        </p:spPr>
+      </p:pic>
+      <p:pic>
+        <p:nvPicPr>
+          <p:cNvPr id="1030" name="Picture 6"/>
+          <p:cNvPicPr>
+            <a:picLocks noChangeAspect="1" noChangeArrowheads="1"/>
+          </p:cNvPicPr>
+          <p:nvPr/>
+        </p:nvPicPr>
+        <p:blipFill>
+          <a:blip r:embed="rId3" cstate="print"/>
+          <a:srcRect/>
+          <a:stretch>
+            <a:fillRect/>
+          </a:stretch>
+        </p:blipFill>
+        <p:spPr bwMode="auto">
+          <a:xfrm>
+            <a:off x="642910" y="1785930"/>
+            <a:ext cx="1457521" cy="2181203"/>
+          </a:xfrm>
+          <a:prstGeom prst="rect">
+            <a:avLst/>
+          </a:prstGeom>
+          <a:noFill/>
+          <a:ln w="9525">
+            <a:solidFill>
+              <a:schemeClr val="accent6">
+                <a:lumMod val="60000"/>
+                <a:lumOff val="40000"/>
+              </a:schemeClr>
+            </a:solidFill>
+            <a:miter lim="800000"/>
+            <a:headEnd/>
+            <a:tailEnd/>
+          </a:ln>
+          <a:effectLst/>
+        </p:spPr>
+      </p:pic>
+      <p:pic>
+        <p:nvPicPr>
+          <p:cNvPr id="1032" name="Picture 8"/>
+          <p:cNvPicPr>
+            <a:picLocks noChangeAspect="1" noChangeArrowheads="1"/>
+          </p:cNvPicPr>
+          <p:nvPr/>
+        </p:nvPicPr>
+        <p:blipFill>
+          <a:blip r:embed="rId4"/>
+          <a:srcRect/>
+          <a:stretch>
+            <a:fillRect/>
+          </a:stretch>
+        </p:blipFill>
+        <p:spPr bwMode="auto">
+          <a:xfrm>
+            <a:off x="1357290" y="4429136"/>
+            <a:ext cx="2933697" cy="1150553"/>
+          </a:xfrm>
+          <a:prstGeom prst="rect">
+            <a:avLst/>
+          </a:prstGeom>
+          <a:noFill/>
+          <a:ln w="9525">
+            <a:solidFill>
+              <a:schemeClr val="accent6">
+                <a:lumMod val="60000"/>
+                <a:lumOff val="40000"/>
+              </a:schemeClr>
+            </a:solidFill>
+            <a:miter lim="800000"/>
+            <a:headEnd/>
+            <a:tailEnd/>
+          </a:ln>
+          <a:effectLst/>
+        </p:spPr>
+      </p:pic>
+      <p:pic>
+        <p:nvPicPr>
+          <p:cNvPr id="1026" name="Picture 2"/>
+          <p:cNvPicPr>
+            <a:picLocks noChangeAspect="1" noChangeArrowheads="1"/>
+          </p:cNvPicPr>
+          <p:nvPr/>
+        </p:nvPicPr>
+        <p:blipFill>
+          <a:blip r:embed="rId5"/>
+          <a:srcRect/>
+          <a:stretch>
+            <a:fillRect/>
+          </a:stretch>
+        </p:blipFill>
+        <p:spPr bwMode="auto">
+          <a:xfrm>
+            <a:off x="6786578" y="2714624"/>
+            <a:ext cx="1643074" cy="2547000"/>
+          </a:xfrm>
+          <a:prstGeom prst="rect">
+            <a:avLst/>
+          </a:prstGeom>
+          <a:noFill/>
+          <a:ln w="9525">
+            <a:solidFill>
+              <a:schemeClr val="accent6">
+                <a:lumMod val="60000"/>
+                <a:lumOff val="40000"/>
+              </a:schemeClr>
+            </a:solidFill>
+            <a:miter lim="800000"/>
+            <a:headEnd/>
+            <a:tailEnd/>
+          </a:ln>
+          <a:effectLst/>
+        </p:spPr>
+      </p:pic>
     </p:spTree>
   </p:cSld>
   <p:clrMapOvr>
     <a:masterClrMapping/>
   </p:clrMapOvr>
+  <p:timing>
+    <p:tnLst>
+      <p:par>
+        <p:cTn id="1" dur="indefinite" restart="never" nodeType="tmRoot"/>
+      </p:par>
+    </p:tnLst>
+  </p:timing>
+</p:sld>
+</file>
+
+<file path=ppt/slides/slide16.xml><?xml version="1.0" encoding="utf-8"?>
+<p:sld xmlns:a="http://schemas.openxmlformats.org/drawingml/2006/main" xmlns:r="http://schemas.openxmlformats.org/officeDocument/2006/relationships" xmlns:p="http://schemas.openxmlformats.org/presentationml/2006/main">
+  <p:cSld>
+    <p:spTree>
+      <p:nvGrpSpPr>
+        <p:cNvPr id="1" name=""/>
+        <p:cNvGrpSpPr/>
+        <p:nvPr/>
+      </p:nvGrpSpPr>
+      <p:grpSpPr>
+        <a:xfrm>
+          <a:off x="0" y="0"/>
+          <a:ext cx="0" cy="0"/>
+          <a:chOff x="0" y="0"/>
+          <a:chExt cx="0" cy="0"/>
+        </a:xfrm>
+      </p:grpSpPr>
+      <p:pic>
+        <p:nvPicPr>
+          <p:cNvPr id="29698" name="Picture 2"/>
+          <p:cNvPicPr>
+            <a:picLocks noChangeAspect="1" noChangeArrowheads="1"/>
+          </p:cNvPicPr>
+          <p:nvPr/>
+        </p:nvPicPr>
+        <p:blipFill>
+          <a:blip r:embed="rId2"/>
+          <a:srcRect/>
+          <a:stretch>
+            <a:fillRect/>
+          </a:stretch>
+        </p:blipFill>
+        <p:spPr bwMode="auto">
+          <a:xfrm>
+            <a:off x="1214414" y="3571880"/>
+            <a:ext cx="2456738" cy="1552572"/>
+          </a:xfrm>
+          <a:prstGeom prst="rect">
+            <a:avLst/>
+          </a:prstGeom>
+          <a:noFill/>
+          <a:ln w="9525">
+            <a:solidFill>
+              <a:schemeClr val="accent6">
+                <a:lumMod val="60000"/>
+                <a:lumOff val="40000"/>
+              </a:schemeClr>
+            </a:solidFill>
+            <a:miter lim="800000"/>
+            <a:headEnd/>
+            <a:tailEnd/>
+          </a:ln>
+          <a:effectLst/>
+        </p:spPr>
+      </p:pic>
+      <p:sp>
+        <p:nvSpPr>
+          <p:cNvPr id="5" name="Titre 1"/>
+          <p:cNvSpPr>
+            <a:spLocks noGrp="1"/>
+          </p:cNvSpPr>
+          <p:nvPr>
+            <p:ph type="title"/>
+          </p:nvPr>
+        </p:nvSpPr>
+        <p:spPr>
+          <a:xfrm>
+            <a:off x="457200" y="228866"/>
+            <a:ext cx="8543956" cy="952500"/>
+          </a:xfrm>
+        </p:spPr>
+        <p:txBody>
+          <a:bodyPr>
+            <a:normAutofit fontScale="90000"/>
+          </a:bodyPr>
+          <a:lstStyle/>
+          <a:p>
+            <a:r>
+              <a:rPr lang="fr-FR" dirty="0" smtClean="0"/>
+              <a:t>Tests unitaires : Gestion des lumières</a:t>
+            </a:r>
+            <a:endParaRPr lang="fr-FR" dirty="0"/>
+          </a:p>
+        </p:txBody>
+      </p:sp>
+      <p:sp>
+        <p:nvSpPr>
+          <p:cNvPr id="6" name="ZoneTexte 5"/>
+          <p:cNvSpPr txBox="1"/>
+          <p:nvPr/>
+        </p:nvSpPr>
+        <p:spPr>
+          <a:xfrm>
+            <a:off x="642910" y="1214426"/>
+            <a:ext cx="1659429" cy="369332"/>
+          </a:xfrm>
+          <a:prstGeom prst="rect">
+            <a:avLst/>
+          </a:prstGeom>
+          <a:noFill/>
+        </p:spPr>
+        <p:txBody>
+          <a:bodyPr wrap="none" rtlCol="0">
+            <a:spAutoFit/>
+          </a:bodyPr>
+          <a:lstStyle/>
+          <a:p>
+            <a:r>
+              <a:rPr lang="fr-FR" dirty="0" smtClean="0"/>
+              <a:t>Relai lumière :</a:t>
+            </a:r>
+            <a:endParaRPr lang="fr-FR" dirty="0"/>
+          </a:p>
+        </p:txBody>
+      </p:sp>
+      <p:pic>
+        <p:nvPicPr>
+          <p:cNvPr id="29699" name="Picture 3"/>
+          <p:cNvPicPr>
+            <a:picLocks noChangeAspect="1" noChangeArrowheads="1"/>
+          </p:cNvPicPr>
+          <p:nvPr/>
+        </p:nvPicPr>
+        <p:blipFill>
+          <a:blip r:embed="rId3"/>
+          <a:srcRect/>
+          <a:stretch>
+            <a:fillRect/>
+          </a:stretch>
+        </p:blipFill>
+        <p:spPr bwMode="auto">
+          <a:xfrm>
+            <a:off x="5643570" y="2786062"/>
+            <a:ext cx="1214446" cy="1584300"/>
+          </a:xfrm>
+          <a:prstGeom prst="rect">
+            <a:avLst/>
+          </a:prstGeom>
+          <a:noFill/>
+          <a:ln w="9525">
+            <a:solidFill>
+              <a:schemeClr val="accent6">
+                <a:lumMod val="60000"/>
+                <a:lumOff val="40000"/>
+              </a:schemeClr>
+            </a:solidFill>
+            <a:miter lim="800000"/>
+            <a:headEnd/>
+            <a:tailEnd/>
+          </a:ln>
+          <a:effectLst/>
+        </p:spPr>
+      </p:pic>
+      <p:pic>
+        <p:nvPicPr>
+          <p:cNvPr id="29700" name="Picture 4" descr="Q:\domotique\lumier.jpg"/>
+          <p:cNvPicPr>
+            <a:picLocks noChangeAspect="1" noChangeArrowheads="1"/>
+          </p:cNvPicPr>
+          <p:nvPr/>
+        </p:nvPicPr>
+        <p:blipFill>
+          <a:blip r:embed="rId4"/>
+          <a:srcRect/>
+          <a:stretch>
+            <a:fillRect/>
+          </a:stretch>
+        </p:blipFill>
+        <p:spPr bwMode="auto">
+          <a:xfrm>
+            <a:off x="785786" y="2071682"/>
+            <a:ext cx="1071563" cy="1071563"/>
+          </a:xfrm>
+          <a:prstGeom prst="rect">
+            <a:avLst/>
+          </a:prstGeom>
+          <a:noFill/>
+          <a:ln>
+            <a:solidFill>
+              <a:schemeClr val="accent6">
+                <a:lumMod val="60000"/>
+                <a:lumOff val="40000"/>
+              </a:schemeClr>
+            </a:solidFill>
+          </a:ln>
+        </p:spPr>
+      </p:pic>
+    </p:spTree>
+  </p:cSld>
+  <p:clrMapOvr>
+    <a:masterClrMapping/>
+  </p:clrMapOvr>
+</p:sld>
+</file>
+
+<file path=ppt/slides/slide17.xml><?xml version="1.0" encoding="utf-8"?>
+<p:sld xmlns:a="http://schemas.openxmlformats.org/drawingml/2006/main" xmlns:r="http://schemas.openxmlformats.org/officeDocument/2006/relationships" xmlns:p="http://schemas.openxmlformats.org/presentationml/2006/main">
+  <p:cSld>
+    <p:spTree>
+      <p:nvGrpSpPr>
+        <p:cNvPr id="1" name=""/>
+        <p:cNvGrpSpPr/>
+        <p:nvPr/>
+      </p:nvGrpSpPr>
+      <p:grpSpPr>
+        <a:xfrm>
+          <a:off x="0" y="0"/>
+          <a:ext cx="0" cy="0"/>
+          <a:chOff x="0" y="0"/>
+          <a:chExt cx="0" cy="0"/>
+        </a:xfrm>
+      </p:grpSpPr>
+      <p:pic>
+        <p:nvPicPr>
+          <p:cNvPr id="4" name="Picture 3"/>
+          <p:cNvPicPr>
+            <a:picLocks noChangeAspect="1" noChangeArrowheads="1"/>
+          </p:cNvPicPr>
+          <p:nvPr/>
+        </p:nvPicPr>
+        <p:blipFill>
+          <a:blip r:embed="rId2"/>
+          <a:srcRect/>
+          <a:stretch>
+            <a:fillRect/>
+          </a:stretch>
+        </p:blipFill>
+        <p:spPr bwMode="auto">
+          <a:xfrm>
+            <a:off x="4357686" y="2786062"/>
+            <a:ext cx="3859083" cy="2214558"/>
+          </a:xfrm>
+          <a:prstGeom prst="rect">
+            <a:avLst/>
+          </a:prstGeom>
+          <a:noFill/>
+          <a:ln w="9525">
+            <a:solidFill>
+              <a:schemeClr val="accent6">
+                <a:lumMod val="60000"/>
+                <a:lumOff val="40000"/>
+              </a:schemeClr>
+            </a:solidFill>
+            <a:miter lim="800000"/>
+            <a:headEnd/>
+            <a:tailEnd/>
+          </a:ln>
+          <a:effectLst/>
+        </p:spPr>
+      </p:pic>
+      <p:sp>
+        <p:nvSpPr>
+          <p:cNvPr id="5" name="Titre 1"/>
+          <p:cNvSpPr>
+            <a:spLocks noGrp="1"/>
+          </p:cNvSpPr>
+          <p:nvPr>
+            <p:ph type="title"/>
+          </p:nvPr>
+        </p:nvSpPr>
+        <p:spPr>
+          <a:xfrm>
+            <a:off x="457200" y="228866"/>
+            <a:ext cx="8043890" cy="952500"/>
+          </a:xfrm>
+        </p:spPr>
+        <p:txBody>
+          <a:bodyPr>
+            <a:normAutofit fontScale="90000"/>
+          </a:bodyPr>
+          <a:lstStyle/>
+          <a:p>
+            <a:r>
+              <a:rPr lang="fr-FR" dirty="0" smtClean="0"/>
+              <a:t>Tests unitaires : Gestion des volets</a:t>
+            </a:r>
+            <a:endParaRPr lang="fr-FR" dirty="0"/>
+          </a:p>
+        </p:txBody>
+      </p:sp>
+      <p:sp>
+        <p:nvSpPr>
+          <p:cNvPr id="6" name="ZoneTexte 5"/>
+          <p:cNvSpPr txBox="1"/>
+          <p:nvPr/>
+        </p:nvSpPr>
+        <p:spPr>
+          <a:xfrm>
+            <a:off x="642910" y="1214426"/>
+            <a:ext cx="2557110" cy="369332"/>
+          </a:xfrm>
+          <a:prstGeom prst="rect">
+            <a:avLst/>
+          </a:prstGeom>
+          <a:noFill/>
+        </p:spPr>
+        <p:txBody>
+          <a:bodyPr wrap="none" rtlCol="0">
+            <a:spAutoFit/>
+          </a:bodyPr>
+          <a:lstStyle/>
+          <a:p>
+            <a:r>
+              <a:rPr lang="fr-FR" dirty="0" smtClean="0"/>
+              <a:t>Capteur de luminosité :</a:t>
+            </a:r>
+            <a:endParaRPr lang="fr-FR" dirty="0"/>
+          </a:p>
+        </p:txBody>
+      </p:sp>
+      <p:pic>
+        <p:nvPicPr>
+          <p:cNvPr id="3075" name="Picture 3" descr="Q:\Projet_Domotique_GITBTS\Materiels\Benjamin\CapteurLumi\lumi.png"/>
+          <p:cNvPicPr>
+            <a:picLocks noChangeAspect="1" noChangeArrowheads="1"/>
+          </p:cNvPicPr>
+          <p:nvPr/>
+        </p:nvPicPr>
+        <p:blipFill>
+          <a:blip r:embed="rId3"/>
+          <a:srcRect/>
+          <a:stretch>
+            <a:fillRect/>
+          </a:stretch>
+        </p:blipFill>
+        <p:spPr bwMode="auto">
+          <a:xfrm>
+            <a:off x="642910" y="3714756"/>
+            <a:ext cx="2681286" cy="1155423"/>
+          </a:xfrm>
+          <a:prstGeom prst="rect">
+            <a:avLst/>
+          </a:prstGeom>
+          <a:noFill/>
+          <a:ln>
+            <a:solidFill>
+              <a:schemeClr val="accent6">
+                <a:lumMod val="60000"/>
+                <a:lumOff val="40000"/>
+              </a:schemeClr>
+            </a:solidFill>
+          </a:ln>
+        </p:spPr>
+      </p:pic>
+      <p:pic>
+        <p:nvPicPr>
+          <p:cNvPr id="3077" name="Picture 5" descr="439_2"/>
+          <p:cNvPicPr>
+            <a:picLocks noChangeAspect="1" noChangeArrowheads="1"/>
+          </p:cNvPicPr>
+          <p:nvPr/>
+        </p:nvPicPr>
+        <p:blipFill>
+          <a:blip r:embed="rId4"/>
+          <a:srcRect/>
+          <a:stretch>
+            <a:fillRect/>
+          </a:stretch>
+        </p:blipFill>
+        <p:spPr bwMode="auto">
+          <a:xfrm>
+            <a:off x="1142976" y="2071682"/>
+            <a:ext cx="1096028" cy="823911"/>
+          </a:xfrm>
+          <a:prstGeom prst="rect">
+            <a:avLst/>
+          </a:prstGeom>
+          <a:noFill/>
+          <a:ln>
+            <a:solidFill>
+              <a:schemeClr val="accent6">
+                <a:lumMod val="60000"/>
+                <a:lumOff val="40000"/>
+              </a:schemeClr>
+            </a:solidFill>
+          </a:ln>
+        </p:spPr>
+      </p:pic>
+    </p:spTree>
+  </p:cSld>
+  <p:clrMapOvr>
+    <a:masterClrMapping/>
+  </p:clrMapOvr>
+  <p:timing>
+    <p:tnLst>
+      <p:par>
+        <p:cTn id="1" dur="indefinite" restart="never" nodeType="tmRoot"/>
+      </p:par>
+    </p:tnLst>
+  </p:timing>
 </p:sld>
 </file>
 

</xml_diff>

<commit_message>
MAJ 10/02/2018 Signed-off-by: DrBlaf <chauveau.aurelien.76@gmail.com>
</commit_message>
<xml_diff>
--- a/Rapport/Benjamin/RevueDeProjet.pptx
+++ b/Rapport/Benjamin/RevueDeProjet.pptx
@@ -508,7 +508,7 @@
             <a:fld id="{7385B5F2-299D-41E4-81B4-55AECBC730DC}" type="datetimeFigureOut">
               <a:rPr lang="fr-FR" smtClean="0"/>
               <a:pPr/>
-              <a:t>13/02/2018</a:t>
+              <a:t>14/02/2018</a:t>
             </a:fld>
             <a:endParaRPr lang="fr-FR"/>
           </a:p>
@@ -675,7 +675,7 @@
             <a:fld id="{7385B5F2-299D-41E4-81B4-55AECBC730DC}" type="datetimeFigureOut">
               <a:rPr lang="fr-FR" smtClean="0"/>
               <a:pPr/>
-              <a:t>13/02/2018</a:t>
+              <a:t>14/02/2018</a:t>
             </a:fld>
             <a:endParaRPr lang="fr-FR"/>
           </a:p>
@@ -852,7 +852,7 @@
             <a:fld id="{7385B5F2-299D-41E4-81B4-55AECBC730DC}" type="datetimeFigureOut">
               <a:rPr lang="fr-FR" smtClean="0"/>
               <a:pPr/>
-              <a:t>13/02/2018</a:t>
+              <a:t>14/02/2018</a:t>
             </a:fld>
             <a:endParaRPr lang="fr-FR"/>
           </a:p>
@@ -1023,7 +1023,7 @@
             <a:fld id="{7385B5F2-299D-41E4-81B4-55AECBC730DC}" type="datetimeFigureOut">
               <a:rPr lang="fr-FR" smtClean="0"/>
               <a:pPr/>
-              <a:t>13/02/2018</a:t>
+              <a:t>14/02/2018</a:t>
             </a:fld>
             <a:endParaRPr lang="fr-FR"/>
           </a:p>
@@ -1487,7 +1487,7 @@
             <a:fld id="{7385B5F2-299D-41E4-81B4-55AECBC730DC}" type="datetimeFigureOut">
               <a:rPr lang="fr-FR" smtClean="0"/>
               <a:pPr/>
-              <a:t>13/02/2018</a:t>
+              <a:t>14/02/2018</a:t>
             </a:fld>
             <a:endParaRPr lang="fr-FR"/>
           </a:p>
@@ -1753,7 +1753,7 @@
             <a:fld id="{7385B5F2-299D-41E4-81B4-55AECBC730DC}" type="datetimeFigureOut">
               <a:rPr lang="fr-FR" smtClean="0"/>
               <a:pPr/>
-              <a:t>13/02/2018</a:t>
+              <a:t>14/02/2018</a:t>
             </a:fld>
             <a:endParaRPr lang="fr-FR"/>
           </a:p>
@@ -2129,7 +2129,7 @@
             <a:fld id="{7385B5F2-299D-41E4-81B4-55AECBC730DC}" type="datetimeFigureOut">
               <a:rPr lang="fr-FR" smtClean="0"/>
               <a:pPr/>
-              <a:t>13/02/2018</a:t>
+              <a:t>14/02/2018</a:t>
             </a:fld>
             <a:endParaRPr lang="fr-FR"/>
           </a:p>
@@ -2253,7 +2253,7 @@
             <a:fld id="{7385B5F2-299D-41E4-81B4-55AECBC730DC}" type="datetimeFigureOut">
               <a:rPr lang="fr-FR" smtClean="0"/>
               <a:pPr/>
-              <a:t>13/02/2018</a:t>
+              <a:t>14/02/2018</a:t>
             </a:fld>
             <a:endParaRPr lang="fr-FR"/>
           </a:p>
@@ -2345,7 +2345,7 @@
             <a:fld id="{7385B5F2-299D-41E4-81B4-55AECBC730DC}" type="datetimeFigureOut">
               <a:rPr lang="fr-FR" smtClean="0"/>
               <a:pPr/>
-              <a:t>13/02/2018</a:t>
+              <a:t>14/02/2018</a:t>
             </a:fld>
             <a:endParaRPr lang="fr-FR"/>
           </a:p>
@@ -2596,7 +2596,7 @@
             <a:fld id="{7385B5F2-299D-41E4-81B4-55AECBC730DC}" type="datetimeFigureOut">
               <a:rPr lang="fr-FR" smtClean="0"/>
               <a:pPr/>
-              <a:t>13/02/2018</a:t>
+              <a:t>14/02/2018</a:t>
             </a:fld>
             <a:endParaRPr lang="fr-FR"/>
           </a:p>
@@ -2857,7 +2857,7 @@
             <a:fld id="{7385B5F2-299D-41E4-81B4-55AECBC730DC}" type="datetimeFigureOut">
               <a:rPr lang="fr-FR" smtClean="0"/>
               <a:pPr/>
-              <a:t>13/02/2018</a:t>
+              <a:t>14/02/2018</a:t>
             </a:fld>
             <a:endParaRPr lang="fr-FR"/>
           </a:p>
@@ -3263,7 +3263,7 @@
             <a:fld id="{7385B5F2-299D-41E4-81B4-55AECBC730DC}" type="datetimeFigureOut">
               <a:rPr lang="fr-FR" smtClean="0"/>
               <a:pPr/>
-              <a:t>13/02/2018</a:t>
+              <a:t>14/02/2018</a:t>
             </a:fld>
             <a:endParaRPr lang="fr-FR"/>
           </a:p>
@@ -5598,9 +5598,69 @@
           <a:chExt cx="0" cy="0"/>
         </a:xfrm>
       </p:grpSpPr>
+      <p:sp>
+        <p:nvSpPr>
+          <p:cNvPr id="5" name="Titre 1"/>
+          <p:cNvSpPr>
+            <a:spLocks noGrp="1"/>
+          </p:cNvSpPr>
+          <p:nvPr>
+            <p:ph type="title"/>
+          </p:nvPr>
+        </p:nvSpPr>
+        <p:spPr>
+          <a:xfrm>
+            <a:off x="457200" y="228866"/>
+            <a:ext cx="8043890" cy="952500"/>
+          </a:xfrm>
+        </p:spPr>
+        <p:txBody>
+          <a:bodyPr>
+            <a:normAutofit fontScale="90000"/>
+          </a:bodyPr>
+          <a:lstStyle/>
+          <a:p>
+            <a:r>
+              <a:rPr lang="fr-FR" dirty="0" smtClean="0"/>
+              <a:t>Tests unitaires : Gestion des volets</a:t>
+            </a:r>
+            <a:endParaRPr lang="fr-FR" dirty="0"/>
+          </a:p>
+        </p:txBody>
+      </p:sp>
+      <p:sp>
+        <p:nvSpPr>
+          <p:cNvPr id="6" name="ZoneTexte 5"/>
+          <p:cNvSpPr txBox="1"/>
+          <p:nvPr/>
+        </p:nvSpPr>
+        <p:spPr>
+          <a:xfrm>
+            <a:off x="642910" y="1214426"/>
+            <a:ext cx="2557110" cy="369332"/>
+          </a:xfrm>
+          <a:prstGeom prst="rect">
+            <a:avLst/>
+          </a:prstGeom>
+          <a:noFill/>
+        </p:spPr>
+        <p:txBody>
+          <a:bodyPr wrap="none" rtlCol="0">
+            <a:spAutoFit/>
+          </a:bodyPr>
+          <a:lstStyle/>
+          <a:p>
+            <a:r>
+              <a:rPr lang="fr-FR" dirty="0" smtClean="0"/>
+              <a:t>Capteur de luminosité :</a:t>
+            </a:r>
+            <a:endParaRPr lang="fr-FR" dirty="0"/>
+          </a:p>
+        </p:txBody>
+      </p:sp>
       <p:pic>
         <p:nvPicPr>
-          <p:cNvPr id="4" name="Picture 3"/>
+          <p:cNvPr id="3075" name="Picture 3" descr="Q:\Projet_Domotique_GITBTS\Materiels\Benjamin\CapteurLumi\lumi.png"/>
           <p:cNvPicPr>
             <a:picLocks noChangeAspect="1" noChangeArrowheads="1"/>
           </p:cNvPicPr>
@@ -5615,8 +5675,76 @@
         </p:blipFill>
         <p:spPr bwMode="auto">
           <a:xfrm>
-            <a:off x="4357686" y="2786062"/>
-            <a:ext cx="3859083" cy="2214558"/>
+            <a:off x="642910" y="3714756"/>
+            <a:ext cx="2681286" cy="1155423"/>
+          </a:xfrm>
+          <a:prstGeom prst="rect">
+            <a:avLst/>
+          </a:prstGeom>
+          <a:noFill/>
+          <a:ln>
+            <a:solidFill>
+              <a:schemeClr val="accent6">
+                <a:lumMod val="60000"/>
+                <a:lumOff val="40000"/>
+              </a:schemeClr>
+            </a:solidFill>
+          </a:ln>
+        </p:spPr>
+      </p:pic>
+      <p:pic>
+        <p:nvPicPr>
+          <p:cNvPr id="3077" name="Picture 5" descr="439_2"/>
+          <p:cNvPicPr>
+            <a:picLocks noChangeAspect="1" noChangeArrowheads="1"/>
+          </p:cNvPicPr>
+          <p:nvPr/>
+        </p:nvPicPr>
+        <p:blipFill>
+          <a:blip r:embed="rId3"/>
+          <a:srcRect/>
+          <a:stretch>
+            <a:fillRect/>
+          </a:stretch>
+        </p:blipFill>
+        <p:spPr bwMode="auto">
+          <a:xfrm>
+            <a:off x="1142976" y="2071682"/>
+            <a:ext cx="1096028" cy="823911"/>
+          </a:xfrm>
+          <a:prstGeom prst="rect">
+            <a:avLst/>
+          </a:prstGeom>
+          <a:noFill/>
+          <a:ln>
+            <a:solidFill>
+              <a:schemeClr val="accent6">
+                <a:lumMod val="60000"/>
+                <a:lumOff val="40000"/>
+              </a:schemeClr>
+            </a:solidFill>
+          </a:ln>
+        </p:spPr>
+      </p:pic>
+      <p:pic>
+        <p:nvPicPr>
+          <p:cNvPr id="1026" name="Picture 2"/>
+          <p:cNvPicPr>
+            <a:picLocks noChangeAspect="1" noChangeArrowheads="1"/>
+          </p:cNvPicPr>
+          <p:nvPr/>
+        </p:nvPicPr>
+        <p:blipFill>
+          <a:blip r:embed="rId4"/>
+          <a:srcRect/>
+          <a:stretch>
+            <a:fillRect/>
+          </a:stretch>
+        </p:blipFill>
+        <p:spPr bwMode="auto">
+          <a:xfrm>
+            <a:off x="4857752" y="2571748"/>
+            <a:ext cx="2776537" cy="2176462"/>
           </a:xfrm>
           <a:prstGeom prst="rect">
             <a:avLst/>
@@ -5634,134 +5762,6 @@
             <a:tailEnd/>
           </a:ln>
           <a:effectLst/>
-        </p:spPr>
-      </p:pic>
-      <p:sp>
-        <p:nvSpPr>
-          <p:cNvPr id="5" name="Titre 1"/>
-          <p:cNvSpPr>
-            <a:spLocks noGrp="1"/>
-          </p:cNvSpPr>
-          <p:nvPr>
-            <p:ph type="title"/>
-          </p:nvPr>
-        </p:nvSpPr>
-        <p:spPr>
-          <a:xfrm>
-            <a:off x="457200" y="228866"/>
-            <a:ext cx="8043890" cy="952500"/>
-          </a:xfrm>
-        </p:spPr>
-        <p:txBody>
-          <a:bodyPr>
-            <a:normAutofit fontScale="90000"/>
-          </a:bodyPr>
-          <a:lstStyle/>
-          <a:p>
-            <a:r>
-              <a:rPr lang="fr-FR" dirty="0" smtClean="0"/>
-              <a:t>Tests unitaires : Gestion des volets</a:t>
-            </a:r>
-            <a:endParaRPr lang="fr-FR" dirty="0"/>
-          </a:p>
-        </p:txBody>
-      </p:sp>
-      <p:sp>
-        <p:nvSpPr>
-          <p:cNvPr id="6" name="ZoneTexte 5"/>
-          <p:cNvSpPr txBox="1"/>
-          <p:nvPr/>
-        </p:nvSpPr>
-        <p:spPr>
-          <a:xfrm>
-            <a:off x="642910" y="1214426"/>
-            <a:ext cx="2557110" cy="369332"/>
-          </a:xfrm>
-          <a:prstGeom prst="rect">
-            <a:avLst/>
-          </a:prstGeom>
-          <a:noFill/>
-        </p:spPr>
-        <p:txBody>
-          <a:bodyPr wrap="none" rtlCol="0">
-            <a:spAutoFit/>
-          </a:bodyPr>
-          <a:lstStyle/>
-          <a:p>
-            <a:r>
-              <a:rPr lang="fr-FR" dirty="0" smtClean="0"/>
-              <a:t>Capteur de luminosité :</a:t>
-            </a:r>
-            <a:endParaRPr lang="fr-FR" dirty="0"/>
-          </a:p>
-        </p:txBody>
-      </p:sp>
-      <p:pic>
-        <p:nvPicPr>
-          <p:cNvPr id="3075" name="Picture 3" descr="Q:\Projet_Domotique_GITBTS\Materiels\Benjamin\CapteurLumi\lumi.png"/>
-          <p:cNvPicPr>
-            <a:picLocks noChangeAspect="1" noChangeArrowheads="1"/>
-          </p:cNvPicPr>
-          <p:nvPr/>
-        </p:nvPicPr>
-        <p:blipFill>
-          <a:blip r:embed="rId3"/>
-          <a:srcRect/>
-          <a:stretch>
-            <a:fillRect/>
-          </a:stretch>
-        </p:blipFill>
-        <p:spPr bwMode="auto">
-          <a:xfrm>
-            <a:off x="642910" y="3714756"/>
-            <a:ext cx="2681286" cy="1155423"/>
-          </a:xfrm>
-          <a:prstGeom prst="rect">
-            <a:avLst/>
-          </a:prstGeom>
-          <a:noFill/>
-          <a:ln>
-            <a:solidFill>
-              <a:schemeClr val="accent6">
-                <a:lumMod val="60000"/>
-                <a:lumOff val="40000"/>
-              </a:schemeClr>
-            </a:solidFill>
-          </a:ln>
-        </p:spPr>
-      </p:pic>
-      <p:pic>
-        <p:nvPicPr>
-          <p:cNvPr id="3077" name="Picture 5" descr="439_2"/>
-          <p:cNvPicPr>
-            <a:picLocks noChangeAspect="1" noChangeArrowheads="1"/>
-          </p:cNvPicPr>
-          <p:nvPr/>
-        </p:nvPicPr>
-        <p:blipFill>
-          <a:blip r:embed="rId4"/>
-          <a:srcRect/>
-          <a:stretch>
-            <a:fillRect/>
-          </a:stretch>
-        </p:blipFill>
-        <p:spPr bwMode="auto">
-          <a:xfrm>
-            <a:off x="1142976" y="2071682"/>
-            <a:ext cx="1096028" cy="823911"/>
-          </a:xfrm>
-          <a:prstGeom prst="rect">
-            <a:avLst/>
-          </a:prstGeom>
-          <a:noFill/>
-          <a:ln>
-            <a:solidFill>
-              <a:schemeClr val="accent6">
-                <a:lumMod val="60000"/>
-                <a:lumOff val="40000"/>
-              </a:schemeClr>
-            </a:solidFill>
-          </a:ln>
         </p:spPr>
       </p:pic>
     </p:spTree>

</xml_diff>

<commit_message>
MAJ 20/02/2018 Signed-off-by: DrBlaf <chauveau.aurelien.76@gmail.com>
</commit_message>
<xml_diff>
--- a/Rapport/Benjamin/RevueDeProjet.pptx
+++ b/Rapport/Benjamin/RevueDeProjet.pptx
@@ -22,6 +22,7 @@
     <p:sldId id="271" r:id="rId16"/>
     <p:sldId id="273" r:id="rId17"/>
     <p:sldId id="272" r:id="rId18"/>
+    <p:sldId id="274" r:id="rId19"/>
   </p:sldIdLst>
   <p:sldSz cx="9144000" cy="5715000" type="screen16x10"/>
   <p:notesSz cx="6858000" cy="9144000"/>
@@ -508,7 +509,7 @@
             <a:fld id="{7385B5F2-299D-41E4-81B4-55AECBC730DC}" type="datetimeFigureOut">
               <a:rPr lang="fr-FR" smtClean="0"/>
               <a:pPr/>
-              <a:t>14/02/2018</a:t>
+              <a:t>19/02/2018</a:t>
             </a:fld>
             <a:endParaRPr lang="fr-FR"/>
           </a:p>
@@ -675,7 +676,7 @@
             <a:fld id="{7385B5F2-299D-41E4-81B4-55AECBC730DC}" type="datetimeFigureOut">
               <a:rPr lang="fr-FR" smtClean="0"/>
               <a:pPr/>
-              <a:t>14/02/2018</a:t>
+              <a:t>19/02/2018</a:t>
             </a:fld>
             <a:endParaRPr lang="fr-FR"/>
           </a:p>
@@ -852,7 +853,7 @@
             <a:fld id="{7385B5F2-299D-41E4-81B4-55AECBC730DC}" type="datetimeFigureOut">
               <a:rPr lang="fr-FR" smtClean="0"/>
               <a:pPr/>
-              <a:t>14/02/2018</a:t>
+              <a:t>19/02/2018</a:t>
             </a:fld>
             <a:endParaRPr lang="fr-FR"/>
           </a:p>
@@ -1023,7 +1024,7 @@
             <a:fld id="{7385B5F2-299D-41E4-81B4-55AECBC730DC}" type="datetimeFigureOut">
               <a:rPr lang="fr-FR" smtClean="0"/>
               <a:pPr/>
-              <a:t>14/02/2018</a:t>
+              <a:t>19/02/2018</a:t>
             </a:fld>
             <a:endParaRPr lang="fr-FR"/>
           </a:p>
@@ -1487,7 +1488,7 @@
             <a:fld id="{7385B5F2-299D-41E4-81B4-55AECBC730DC}" type="datetimeFigureOut">
               <a:rPr lang="fr-FR" smtClean="0"/>
               <a:pPr/>
-              <a:t>14/02/2018</a:t>
+              <a:t>19/02/2018</a:t>
             </a:fld>
             <a:endParaRPr lang="fr-FR"/>
           </a:p>
@@ -1753,7 +1754,7 @@
             <a:fld id="{7385B5F2-299D-41E4-81B4-55AECBC730DC}" type="datetimeFigureOut">
               <a:rPr lang="fr-FR" smtClean="0"/>
               <a:pPr/>
-              <a:t>14/02/2018</a:t>
+              <a:t>19/02/2018</a:t>
             </a:fld>
             <a:endParaRPr lang="fr-FR"/>
           </a:p>
@@ -2129,7 +2130,7 @@
             <a:fld id="{7385B5F2-299D-41E4-81B4-55AECBC730DC}" type="datetimeFigureOut">
               <a:rPr lang="fr-FR" smtClean="0"/>
               <a:pPr/>
-              <a:t>14/02/2018</a:t>
+              <a:t>19/02/2018</a:t>
             </a:fld>
             <a:endParaRPr lang="fr-FR"/>
           </a:p>
@@ -2253,7 +2254,7 @@
             <a:fld id="{7385B5F2-299D-41E4-81B4-55AECBC730DC}" type="datetimeFigureOut">
               <a:rPr lang="fr-FR" smtClean="0"/>
               <a:pPr/>
-              <a:t>14/02/2018</a:t>
+              <a:t>19/02/2018</a:t>
             </a:fld>
             <a:endParaRPr lang="fr-FR"/>
           </a:p>
@@ -2345,7 +2346,7 @@
             <a:fld id="{7385B5F2-299D-41E4-81B4-55AECBC730DC}" type="datetimeFigureOut">
               <a:rPr lang="fr-FR" smtClean="0"/>
               <a:pPr/>
-              <a:t>14/02/2018</a:t>
+              <a:t>19/02/2018</a:t>
             </a:fld>
             <a:endParaRPr lang="fr-FR"/>
           </a:p>
@@ -2596,7 +2597,7 @@
             <a:fld id="{7385B5F2-299D-41E4-81B4-55AECBC730DC}" type="datetimeFigureOut">
               <a:rPr lang="fr-FR" smtClean="0"/>
               <a:pPr/>
-              <a:t>14/02/2018</a:t>
+              <a:t>19/02/2018</a:t>
             </a:fld>
             <a:endParaRPr lang="fr-FR"/>
           </a:p>
@@ -2857,7 +2858,7 @@
             <a:fld id="{7385B5F2-299D-41E4-81B4-55AECBC730DC}" type="datetimeFigureOut">
               <a:rPr lang="fr-FR" smtClean="0"/>
               <a:pPr/>
-              <a:t>14/02/2018</a:t>
+              <a:t>19/02/2018</a:t>
             </a:fld>
             <a:endParaRPr lang="fr-FR"/>
           </a:p>
@@ -3263,7 +3264,7 @@
             <a:fld id="{7385B5F2-299D-41E4-81B4-55AECBC730DC}" type="datetimeFigureOut">
               <a:rPr lang="fr-FR" smtClean="0"/>
               <a:pPr/>
-              <a:t>14/02/2018</a:t>
+              <a:t>19/02/2018</a:t>
             </a:fld>
             <a:endParaRPr lang="fr-FR"/>
           </a:p>
@@ -5776,6 +5777,69 @@
       </p:par>
     </p:tnLst>
   </p:timing>
+</p:sld>
+</file>
+
+<file path=ppt/slides/slide18.xml><?xml version="1.0" encoding="utf-8"?>
+<p:sld xmlns:a="http://schemas.openxmlformats.org/drawingml/2006/main" xmlns:r="http://schemas.openxmlformats.org/officeDocument/2006/relationships" xmlns:p="http://schemas.openxmlformats.org/presentationml/2006/main">
+  <p:cSld>
+    <p:spTree>
+      <p:nvGrpSpPr>
+        <p:cNvPr id="1" name=""/>
+        <p:cNvGrpSpPr/>
+        <p:nvPr/>
+      </p:nvGrpSpPr>
+      <p:grpSpPr>
+        <a:xfrm>
+          <a:off x="0" y="0"/>
+          <a:ext cx="0" cy="0"/>
+          <a:chOff x="0" y="0"/>
+          <a:chExt cx="0" cy="0"/>
+        </a:xfrm>
+      </p:grpSpPr>
+      <p:sp>
+        <p:nvSpPr>
+          <p:cNvPr id="2" name="Titre 1"/>
+          <p:cNvSpPr>
+            <a:spLocks noGrp="1"/>
+          </p:cNvSpPr>
+          <p:nvPr>
+            <p:ph type="title"/>
+          </p:nvPr>
+        </p:nvSpPr>
+        <p:spPr/>
+        <p:txBody>
+          <a:bodyPr/>
+          <a:lstStyle/>
+          <a:p>
+            <a:endParaRPr lang="fr-FR"/>
+          </a:p>
+        </p:txBody>
+      </p:sp>
+      <p:sp>
+        <p:nvSpPr>
+          <p:cNvPr id="3" name="Espace réservé du contenu 2"/>
+          <p:cNvSpPr>
+            <a:spLocks noGrp="1"/>
+          </p:cNvSpPr>
+          <p:nvPr>
+            <p:ph idx="1"/>
+          </p:nvPr>
+        </p:nvSpPr>
+        <p:spPr/>
+        <p:txBody>
+          <a:bodyPr/>
+          <a:lstStyle/>
+          <a:p>
+            <a:endParaRPr lang="fr-FR"/>
+          </a:p>
+        </p:txBody>
+      </p:sp>
+    </p:spTree>
+  </p:cSld>
+  <p:clrMapOvr>
+    <a:masterClrMapping/>
+  </p:clrMapOvr>
 </p:sld>
 </file>
 

</xml_diff>

<commit_message>
MAJ 14/03/2018 Signed-off-by: DrBlaf <chauveau.aurelien.76@gmail.com>
</commit_message>
<xml_diff>
--- a/Rapport/Benjamin/RevueDeProjet.pptx
+++ b/Rapport/Benjamin/RevueDeProjet.pptx
@@ -18,11 +18,12 @@
     <p:sldId id="263" r:id="rId12"/>
     <p:sldId id="264" r:id="rId13"/>
     <p:sldId id="269" r:id="rId14"/>
-    <p:sldId id="270" r:id="rId15"/>
-    <p:sldId id="271" r:id="rId16"/>
+    <p:sldId id="271" r:id="rId15"/>
+    <p:sldId id="270" r:id="rId16"/>
     <p:sldId id="273" r:id="rId17"/>
     <p:sldId id="272" r:id="rId18"/>
     <p:sldId id="274" r:id="rId19"/>
+    <p:sldId id="275" r:id="rId20"/>
   </p:sldIdLst>
   <p:sldSz cx="9144000" cy="5715000" type="screen16x10"/>
   <p:notesSz cx="6858000" cy="9144000"/>
@@ -509,7 +510,7 @@
             <a:fld id="{7385B5F2-299D-41E4-81B4-55AECBC730DC}" type="datetimeFigureOut">
               <a:rPr lang="fr-FR" smtClean="0"/>
               <a:pPr/>
-              <a:t>19/02/2018</a:t>
+              <a:t>14/03/2018</a:t>
             </a:fld>
             <a:endParaRPr lang="fr-FR"/>
           </a:p>
@@ -676,7 +677,7 @@
             <a:fld id="{7385B5F2-299D-41E4-81B4-55AECBC730DC}" type="datetimeFigureOut">
               <a:rPr lang="fr-FR" smtClean="0"/>
               <a:pPr/>
-              <a:t>19/02/2018</a:t>
+              <a:t>14/03/2018</a:t>
             </a:fld>
             <a:endParaRPr lang="fr-FR"/>
           </a:p>
@@ -853,7 +854,7 @@
             <a:fld id="{7385B5F2-299D-41E4-81B4-55AECBC730DC}" type="datetimeFigureOut">
               <a:rPr lang="fr-FR" smtClean="0"/>
               <a:pPr/>
-              <a:t>19/02/2018</a:t>
+              <a:t>14/03/2018</a:t>
             </a:fld>
             <a:endParaRPr lang="fr-FR"/>
           </a:p>
@@ -1024,7 +1025,7 @@
             <a:fld id="{7385B5F2-299D-41E4-81B4-55AECBC730DC}" type="datetimeFigureOut">
               <a:rPr lang="fr-FR" smtClean="0"/>
               <a:pPr/>
-              <a:t>19/02/2018</a:t>
+              <a:t>14/03/2018</a:t>
             </a:fld>
             <a:endParaRPr lang="fr-FR"/>
           </a:p>
@@ -1488,7 +1489,7 @@
             <a:fld id="{7385B5F2-299D-41E4-81B4-55AECBC730DC}" type="datetimeFigureOut">
               <a:rPr lang="fr-FR" smtClean="0"/>
               <a:pPr/>
-              <a:t>19/02/2018</a:t>
+              <a:t>14/03/2018</a:t>
             </a:fld>
             <a:endParaRPr lang="fr-FR"/>
           </a:p>
@@ -1754,7 +1755,7 @@
             <a:fld id="{7385B5F2-299D-41E4-81B4-55AECBC730DC}" type="datetimeFigureOut">
               <a:rPr lang="fr-FR" smtClean="0"/>
               <a:pPr/>
-              <a:t>19/02/2018</a:t>
+              <a:t>14/03/2018</a:t>
             </a:fld>
             <a:endParaRPr lang="fr-FR"/>
           </a:p>
@@ -2130,7 +2131,7 @@
             <a:fld id="{7385B5F2-299D-41E4-81B4-55AECBC730DC}" type="datetimeFigureOut">
               <a:rPr lang="fr-FR" smtClean="0"/>
               <a:pPr/>
-              <a:t>19/02/2018</a:t>
+              <a:t>14/03/2018</a:t>
             </a:fld>
             <a:endParaRPr lang="fr-FR"/>
           </a:p>
@@ -2254,7 +2255,7 @@
             <a:fld id="{7385B5F2-299D-41E4-81B4-55AECBC730DC}" type="datetimeFigureOut">
               <a:rPr lang="fr-FR" smtClean="0"/>
               <a:pPr/>
-              <a:t>19/02/2018</a:t>
+              <a:t>14/03/2018</a:t>
             </a:fld>
             <a:endParaRPr lang="fr-FR"/>
           </a:p>
@@ -2346,7 +2347,7 @@
             <a:fld id="{7385B5F2-299D-41E4-81B4-55AECBC730DC}" type="datetimeFigureOut">
               <a:rPr lang="fr-FR" smtClean="0"/>
               <a:pPr/>
-              <a:t>19/02/2018</a:t>
+              <a:t>14/03/2018</a:t>
             </a:fld>
             <a:endParaRPr lang="fr-FR"/>
           </a:p>
@@ -2597,7 +2598,7 @@
             <a:fld id="{7385B5F2-299D-41E4-81B4-55AECBC730DC}" type="datetimeFigureOut">
               <a:rPr lang="fr-FR" smtClean="0"/>
               <a:pPr/>
-              <a:t>19/02/2018</a:t>
+              <a:t>14/03/2018</a:t>
             </a:fld>
             <a:endParaRPr lang="fr-FR"/>
           </a:p>
@@ -2858,7 +2859,7 @@
             <a:fld id="{7385B5F2-299D-41E4-81B4-55AECBC730DC}" type="datetimeFigureOut">
               <a:rPr lang="fr-FR" smtClean="0"/>
               <a:pPr/>
-              <a:t>19/02/2018</a:t>
+              <a:t>14/03/2018</a:t>
             </a:fld>
             <a:endParaRPr lang="fr-FR"/>
           </a:p>
@@ -3264,7 +3265,7 @@
             <a:fld id="{7385B5F2-299D-41E4-81B4-55AECBC730DC}" type="datetimeFigureOut">
               <a:rPr lang="fr-FR" smtClean="0"/>
               <a:pPr/>
-              <a:t>19/02/2018</a:t>
+              <a:t>14/03/2018</a:t>
             </a:fld>
             <a:endParaRPr lang="fr-FR"/>
           </a:p>
@@ -3973,6 +3974,39 @@
           </a:effectLst>
         </p:spPr>
       </p:pic>
+      <p:pic>
+        <p:nvPicPr>
+          <p:cNvPr id="5" name="Picture 2"/>
+          <p:cNvPicPr>
+            <a:picLocks noChangeAspect="1" noChangeArrowheads="1"/>
+          </p:cNvPicPr>
+          <p:nvPr/>
+        </p:nvPicPr>
+        <p:blipFill>
+          <a:blip r:embed="rId3"/>
+          <a:srcRect/>
+          <a:stretch>
+            <a:fillRect/>
+          </a:stretch>
+        </p:blipFill>
+        <p:spPr bwMode="auto">
+          <a:xfrm>
+            <a:off x="1785918" y="1214426"/>
+            <a:ext cx="1000132" cy="139091"/>
+          </a:xfrm>
+          <a:prstGeom prst="rect">
+            <a:avLst/>
+          </a:prstGeom>
+          <a:noFill/>
+          <a:ln w="9525">
+            <a:noFill/>
+            <a:miter lim="800000"/>
+            <a:headEnd/>
+            <a:tailEnd/>
+          </a:ln>
+          <a:effectLst/>
+        </p:spPr>
+      </p:pic>
     </p:spTree>
   </p:cSld>
   <p:clrMapOvr>
@@ -4362,7 +4396,37 @@
                   </a:solidFill>
                 </a:ln>
               </a:rPr>
-              <a:t>Exemple de trame  : $lum0,lux121,tem20,air5,heu86400;</a:t>
+              <a:t>Exemple de trame  : </a:t>
+            </a:r>
+            <a:r>
+              <a:rPr lang="fr-FR" sz="2000" b="1" smtClean="0">
+                <a:ln>
+                  <a:solidFill>
+                    <a:schemeClr val="bg2"/>
+                  </a:solidFill>
+                </a:ln>
+              </a:rPr>
+              <a:t>$</a:t>
+            </a:r>
+            <a:r>
+              <a:rPr lang="fr-FR" sz="2000" b="1" smtClean="0">
+                <a:ln>
+                  <a:solidFill>
+                    <a:schemeClr val="bg2"/>
+                  </a:solidFill>
+                </a:ln>
+              </a:rPr>
+              <a:t>lum0$lux121$tem20$air5$heu86400</a:t>
+            </a:r>
+            <a:r>
+              <a:rPr lang="fr-FR" sz="2000" b="1" dirty="0" smtClean="0">
+                <a:ln>
+                  <a:solidFill>
+                    <a:schemeClr val="bg2"/>
+                  </a:solidFill>
+                </a:ln>
+              </a:rPr>
+              <a:t>;</a:t>
             </a:r>
           </a:p>
         </p:txBody>
@@ -4973,7 +5037,7 @@
       </p:grpSpPr>
       <p:sp>
         <p:nvSpPr>
-          <p:cNvPr id="2" name="Titre 1"/>
+          <p:cNvPr id="5" name="Titre 1"/>
           <p:cNvSpPr>
             <a:spLocks noGrp="1"/>
           </p:cNvSpPr>
@@ -4981,7 +5045,12 @@
             <p:ph type="title"/>
           </p:nvPr>
         </p:nvSpPr>
-        <p:spPr/>
+        <p:spPr>
+          <a:xfrm>
+            <a:off x="457200" y="228866"/>
+            <a:ext cx="7467600" cy="952500"/>
+          </a:xfrm>
+        </p:spPr>
         <p:txBody>
           <a:bodyPr/>
           <a:lstStyle/>
@@ -4994,16 +5063,46 @@
           </a:p>
         </p:txBody>
       </p:sp>
+      <p:sp>
+        <p:nvSpPr>
+          <p:cNvPr id="6" name="ZoneTexte 5"/>
+          <p:cNvSpPr txBox="1"/>
+          <p:nvPr/>
+        </p:nvSpPr>
+        <p:spPr>
+          <a:xfrm>
+            <a:off x="642910" y="1214426"/>
+            <a:ext cx="2236510" cy="369332"/>
+          </a:xfrm>
+          <a:prstGeom prst="rect">
+            <a:avLst/>
+          </a:prstGeom>
+          <a:noFill/>
+        </p:spPr>
+        <p:txBody>
+          <a:bodyPr wrap="none" rtlCol="0">
+            <a:spAutoFit/>
+          </a:bodyPr>
+          <a:lstStyle/>
+          <a:p>
+            <a:r>
+              <a:rPr lang="fr-FR" dirty="0" smtClean="0"/>
+              <a:t>Détecteur incendie :</a:t>
+            </a:r>
+            <a:endParaRPr lang="fr-FR" dirty="0"/>
+          </a:p>
+        </p:txBody>
+      </p:sp>
       <p:pic>
         <p:nvPicPr>
-          <p:cNvPr id="26626" name="Picture 2" descr="Q:\domotique\capteur-de-mouvement-pir-grove.jpg"/>
+          <p:cNvPr id="1028" name="Picture 4"/>
           <p:cNvPicPr>
             <a:picLocks noChangeAspect="1" noChangeArrowheads="1"/>
           </p:cNvPicPr>
           <p:nvPr/>
         </p:nvPicPr>
         <p:blipFill>
-          <a:blip r:embed="rId2" cstate="print"/>
+          <a:blip r:embed="rId2"/>
           <a:srcRect/>
           <a:stretch>
             <a:fillRect/>
@@ -5011,33 +5110,37 @@
         </p:blipFill>
         <p:spPr bwMode="auto">
           <a:xfrm>
-            <a:off x="571472" y="2000244"/>
-            <a:ext cx="1219184" cy="1219184"/>
+            <a:off x="3286116" y="2786062"/>
+            <a:ext cx="2459215" cy="1014335"/>
           </a:xfrm>
           <a:prstGeom prst="rect">
             <a:avLst/>
           </a:prstGeom>
           <a:noFill/>
-          <a:ln>
+          <a:ln w="9525">
             <a:solidFill>
               <a:schemeClr val="accent6">
                 <a:lumMod val="60000"/>
                 <a:lumOff val="40000"/>
               </a:schemeClr>
             </a:solidFill>
+            <a:miter lim="800000"/>
+            <a:headEnd/>
+            <a:tailEnd/>
           </a:ln>
+          <a:effectLst/>
         </p:spPr>
       </p:pic>
       <p:pic>
         <p:nvPicPr>
-          <p:cNvPr id="26628" name="Picture 4" descr="Q:\Projet_Domotique_GITBTS\Materiels\Benjamin\CapteurMouv\schema.png"/>
+          <p:cNvPr id="1030" name="Picture 6"/>
           <p:cNvPicPr>
             <a:picLocks noChangeAspect="1" noChangeArrowheads="1"/>
           </p:cNvPicPr>
           <p:nvPr/>
         </p:nvPicPr>
         <p:blipFill>
-          <a:blip r:embed="rId3"/>
+          <a:blip r:embed="rId3" cstate="print"/>
           <a:srcRect/>
           <a:stretch>
             <a:fillRect/>
@@ -5045,56 +5148,30 @@
         </p:blipFill>
         <p:spPr bwMode="auto">
           <a:xfrm>
-            <a:off x="571472" y="3500442"/>
-            <a:ext cx="3000396" cy="1494338"/>
+            <a:off x="642910" y="1785930"/>
+            <a:ext cx="1457521" cy="2181203"/>
           </a:xfrm>
           <a:prstGeom prst="rect">
             <a:avLst/>
           </a:prstGeom>
           <a:noFill/>
-          <a:ln>
+          <a:ln w="9525">
             <a:solidFill>
               <a:schemeClr val="accent6">
                 <a:lumMod val="60000"/>
                 <a:lumOff val="40000"/>
               </a:schemeClr>
             </a:solidFill>
+            <a:miter lim="800000"/>
+            <a:headEnd/>
+            <a:tailEnd/>
           </a:ln>
+          <a:effectLst/>
         </p:spPr>
       </p:pic>
-      <p:sp>
-        <p:nvSpPr>
-          <p:cNvPr id="7" name="ZoneTexte 6"/>
-          <p:cNvSpPr txBox="1"/>
-          <p:nvPr/>
-        </p:nvSpPr>
-        <p:spPr>
-          <a:xfrm>
-            <a:off x="642910" y="1214426"/>
-            <a:ext cx="2903359" cy="369332"/>
-          </a:xfrm>
-          <a:prstGeom prst="rect">
-            <a:avLst/>
-          </a:prstGeom>
-          <a:noFill/>
-        </p:spPr>
-        <p:txBody>
-          <a:bodyPr wrap="none" rtlCol="0">
-            <a:spAutoFit/>
-          </a:bodyPr>
-          <a:lstStyle/>
-          <a:p>
-            <a:r>
-              <a:rPr lang="fr-FR" dirty="0" smtClean="0"/>
-              <a:t>Détecteur de mouvement :</a:t>
-            </a:r>
-            <a:endParaRPr lang="fr-FR" dirty="0"/>
-          </a:p>
-        </p:txBody>
-      </p:sp>
       <p:pic>
         <p:nvPicPr>
-          <p:cNvPr id="2050" name="Picture 2"/>
+          <p:cNvPr id="1032" name="Picture 8"/>
           <p:cNvPicPr>
             <a:picLocks noChangeAspect="1" noChangeArrowheads="1"/>
           </p:cNvPicPr>
@@ -5109,8 +5186,46 @@
         </p:blipFill>
         <p:spPr bwMode="auto">
           <a:xfrm>
-            <a:off x="5072066" y="2143120"/>
-            <a:ext cx="2071702" cy="2610235"/>
+            <a:off x="1357290" y="4429136"/>
+            <a:ext cx="2933697" cy="1150553"/>
+          </a:xfrm>
+          <a:prstGeom prst="rect">
+            <a:avLst/>
+          </a:prstGeom>
+          <a:noFill/>
+          <a:ln w="9525">
+            <a:solidFill>
+              <a:schemeClr val="accent6">
+                <a:lumMod val="60000"/>
+                <a:lumOff val="40000"/>
+              </a:schemeClr>
+            </a:solidFill>
+            <a:miter lim="800000"/>
+            <a:headEnd/>
+            <a:tailEnd/>
+          </a:ln>
+          <a:effectLst/>
+        </p:spPr>
+      </p:pic>
+      <p:pic>
+        <p:nvPicPr>
+          <p:cNvPr id="1026" name="Picture 2"/>
+          <p:cNvPicPr>
+            <a:picLocks noChangeAspect="1" noChangeArrowheads="1"/>
+          </p:cNvPicPr>
+          <p:nvPr/>
+        </p:nvPicPr>
+        <p:blipFill>
+          <a:blip r:embed="rId5"/>
+          <a:srcRect/>
+          <a:stretch>
+            <a:fillRect/>
+          </a:stretch>
+        </p:blipFill>
+        <p:spPr bwMode="auto">
+          <a:xfrm>
+            <a:off x="6786578" y="2714624"/>
+            <a:ext cx="1643074" cy="2547000"/>
           </a:xfrm>
           <a:prstGeom prst="rect">
             <a:avLst/>
@@ -5164,7 +5279,7 @@
       </p:grpSpPr>
       <p:sp>
         <p:nvSpPr>
-          <p:cNvPr id="5" name="Titre 1"/>
+          <p:cNvPr id="2" name="Titre 1"/>
           <p:cNvSpPr>
             <a:spLocks noGrp="1"/>
           </p:cNvSpPr>
@@ -5172,12 +5287,7 @@
             <p:ph type="title"/>
           </p:nvPr>
         </p:nvSpPr>
-        <p:spPr>
-          <a:xfrm>
-            <a:off x="457200" y="228866"/>
-            <a:ext cx="7467600" cy="952500"/>
-          </a:xfrm>
-        </p:spPr>
+        <p:spPr/>
         <p:txBody>
           <a:bodyPr/>
           <a:lstStyle/>
@@ -5190,46 +5300,16 @@
           </a:p>
         </p:txBody>
       </p:sp>
-      <p:sp>
-        <p:nvSpPr>
-          <p:cNvPr id="6" name="ZoneTexte 5"/>
-          <p:cNvSpPr txBox="1"/>
-          <p:nvPr/>
-        </p:nvSpPr>
-        <p:spPr>
-          <a:xfrm>
-            <a:off x="642910" y="1214426"/>
-            <a:ext cx="2236510" cy="369332"/>
-          </a:xfrm>
-          <a:prstGeom prst="rect">
-            <a:avLst/>
-          </a:prstGeom>
-          <a:noFill/>
-        </p:spPr>
-        <p:txBody>
-          <a:bodyPr wrap="none" rtlCol="0">
-            <a:spAutoFit/>
-          </a:bodyPr>
-          <a:lstStyle/>
-          <a:p>
-            <a:r>
-              <a:rPr lang="fr-FR" dirty="0" smtClean="0"/>
-              <a:t>Détecteur incendie :</a:t>
-            </a:r>
-            <a:endParaRPr lang="fr-FR" dirty="0"/>
-          </a:p>
-        </p:txBody>
-      </p:sp>
       <p:pic>
         <p:nvPicPr>
-          <p:cNvPr id="1028" name="Picture 4"/>
+          <p:cNvPr id="26626" name="Picture 2" descr="Q:\domotique\capteur-de-mouvement-pir-grove.jpg"/>
           <p:cNvPicPr>
             <a:picLocks noChangeAspect="1" noChangeArrowheads="1"/>
           </p:cNvPicPr>
           <p:nvPr/>
         </p:nvPicPr>
         <p:blipFill>
-          <a:blip r:embed="rId2"/>
+          <a:blip r:embed="rId2" cstate="print"/>
           <a:srcRect/>
           <a:stretch>
             <a:fillRect/>
@@ -5237,37 +5317,33 @@
         </p:blipFill>
         <p:spPr bwMode="auto">
           <a:xfrm>
-            <a:off x="3286116" y="2786062"/>
-            <a:ext cx="2459215" cy="1014335"/>
+            <a:off x="571472" y="2000244"/>
+            <a:ext cx="1219184" cy="1219184"/>
           </a:xfrm>
           <a:prstGeom prst="rect">
             <a:avLst/>
           </a:prstGeom>
           <a:noFill/>
-          <a:ln w="9525">
+          <a:ln>
             <a:solidFill>
               <a:schemeClr val="accent6">
                 <a:lumMod val="60000"/>
                 <a:lumOff val="40000"/>
               </a:schemeClr>
             </a:solidFill>
-            <a:miter lim="800000"/>
-            <a:headEnd/>
-            <a:tailEnd/>
           </a:ln>
-          <a:effectLst/>
         </p:spPr>
       </p:pic>
       <p:pic>
         <p:nvPicPr>
-          <p:cNvPr id="1030" name="Picture 6"/>
+          <p:cNvPr id="26628" name="Picture 4" descr="Q:\Projet_Domotique_GITBTS\Materiels\Benjamin\CapteurMouv\schema.png"/>
           <p:cNvPicPr>
             <a:picLocks noChangeAspect="1" noChangeArrowheads="1"/>
           </p:cNvPicPr>
           <p:nvPr/>
         </p:nvPicPr>
         <p:blipFill>
-          <a:blip r:embed="rId3" cstate="print"/>
+          <a:blip r:embed="rId3"/>
           <a:srcRect/>
           <a:stretch>
             <a:fillRect/>
@@ -5275,30 +5351,56 @@
         </p:blipFill>
         <p:spPr bwMode="auto">
           <a:xfrm>
-            <a:off x="642910" y="1785930"/>
-            <a:ext cx="1457521" cy="2181203"/>
+            <a:off x="571472" y="3500442"/>
+            <a:ext cx="3000396" cy="1494338"/>
           </a:xfrm>
           <a:prstGeom prst="rect">
             <a:avLst/>
           </a:prstGeom>
           <a:noFill/>
-          <a:ln w="9525">
+          <a:ln>
             <a:solidFill>
               <a:schemeClr val="accent6">
                 <a:lumMod val="60000"/>
                 <a:lumOff val="40000"/>
               </a:schemeClr>
             </a:solidFill>
-            <a:miter lim="800000"/>
-            <a:headEnd/>
-            <a:tailEnd/>
           </a:ln>
-          <a:effectLst/>
         </p:spPr>
       </p:pic>
+      <p:sp>
+        <p:nvSpPr>
+          <p:cNvPr id="7" name="ZoneTexte 6"/>
+          <p:cNvSpPr txBox="1"/>
+          <p:nvPr/>
+        </p:nvSpPr>
+        <p:spPr>
+          <a:xfrm>
+            <a:off x="642910" y="1214426"/>
+            <a:ext cx="2903359" cy="369332"/>
+          </a:xfrm>
+          <a:prstGeom prst="rect">
+            <a:avLst/>
+          </a:prstGeom>
+          <a:noFill/>
+        </p:spPr>
+        <p:txBody>
+          <a:bodyPr wrap="none" rtlCol="0">
+            <a:spAutoFit/>
+          </a:bodyPr>
+          <a:lstStyle/>
+          <a:p>
+            <a:r>
+              <a:rPr lang="fr-FR" dirty="0" smtClean="0"/>
+              <a:t>Détecteur de mouvement :</a:t>
+            </a:r>
+            <a:endParaRPr lang="fr-FR" dirty="0"/>
+          </a:p>
+        </p:txBody>
+      </p:sp>
       <p:pic>
         <p:nvPicPr>
-          <p:cNvPr id="1032" name="Picture 8"/>
+          <p:cNvPr id="2050" name="Picture 2"/>
           <p:cNvPicPr>
             <a:picLocks noChangeAspect="1" noChangeArrowheads="1"/>
           </p:cNvPicPr>
@@ -5313,46 +5415,8 @@
         </p:blipFill>
         <p:spPr bwMode="auto">
           <a:xfrm>
-            <a:off x="1357290" y="4429136"/>
-            <a:ext cx="2933697" cy="1150553"/>
-          </a:xfrm>
-          <a:prstGeom prst="rect">
-            <a:avLst/>
-          </a:prstGeom>
-          <a:noFill/>
-          <a:ln w="9525">
-            <a:solidFill>
-              <a:schemeClr val="accent6">
-                <a:lumMod val="60000"/>
-                <a:lumOff val="40000"/>
-              </a:schemeClr>
-            </a:solidFill>
-            <a:miter lim="800000"/>
-            <a:headEnd/>
-            <a:tailEnd/>
-          </a:ln>
-          <a:effectLst/>
-        </p:spPr>
-      </p:pic>
-      <p:pic>
-        <p:nvPicPr>
-          <p:cNvPr id="1026" name="Picture 2"/>
-          <p:cNvPicPr>
-            <a:picLocks noChangeAspect="1" noChangeArrowheads="1"/>
-          </p:cNvPicPr>
-          <p:nvPr/>
-        </p:nvPicPr>
-        <p:blipFill>
-          <a:blip r:embed="rId5"/>
-          <a:srcRect/>
-          <a:stretch>
-            <a:fillRect/>
-          </a:stretch>
-        </p:blipFill>
-        <p:spPr bwMode="auto">
-          <a:xfrm>
-            <a:off x="6786578" y="2714624"/>
-            <a:ext cx="1643074" cy="2547000"/>
+            <a:off x="5072066" y="2143120"/>
+            <a:ext cx="2071702" cy="2610235"/>
           </a:xfrm>
           <a:prstGeom prst="rect">
             <a:avLst/>
@@ -5797,9 +5861,47 @@
           <a:chExt cx="0" cy="0"/>
         </a:xfrm>
       </p:grpSpPr>
-      <p:sp>
-        <p:nvSpPr>
-          <p:cNvPr id="2" name="Titre 1"/>
+      <p:pic>
+        <p:nvPicPr>
+          <p:cNvPr id="1026" name="Picture 2"/>
+          <p:cNvPicPr>
+            <a:picLocks noChangeAspect="1" noChangeArrowheads="1"/>
+          </p:cNvPicPr>
+          <p:nvPr/>
+        </p:nvPicPr>
+        <p:blipFill>
+          <a:blip r:embed="rId2"/>
+          <a:srcRect/>
+          <a:stretch>
+            <a:fillRect/>
+          </a:stretch>
+        </p:blipFill>
+        <p:spPr bwMode="auto">
+          <a:xfrm>
+            <a:off x="5857884" y="2643186"/>
+            <a:ext cx="3186114" cy="2945455"/>
+          </a:xfrm>
+          <a:prstGeom prst="rect">
+            <a:avLst/>
+          </a:prstGeom>
+          <a:noFill/>
+          <a:ln w="9525">
+            <a:solidFill>
+              <a:schemeClr val="accent6">
+                <a:lumMod val="60000"/>
+                <a:lumOff val="40000"/>
+              </a:schemeClr>
+            </a:solidFill>
+            <a:miter lim="800000"/>
+            <a:headEnd/>
+            <a:tailEnd/>
+          </a:ln>
+          <a:effectLst/>
+        </p:spPr>
+      </p:pic>
+      <p:sp>
+        <p:nvSpPr>
+          <p:cNvPr id="6" name="Titre 1"/>
           <p:cNvSpPr>
             <a:spLocks noGrp="1"/>
           </p:cNvSpPr>
@@ -5807,31 +5909,302 @@
             <p:ph type="title"/>
           </p:nvPr>
         </p:nvSpPr>
-        <p:spPr/>
-        <p:txBody>
-          <a:bodyPr/>
+        <p:spPr>
+          <a:xfrm>
+            <a:off x="457200" y="228866"/>
+            <a:ext cx="8043890" cy="952500"/>
+          </a:xfrm>
+        </p:spPr>
+        <p:txBody>
+          <a:bodyPr>
+            <a:normAutofit fontScale="90000"/>
+          </a:bodyPr>
           <a:lstStyle/>
           <a:p>
-            <a:endParaRPr lang="fr-FR"/>
-          </a:p>
-        </p:txBody>
-      </p:sp>
-      <p:sp>
-        <p:nvSpPr>
-          <p:cNvPr id="3" name="Espace réservé du contenu 2"/>
+            <a:r>
+              <a:rPr lang="fr-FR" dirty="0" smtClean="0"/>
+              <a:t>Tests unitaires : Gestion des volets</a:t>
+            </a:r>
+            <a:endParaRPr lang="fr-FR" dirty="0"/>
+          </a:p>
+        </p:txBody>
+      </p:sp>
+      <p:sp>
+        <p:nvSpPr>
+          <p:cNvPr id="7" name="ZoneTexte 6"/>
+          <p:cNvSpPr txBox="1"/>
+          <p:nvPr/>
+        </p:nvSpPr>
+        <p:spPr>
+          <a:xfrm>
+            <a:off x="642910" y="1214426"/>
+            <a:ext cx="1685141" cy="369332"/>
+          </a:xfrm>
+          <a:prstGeom prst="rect">
+            <a:avLst/>
+          </a:prstGeom>
+          <a:noFill/>
+        </p:spPr>
+        <p:txBody>
+          <a:bodyPr wrap="none" rtlCol="0">
+            <a:spAutoFit/>
+          </a:bodyPr>
+          <a:lstStyle/>
+          <a:p>
+            <a:r>
+              <a:rPr lang="fr-FR" dirty="0" smtClean="0"/>
+              <a:t>Volet Roulant :</a:t>
+            </a:r>
+            <a:endParaRPr lang="fr-FR" dirty="0"/>
+          </a:p>
+        </p:txBody>
+      </p:sp>
+      <p:pic>
+        <p:nvPicPr>
+          <p:cNvPr id="1027" name="Picture 3"/>
+          <p:cNvPicPr>
+            <a:picLocks noChangeAspect="1" noChangeArrowheads="1"/>
+          </p:cNvPicPr>
+          <p:nvPr/>
+        </p:nvPicPr>
+        <p:blipFill>
+          <a:blip r:embed="rId3"/>
+          <a:srcRect/>
+          <a:stretch>
+            <a:fillRect/>
+          </a:stretch>
+        </p:blipFill>
+        <p:spPr bwMode="auto">
+          <a:xfrm>
+            <a:off x="3214678" y="2643186"/>
+            <a:ext cx="2214578" cy="2981163"/>
+          </a:xfrm>
+          <a:prstGeom prst="rect">
+            <a:avLst/>
+          </a:prstGeom>
+          <a:noFill/>
+          <a:ln w="9525">
+            <a:solidFill>
+              <a:schemeClr val="accent6">
+                <a:lumMod val="60000"/>
+                <a:lumOff val="40000"/>
+              </a:schemeClr>
+            </a:solidFill>
+            <a:miter lim="800000"/>
+            <a:headEnd/>
+            <a:tailEnd/>
+          </a:ln>
+          <a:effectLst/>
+        </p:spPr>
+      </p:pic>
+      <p:pic>
+        <p:nvPicPr>
+          <p:cNvPr id="1028" name="Picture 4"/>
+          <p:cNvPicPr>
+            <a:picLocks noChangeAspect="1" noChangeArrowheads="1"/>
+          </p:cNvPicPr>
+          <p:nvPr/>
+        </p:nvPicPr>
+        <p:blipFill>
+          <a:blip r:embed="rId4" cstate="print"/>
+          <a:srcRect/>
+          <a:stretch>
+            <a:fillRect/>
+          </a:stretch>
+        </p:blipFill>
+        <p:spPr bwMode="auto">
+          <a:xfrm>
+            <a:off x="357158" y="2143120"/>
+            <a:ext cx="2357454" cy="1828419"/>
+          </a:xfrm>
+          <a:prstGeom prst="rect">
+            <a:avLst/>
+          </a:prstGeom>
+          <a:noFill/>
+          <a:ln w="9525">
+            <a:solidFill>
+              <a:schemeClr val="accent6">
+                <a:lumMod val="60000"/>
+                <a:lumOff val="40000"/>
+              </a:schemeClr>
+            </a:solidFill>
+            <a:miter lim="800000"/>
+            <a:headEnd/>
+            <a:tailEnd/>
+          </a:ln>
+          <a:effectLst/>
+        </p:spPr>
+      </p:pic>
+    </p:spTree>
+  </p:cSld>
+  <p:clrMapOvr>
+    <a:masterClrMapping/>
+  </p:clrMapOvr>
+</p:sld>
+</file>
+
+<file path=ppt/slides/slide19.xml><?xml version="1.0" encoding="utf-8"?>
+<p:sld xmlns:a="http://schemas.openxmlformats.org/drawingml/2006/main" xmlns:r="http://schemas.openxmlformats.org/officeDocument/2006/relationships" xmlns:p="http://schemas.openxmlformats.org/presentationml/2006/main">
+  <p:cSld>
+    <p:spTree>
+      <p:nvGrpSpPr>
+        <p:cNvPr id="1" name=""/>
+        <p:cNvGrpSpPr/>
+        <p:nvPr/>
+      </p:nvGrpSpPr>
+      <p:grpSpPr>
+        <a:xfrm>
+          <a:off x="0" y="0"/>
+          <a:ext cx="0" cy="0"/>
+          <a:chOff x="0" y="0"/>
+          <a:chExt cx="0" cy="0"/>
+        </a:xfrm>
+      </p:grpSpPr>
+      <p:sp>
+        <p:nvSpPr>
+          <p:cNvPr id="4" name="Titre 1"/>
           <p:cNvSpPr>
             <a:spLocks noGrp="1"/>
           </p:cNvSpPr>
           <p:nvPr>
-            <p:ph idx="1"/>
+            <p:ph type="title"/>
           </p:nvPr>
         </p:nvSpPr>
-        <p:spPr/>
-        <p:txBody>
-          <a:bodyPr/>
+        <p:spPr>
+          <a:xfrm>
+            <a:off x="285720" y="214294"/>
+            <a:ext cx="8686800" cy="952500"/>
+          </a:xfrm>
+        </p:spPr>
+        <p:txBody>
+          <a:bodyPr>
+            <a:normAutofit/>
+          </a:bodyPr>
           <a:lstStyle/>
           <a:p>
-            <a:endParaRPr lang="fr-FR"/>
+            <a:r>
+              <a:rPr lang="fr-FR" dirty="0" smtClean="0"/>
+              <a:t>Tests </a:t>
+            </a:r>
+            <a:r>
+              <a:rPr lang="fr-FR" dirty="0" smtClean="0"/>
+              <a:t>d’intégration </a:t>
+            </a:r>
+            <a:r>
+              <a:rPr lang="fr-FR" dirty="0" smtClean="0"/>
+              <a:t>: </a:t>
+            </a:r>
+            <a:r>
+              <a:rPr lang="fr-FR" dirty="0" smtClean="0"/>
+              <a:t>Confort</a:t>
+            </a:r>
+            <a:endParaRPr lang="fr-FR" dirty="0"/>
+          </a:p>
+        </p:txBody>
+      </p:sp>
+      <p:pic>
+        <p:nvPicPr>
+          <p:cNvPr id="2050" name="Picture 2"/>
+          <p:cNvPicPr>
+            <a:picLocks noChangeAspect="1" noChangeArrowheads="1"/>
+          </p:cNvPicPr>
+          <p:nvPr/>
+        </p:nvPicPr>
+        <p:blipFill>
+          <a:blip r:embed="rId2"/>
+          <a:srcRect/>
+          <a:stretch>
+            <a:fillRect/>
+          </a:stretch>
+        </p:blipFill>
+        <p:spPr bwMode="auto">
+          <a:xfrm>
+            <a:off x="642910" y="2214558"/>
+            <a:ext cx="2758183" cy="3105124"/>
+          </a:xfrm>
+          <a:prstGeom prst="rect">
+            <a:avLst/>
+          </a:prstGeom>
+          <a:noFill/>
+          <a:ln w="9525">
+            <a:solidFill>
+              <a:schemeClr val="accent6">
+                <a:lumMod val="60000"/>
+                <a:lumOff val="40000"/>
+              </a:schemeClr>
+            </a:solidFill>
+            <a:miter lim="800000"/>
+            <a:headEnd/>
+            <a:tailEnd/>
+          </a:ln>
+          <a:effectLst/>
+        </p:spPr>
+      </p:pic>
+      <p:pic>
+        <p:nvPicPr>
+          <p:cNvPr id="2051" name="Picture 3"/>
+          <p:cNvPicPr>
+            <a:picLocks noChangeAspect="1" noChangeArrowheads="1"/>
+          </p:cNvPicPr>
+          <p:nvPr/>
+        </p:nvPicPr>
+        <p:blipFill>
+          <a:blip r:embed="rId3"/>
+          <a:srcRect/>
+          <a:stretch>
+            <a:fillRect/>
+          </a:stretch>
+        </p:blipFill>
+        <p:spPr bwMode="auto">
+          <a:xfrm>
+            <a:off x="4500562" y="2500310"/>
+            <a:ext cx="4015686" cy="2571748"/>
+          </a:xfrm>
+          <a:prstGeom prst="rect">
+            <a:avLst/>
+          </a:prstGeom>
+          <a:noFill/>
+          <a:ln w="9525">
+            <a:solidFill>
+              <a:schemeClr val="accent6">
+                <a:lumMod val="60000"/>
+                <a:lumOff val="40000"/>
+              </a:schemeClr>
+            </a:solidFill>
+            <a:miter lim="800000"/>
+            <a:headEnd/>
+            <a:tailEnd/>
+          </a:ln>
+          <a:effectLst/>
+        </p:spPr>
+      </p:pic>
+      <p:sp>
+        <p:nvSpPr>
+          <p:cNvPr id="7" name="ZoneTexte 6"/>
+          <p:cNvSpPr txBox="1"/>
+          <p:nvPr/>
+        </p:nvSpPr>
+        <p:spPr>
+          <a:xfrm>
+            <a:off x="642910" y="1214426"/>
+            <a:ext cx="5019387" cy="369332"/>
+          </a:xfrm>
+          <a:prstGeom prst="rect">
+            <a:avLst/>
+          </a:prstGeom>
+          <a:noFill/>
+        </p:spPr>
+        <p:txBody>
+          <a:bodyPr wrap="none" rtlCol="0">
+            <a:spAutoFit/>
+          </a:bodyPr>
+          <a:lstStyle/>
+          <a:p>
+            <a:r>
+              <a:rPr lang="fr-FR" dirty="0" smtClean="0"/>
+              <a:t>Volet Roulant, Capteur de luminosité, Lumière :</a:t>
+            </a:r>
+            <a:endParaRPr lang="fr-FR" dirty="0"/>
           </a:p>
         </p:txBody>
       </p:sp>
@@ -9612,6 +9985,39 @@
           </a:effectLst>
         </p:spPr>
       </p:pic>
+      <p:pic>
+        <p:nvPicPr>
+          <p:cNvPr id="3074" name="Picture 2"/>
+          <p:cNvPicPr>
+            <a:picLocks noChangeAspect="1" noChangeArrowheads="1"/>
+          </p:cNvPicPr>
+          <p:nvPr/>
+        </p:nvPicPr>
+        <p:blipFill>
+          <a:blip r:embed="rId3"/>
+          <a:srcRect/>
+          <a:stretch>
+            <a:fillRect/>
+          </a:stretch>
+        </p:blipFill>
+        <p:spPr bwMode="auto">
+          <a:xfrm>
+            <a:off x="1142976" y="1214426"/>
+            <a:ext cx="1000132" cy="139091"/>
+          </a:xfrm>
+          <a:prstGeom prst="rect">
+            <a:avLst/>
+          </a:prstGeom>
+          <a:noFill/>
+          <a:ln w="9525">
+            <a:noFill/>
+            <a:miter lim="800000"/>
+            <a:headEnd/>
+            <a:tailEnd/>
+          </a:ln>
+          <a:effectLst/>
+        </p:spPr>
+      </p:pic>
     </p:spTree>
   </p:cSld>
   <p:clrMapOvr>

</xml_diff>

<commit_message>
MAJ 15/03/2018 Signed-off-by: DrBlaf <chauveau.aurelien.76@gmail.com>
</commit_message>
<xml_diff>
--- a/Rapport/Benjamin/RevueDeProjet.pptx
+++ b/Rapport/Benjamin/RevueDeProjet.pptx
@@ -2,7 +2,7 @@
 <file path=ppt/presentation.xml><?xml version="1.0" encoding="utf-8"?>
 <p:presentation xmlns:a="http://schemas.openxmlformats.org/drawingml/2006/main" xmlns:r="http://schemas.openxmlformats.org/officeDocument/2006/relationships" xmlns:p="http://schemas.openxmlformats.org/presentationml/2006/main" saveSubsetFonts="1">
   <p:sldMasterIdLst>
-    <p:sldMasterId id="2147483828" r:id="rId1"/>
+    <p:sldMasterId id="2147484080" r:id="rId1"/>
   </p:sldMasterIdLst>
   <p:sldIdLst>
     <p:sldId id="256" r:id="rId2"/>
@@ -254,7 +254,7 @@
         </p:nvSpPr>
         <p:spPr bwMode="auto">
           <a:xfrm>
-            <a:off x="6105527" y="0"/>
+            <a:off x="6105526" y="0"/>
             <a:ext cx="3038475" cy="5715000"/>
           </a:xfrm>
           <a:custGeom>
@@ -510,7 +510,7 @@
             <a:fld id="{7385B5F2-299D-41E4-81B4-55AECBC730DC}" type="datetimeFigureOut">
               <a:rPr lang="fr-FR" smtClean="0"/>
               <a:pPr/>
-              <a:t>14/03/2018</a:t>
+              <a:t>15/03/2018</a:t>
             </a:fld>
             <a:endParaRPr lang="fr-FR"/>
           </a:p>
@@ -677,7 +677,7 @@
             <a:fld id="{7385B5F2-299D-41E4-81B4-55AECBC730DC}" type="datetimeFigureOut">
               <a:rPr lang="fr-FR" smtClean="0"/>
               <a:pPr/>
-              <a:t>14/03/2018</a:t>
+              <a:t>15/03/2018</a:t>
             </a:fld>
             <a:endParaRPr lang="fr-FR"/>
           </a:p>
@@ -763,7 +763,7 @@
         </p:nvSpPr>
         <p:spPr>
           <a:xfrm>
-            <a:off x="6629400" y="228866"/>
+            <a:off x="6629400" y="228865"/>
             <a:ext cx="2057400" cy="4876271"/>
           </a:xfrm>
         </p:spPr>
@@ -791,7 +791,7 @@
         </p:nvSpPr>
         <p:spPr>
           <a:xfrm>
-            <a:off x="457200" y="228866"/>
+            <a:off x="457200" y="228865"/>
             <a:ext cx="6019800" cy="4876271"/>
           </a:xfrm>
         </p:spPr>
@@ -854,7 +854,7 @@
             <a:fld id="{7385B5F2-299D-41E4-81B4-55AECBC730DC}" type="datetimeFigureOut">
               <a:rPr lang="fr-FR" smtClean="0"/>
               <a:pPr/>
-              <a:t>14/03/2018</a:t>
+              <a:t>15/03/2018</a:t>
             </a:fld>
             <a:endParaRPr lang="fr-FR"/>
           </a:p>
@@ -1025,7 +1025,7 @@
             <a:fld id="{7385B5F2-299D-41E4-81B4-55AECBC730DC}" type="datetimeFigureOut">
               <a:rPr lang="fr-FR" smtClean="0"/>
               <a:pPr/>
-              <a:t>14/03/2018</a:t>
+              <a:t>15/03/2018</a:t>
             </a:fld>
             <a:endParaRPr lang="fr-FR"/>
           </a:p>
@@ -1079,13 +1079,6 @@
   <p:clrMapOvr>
     <a:masterClrMapping/>
   </p:clrMapOvr>
-  <p:timing>
-    <p:tnLst>
-      <p:par>
-        <p:cTn id="1" dur="indefinite" restart="never" nodeType="tmRoot"/>
-      </p:par>
-    </p:tnLst>
-  </p:timing>
 </p:sldLayout>
 </file>
 
@@ -1218,7 +1211,7 @@
         </p:nvSpPr>
         <p:spPr bwMode="auto">
           <a:xfrm>
-            <a:off x="6105527" y="0"/>
+            <a:off x="6105526" y="0"/>
             <a:ext cx="3038475" cy="5715000"/>
           </a:xfrm>
           <a:custGeom>
@@ -1489,7 +1482,7 @@
             <a:fld id="{7385B5F2-299D-41E4-81B4-55AECBC730DC}" type="datetimeFigureOut">
               <a:rPr lang="fr-FR" smtClean="0"/>
               <a:pPr/>
-              <a:t>14/03/2018</a:t>
+              <a:t>15/03/2018</a:t>
             </a:fld>
             <a:endParaRPr lang="fr-FR"/>
           </a:p>
@@ -1575,7 +1568,7 @@
         </p:nvSpPr>
         <p:spPr>
           <a:xfrm>
-            <a:off x="457200" y="228866"/>
+            <a:off x="457200" y="228865"/>
             <a:ext cx="7467600" cy="952500"/>
           </a:xfrm>
         </p:spPr>
@@ -1603,7 +1596,7 @@
         </p:nvSpPr>
         <p:spPr>
           <a:xfrm>
-            <a:off x="457200" y="1333501"/>
+            <a:off x="457200" y="1333500"/>
             <a:ext cx="3657600" cy="3771636"/>
           </a:xfrm>
         </p:spPr>
@@ -1676,7 +1669,7 @@
         </p:nvSpPr>
         <p:spPr>
           <a:xfrm>
-            <a:off x="4267200" y="1333501"/>
+            <a:off x="4267200" y="1333500"/>
             <a:ext cx="3657600" cy="3771636"/>
           </a:xfrm>
         </p:spPr>
@@ -1755,7 +1748,7 @@
             <a:fld id="{7385B5F2-299D-41E4-81B4-55AECBC730DC}" type="datetimeFigureOut">
               <a:rPr lang="fr-FR" smtClean="0"/>
               <a:pPr/>
-              <a:t>14/03/2018</a:t>
+              <a:t>15/03/2018</a:t>
             </a:fld>
             <a:endParaRPr lang="fr-FR"/>
           </a:p>
@@ -1926,7 +1919,7 @@
         </p:nvSpPr>
         <p:spPr>
           <a:xfrm>
-            <a:off x="4645027" y="4572000"/>
+            <a:off x="4645026" y="4572000"/>
             <a:ext cx="4041775" cy="698500"/>
           </a:xfrm>
         </p:spPr>
@@ -1979,8 +1972,8 @@
         </p:nvSpPr>
         <p:spPr>
           <a:xfrm>
-            <a:off x="457200" y="1264095"/>
-            <a:ext cx="4040188" cy="3284802"/>
+            <a:off x="457200" y="1264094"/>
+            <a:ext cx="4040188" cy="3284803"/>
           </a:xfrm>
         </p:spPr>
         <p:txBody>
@@ -2052,8 +2045,8 @@
         </p:nvSpPr>
         <p:spPr>
           <a:xfrm>
-            <a:off x="4645027" y="1264095"/>
-            <a:ext cx="4041775" cy="3284802"/>
+            <a:off x="4645026" y="1264094"/>
+            <a:ext cx="4041775" cy="3284803"/>
           </a:xfrm>
         </p:spPr>
         <p:txBody>
@@ -2131,7 +2124,7 @@
             <a:fld id="{7385B5F2-299D-41E4-81B4-55AECBC730DC}" type="datetimeFigureOut">
               <a:rPr lang="fr-FR" smtClean="0"/>
               <a:pPr/>
-              <a:t>14/03/2018</a:t>
+              <a:t>15/03/2018</a:t>
             </a:fld>
             <a:endParaRPr lang="fr-FR"/>
           </a:p>
@@ -2255,7 +2248,7 @@
             <a:fld id="{7385B5F2-299D-41E4-81B4-55AECBC730DC}" type="datetimeFigureOut">
               <a:rPr lang="fr-FR" smtClean="0"/>
               <a:pPr/>
-              <a:t>14/03/2018</a:t>
+              <a:t>15/03/2018</a:t>
             </a:fld>
             <a:endParaRPr lang="fr-FR"/>
           </a:p>
@@ -2347,7 +2340,7 @@
             <a:fld id="{7385B5F2-299D-41E4-81B4-55AECBC730DC}" type="datetimeFigureOut">
               <a:rPr lang="fr-FR" smtClean="0"/>
               <a:pPr/>
-              <a:t>14/03/2018</a:t>
+              <a:t>15/03/2018</a:t>
             </a:fld>
             <a:endParaRPr lang="fr-FR"/>
           </a:p>
@@ -2598,7 +2591,7 @@
             <a:fld id="{7385B5F2-299D-41E4-81B4-55AECBC730DC}" type="datetimeFigureOut">
               <a:rPr lang="fr-FR" smtClean="0"/>
               <a:pPr/>
-              <a:t>14/03/2018</a:t>
+              <a:t>15/03/2018</a:t>
             </a:fld>
             <a:endParaRPr lang="fr-FR"/>
           </a:p>
@@ -2726,7 +2719,7 @@
         </p:nvSpPr>
         <p:spPr>
           <a:xfrm>
-            <a:off x="1065628" y="849922"/>
+            <a:off x="1065628" y="849923"/>
             <a:ext cx="4114800" cy="3429000"/>
           </a:xfrm>
           <a:prstGeom prst="ellipse">
@@ -2795,7 +2788,7 @@
         <p:spPr>
           <a:xfrm>
             <a:off x="5556734" y="2498971"/>
-            <a:ext cx="3053866" cy="2219569"/>
+            <a:ext cx="3053866" cy="2219568"/>
           </a:xfrm>
         </p:spPr>
         <p:txBody>
@@ -2859,7 +2852,7 @@
             <a:fld id="{7385B5F2-299D-41E4-81B4-55AECBC730DC}" type="datetimeFigureOut">
               <a:rPr lang="fr-FR" smtClean="0"/>
               <a:pPr/>
-              <a:t>14/03/2018</a:t>
+              <a:t>15/03/2018</a:t>
             </a:fld>
             <a:endParaRPr lang="fr-FR"/>
           </a:p>
@@ -3146,7 +3139,7 @@
         </p:nvSpPr>
         <p:spPr>
           <a:xfrm>
-            <a:off x="457200" y="228866"/>
+            <a:off x="457200" y="228865"/>
             <a:ext cx="7467600" cy="952500"/>
           </a:xfrm>
           <a:prstGeom prst="rect">
@@ -3179,7 +3172,7 @@
         </p:nvSpPr>
         <p:spPr>
           <a:xfrm>
-            <a:off x="457200" y="1333501"/>
+            <a:off x="457200" y="1333500"/>
             <a:ext cx="7467600" cy="3771636"/>
           </a:xfrm>
           <a:prstGeom prst="rect">
@@ -3265,7 +3258,7 @@
             <a:fld id="{7385B5F2-299D-41E4-81B4-55AECBC730DC}" type="datetimeFigureOut">
               <a:rPr lang="fr-FR" smtClean="0"/>
               <a:pPr/>
-              <a:t>14/03/2018</a:t>
+              <a:t>15/03/2018</a:t>
             </a:fld>
             <a:endParaRPr lang="fr-FR"/>
           </a:p>
@@ -3354,17 +3347,17 @@
   </p:cSld>
   <p:clrMap bg1="dk1" tx1="lt1" bg2="dk2" tx2="lt2" accent1="accent1" accent2="accent2" accent3="accent3" accent4="accent4" accent5="accent5" accent6="accent6" hlink="hlink" folHlink="folHlink"/>
   <p:sldLayoutIdLst>
-    <p:sldLayoutId id="2147483829" r:id="rId1"/>
-    <p:sldLayoutId id="2147483830" r:id="rId2"/>
-    <p:sldLayoutId id="2147483831" r:id="rId3"/>
-    <p:sldLayoutId id="2147483832" r:id="rId4"/>
-    <p:sldLayoutId id="2147483833" r:id="rId5"/>
-    <p:sldLayoutId id="2147483834" r:id="rId6"/>
-    <p:sldLayoutId id="2147483835" r:id="rId7"/>
-    <p:sldLayoutId id="2147483836" r:id="rId8"/>
-    <p:sldLayoutId id="2147483837" r:id="rId9"/>
-    <p:sldLayoutId id="2147483838" r:id="rId10"/>
-    <p:sldLayoutId id="2147483839" r:id="rId11"/>
+    <p:sldLayoutId id="2147484081" r:id="rId1"/>
+    <p:sldLayoutId id="2147484082" r:id="rId2"/>
+    <p:sldLayoutId id="2147484083" r:id="rId3"/>
+    <p:sldLayoutId id="2147484084" r:id="rId4"/>
+    <p:sldLayoutId id="2147484085" r:id="rId5"/>
+    <p:sldLayoutId id="2147484086" r:id="rId6"/>
+    <p:sldLayoutId id="2147484087" r:id="rId7"/>
+    <p:sldLayoutId id="2147484088" r:id="rId8"/>
+    <p:sldLayoutId id="2147484089" r:id="rId9"/>
+    <p:sldLayoutId id="2147484090" r:id="rId10"/>
+    <p:sldLayoutId id="2147484091" r:id="rId11"/>
   </p:sldLayoutIdLst>
   <p:txStyles>
     <p:titleStyle>
@@ -3666,6 +3659,32 @@
           <a:chExt cx="0" cy="0"/>
         </a:xfrm>
       </p:grpSpPr>
+      <p:pic>
+        <p:nvPicPr>
+          <p:cNvPr id="1028" name="Picture 4" descr="Q:\Projet_Domotique_GITBTS\Logiciels\img\LOGO_domotique_blanc.png"/>
+          <p:cNvPicPr>
+            <a:picLocks noChangeAspect="1" noChangeArrowheads="1"/>
+          </p:cNvPicPr>
+          <p:nvPr/>
+        </p:nvPicPr>
+        <p:blipFill>
+          <a:blip r:embed="rId2"/>
+          <a:srcRect/>
+          <a:stretch>
+            <a:fillRect/>
+          </a:stretch>
+        </p:blipFill>
+        <p:spPr bwMode="auto">
+          <a:xfrm>
+            <a:off x="3071802" y="285732"/>
+            <a:ext cx="3000396" cy="3000397"/>
+          </a:xfrm>
+          <a:prstGeom prst="rect">
+            <a:avLst/>
+          </a:prstGeom>
+          <a:noFill/>
+        </p:spPr>
+      </p:pic>
       <p:sp>
         <p:nvSpPr>
           <p:cNvPr id="2" name="Titre 1"/>
@@ -3676,7 +3695,12 @@
             <p:ph type="ctrTitle"/>
           </p:nvPr>
         </p:nvSpPr>
-        <p:spPr/>
+        <p:spPr>
+          <a:xfrm>
+            <a:off x="928662" y="3500442"/>
+            <a:ext cx="6480048" cy="1917700"/>
+          </a:xfrm>
+        </p:spPr>
         <p:txBody>
           <a:bodyPr/>
           <a:lstStyle/>
@@ -3689,29 +3713,39 @@
           </a:p>
         </p:txBody>
       </p:sp>
-      <p:sp>
-        <p:nvSpPr>
-          <p:cNvPr id="3" name="Sous-titre 2"/>
-          <p:cNvSpPr>
-            <a:spLocks noGrp="1"/>
-          </p:cNvSpPr>
-          <p:nvPr>
-            <p:ph type="subTitle" idx="1"/>
-          </p:nvPr>
-        </p:nvSpPr>
-        <p:spPr/>
-        <p:txBody>
-          <a:bodyPr/>
-          <a:lstStyle/>
-          <a:p>
-            <a:r>
-              <a:rPr lang="fr-FR" dirty="0" smtClean="0"/>
-              <a:t>Revue de projet</a:t>
-            </a:r>
-            <a:endParaRPr lang="fr-FR" dirty="0"/>
-          </a:p>
-        </p:txBody>
-      </p:sp>
+      <p:pic>
+        <p:nvPicPr>
+          <p:cNvPr id="1030" name="Picture 6"/>
+          <p:cNvPicPr>
+            <a:picLocks noChangeAspect="1" noChangeArrowheads="1"/>
+          </p:cNvPicPr>
+          <p:nvPr/>
+        </p:nvPicPr>
+        <p:blipFill>
+          <a:blip r:embed="rId3"/>
+          <a:srcRect/>
+          <a:stretch>
+            <a:fillRect/>
+          </a:stretch>
+        </p:blipFill>
+        <p:spPr bwMode="auto">
+          <a:xfrm>
+            <a:off x="5929322" y="3143252"/>
+            <a:ext cx="190500" cy="180975"/>
+          </a:xfrm>
+          <a:prstGeom prst="rect">
+            <a:avLst/>
+          </a:prstGeom>
+          <a:noFill/>
+          <a:ln w="9525">
+            <a:noFill/>
+            <a:miter lim="800000"/>
+            <a:headEnd/>
+            <a:tailEnd/>
+          </a:ln>
+          <a:effectLst/>
+        </p:spPr>
+      </p:pic>
     </p:spTree>
   </p:cSld>
   <p:clrMapOvr>
@@ -3752,8 +3786,8 @@
         </p:nvSpPr>
         <p:spPr>
           <a:xfrm>
-            <a:off x="142844" y="71418"/>
-            <a:ext cx="4105611" cy="461665"/>
+            <a:off x="142846" y="71419"/>
+            <a:ext cx="3671133" cy="461665"/>
           </a:xfrm>
           <a:prstGeom prst="rect">
             <a:avLst/>
@@ -3827,9 +3861,9 @@
           <a:prstGeom prst="rect">
             <a:avLst/>
           </a:prstGeom>
-          <a:ln w="38100" cap="sq">
+          <a:ln w="28575" cap="sq">
             <a:solidFill>
-              <a:schemeClr val="accent2"/>
+              <a:srgbClr val="0070C0"/>
             </a:solidFill>
             <a:prstDash val="solid"/>
             <a:miter lim="800000"/>
@@ -3883,8 +3917,8 @@
         </p:nvSpPr>
         <p:spPr>
           <a:xfrm>
-            <a:off x="71406" y="71418"/>
-            <a:ext cx="4618572" cy="461665"/>
+            <a:off x="71406" y="71419"/>
+            <a:ext cx="4148572" cy="461665"/>
           </a:xfrm>
           <a:prstGeom prst="rect">
             <a:avLst/>
@@ -3958,9 +3992,9 @@
           <a:prstGeom prst="rect">
             <a:avLst/>
           </a:prstGeom>
-          <a:ln w="38100" cap="sq">
+          <a:ln w="28575" cap="sq">
             <a:solidFill>
-              <a:schemeClr val="accent2"/>
+              <a:srgbClr val="0070C0"/>
             </a:solidFill>
             <a:prstDash val="solid"/>
             <a:miter lim="800000"/>
@@ -3991,7 +4025,7 @@
         </p:blipFill>
         <p:spPr bwMode="auto">
           <a:xfrm>
-            <a:off x="1785918" y="1214426"/>
+            <a:off x="1785918" y="1214427"/>
             <a:ext cx="1000132" cy="139091"/>
           </a:xfrm>
           <a:prstGeom prst="rect">
@@ -4023,7 +4057,7 @@
 </file>
 
 <file path=ppt/slides/slide12.xml><?xml version="1.0" encoding="utf-8"?>
-<p:sld xmlns:a="http://schemas.openxmlformats.org/drawingml/2006/main" xmlns:r="http://schemas.openxmlformats.org/officeDocument/2006/relationships" xmlns:p="http://schemas.openxmlformats.org/presentationml/2006/main">
+<p:sld xmlns:a="http://schemas.openxmlformats.org/drawingml/2006/main" xmlns:r="http://schemas.openxmlformats.org/officeDocument/2006/relationships" xmlns:p="http://schemas.openxmlformats.org/presentationml/2006/main" show="0">
   <p:cSld>
     <p:spTree>
       <p:nvGrpSpPr>
@@ -4104,7 +4138,7 @@
         </p:nvSpPr>
         <p:spPr>
           <a:xfrm>
-            <a:off x="500034" y="1142988"/>
+            <a:off x="500034" y="1142989"/>
             <a:ext cx="7358114" cy="4401205"/>
           </a:xfrm>
           <a:prstGeom prst="rect">
@@ -4406,17 +4440,7 @@
                   </a:solidFill>
                 </a:ln>
               </a:rPr>
-              <a:t>$</a:t>
-            </a:r>
-            <a:r>
-              <a:rPr lang="fr-FR" sz="2000" b="1" smtClean="0">
-                <a:ln>
-                  <a:solidFill>
-                    <a:schemeClr val="bg2"/>
-                  </a:solidFill>
-                </a:ln>
-              </a:rPr>
-              <a:t>lum0$lux121$tem20$air5$heu86400</a:t>
+              <a:t>$lum0$lux121$tem20$air5$heu86400</a:t>
             </a:r>
             <a:r>
               <a:rPr lang="fr-FR" sz="2000" b="1" dirty="0" smtClean="0">
@@ -4448,7 +4472,7 @@
         </p:blipFill>
         <p:spPr bwMode="auto">
           <a:xfrm>
-            <a:off x="6858016" y="654829"/>
+            <a:off x="6858016" y="654830"/>
             <a:ext cx="1071570" cy="1363971"/>
           </a:xfrm>
           <a:prstGeom prst="rect">
@@ -4462,6 +4486,7 @@
   <p:clrMapOvr>
     <a:masterClrMapping/>
   </p:clrMapOvr>
+  <p:transition/>
   <p:timing>
     <p:tnLst>
       <p:par>
@@ -4497,7 +4522,7 @@
         </p:nvSpPr>
         <p:spPr>
           <a:xfrm>
-            <a:off x="71406" y="71418"/>
+            <a:off x="71406" y="71419"/>
             <a:ext cx="5854488" cy="584775"/>
           </a:xfrm>
           <a:prstGeom prst="rect">
@@ -4513,12 +4538,14 @@
           <a:p>
             <a:r>
               <a:rPr lang="fr-FR" sz="3200" dirty="0" smtClean="0">
-                <a:ln w="18415" cmpd="sng">
-                  <a:noFill/>
+                <a:ln w="3175" cmpd="sng">
+                  <a:solidFill>
+                    <a:schemeClr val="tx1"/>
+                  </a:solidFill>
                   <a:prstDash val="solid"/>
                 </a:ln>
                 <a:solidFill>
-                  <a:srgbClr val="FFFFFF"/>
+                  <a:srgbClr val="0070C0"/>
                 </a:solidFill>
                 <a:effectLst>
                   <a:outerShdw blurRad="63500" dir="3600000" algn="tl" rotWithShape="0">
@@ -4531,12 +4558,14 @@
               <a:t>Présentation du travail à faire : </a:t>
             </a:r>
             <a:endParaRPr lang="fr-FR" sz="3200" dirty="0">
-              <a:ln w="18415" cmpd="sng">
-                <a:noFill/>
+              <a:ln w="3175" cmpd="sng">
+                <a:solidFill>
+                  <a:schemeClr val="tx1"/>
+                </a:solidFill>
                 <a:prstDash val="solid"/>
               </a:ln>
               <a:solidFill>
-                <a:srgbClr val="FFFFFF"/>
+                <a:srgbClr val="0070C0"/>
               </a:solidFill>
               <a:effectLst>
                 <a:outerShdw blurRad="63500" dir="3600000" algn="tl" rotWithShape="0">
@@ -4566,18 +4595,17 @@
         </p:blipFill>
         <p:spPr bwMode="auto">
           <a:xfrm>
-            <a:off x="500034" y="2428872"/>
+            <a:off x="500036" y="2428873"/>
             <a:ext cx="928679" cy="928679"/>
           </a:xfrm>
           <a:prstGeom prst="rect">
             <a:avLst/>
           </a:prstGeom>
           <a:noFill/>
-          <a:ln>
+          <a:ln w="28575">
             <a:solidFill>
-              <a:schemeClr val="accent6">
-                <a:lumMod val="60000"/>
-                <a:lumOff val="40000"/>
+              <a:schemeClr val="tx2">
+                <a:lumMod val="90000"/>
               </a:schemeClr>
             </a:solidFill>
           </a:ln>
@@ -4600,18 +4628,17 @@
         </p:blipFill>
         <p:spPr bwMode="auto">
           <a:xfrm>
-            <a:off x="428596" y="3857632"/>
+            <a:off x="428598" y="3857633"/>
             <a:ext cx="1000125" cy="1000125"/>
           </a:xfrm>
           <a:prstGeom prst="rect">
             <a:avLst/>
           </a:prstGeom>
           <a:noFill/>
-          <a:ln>
+          <a:ln w="28575">
             <a:solidFill>
-              <a:schemeClr val="accent6">
-                <a:lumMod val="60000"/>
-                <a:lumOff val="40000"/>
+              <a:schemeClr val="tx2">
+                <a:lumMod val="90000"/>
               </a:schemeClr>
             </a:solidFill>
           </a:ln>
@@ -4667,11 +4694,10 @@
             <a:avLst/>
           </a:prstGeom>
           <a:noFill/>
-          <a:ln>
+          <a:ln w="28575">
             <a:solidFill>
-              <a:schemeClr val="accent6">
-                <a:lumMod val="60000"/>
-                <a:lumOff val="40000"/>
+              <a:schemeClr val="tx2">
+                <a:lumMod val="90000"/>
               </a:schemeClr>
             </a:solidFill>
           </a:ln>
@@ -4694,18 +4720,17 @@
         </p:blipFill>
         <p:spPr bwMode="auto">
           <a:xfrm>
-            <a:off x="7143768" y="2500310"/>
+            <a:off x="7143770" y="2500311"/>
             <a:ext cx="942313" cy="1285864"/>
           </a:xfrm>
           <a:prstGeom prst="rect">
             <a:avLst/>
           </a:prstGeom>
           <a:noFill/>
-          <a:ln>
+          <a:ln w="28575">
             <a:solidFill>
-              <a:schemeClr val="accent6">
-                <a:lumMod val="60000"/>
-                <a:lumOff val="40000"/>
+              <a:schemeClr val="tx2">
+                <a:lumMod val="90000"/>
               </a:schemeClr>
             </a:solidFill>
           </a:ln>
@@ -4721,7 +4746,7 @@
         </p:nvSpPr>
         <p:spPr bwMode="auto">
           <a:xfrm>
-            <a:off x="155575" y="-144463"/>
+            <a:off x="155575" y="-144462"/>
             <a:ext cx="304800" cy="304801"/>
           </a:xfrm>
           <a:prstGeom prst="rect">
@@ -4751,7 +4776,7 @@
         </p:nvSpPr>
         <p:spPr bwMode="auto">
           <a:xfrm>
-            <a:off x="155575" y="-144463"/>
+            <a:off x="155575" y="-144462"/>
             <a:ext cx="304800" cy="304801"/>
           </a:xfrm>
           <a:prstGeom prst="rect">
@@ -4788,38 +4813,52 @@
         </p:blipFill>
         <p:spPr bwMode="auto">
           <a:xfrm>
-            <a:off x="6786578" y="4143384"/>
+            <a:off x="6786580" y="4143385"/>
             <a:ext cx="1690681" cy="952497"/>
+          </a:xfrm>
+          <a:prstGeom prst="rect">
+            <a:avLst/>
+          </a:prstGeom>
+          <a:noFill/>
+          <a:ln w="28575">
+            <a:solidFill>
+              <a:schemeClr val="tx2">
+                <a:lumMod val="90000"/>
+              </a:schemeClr>
+            </a:solidFill>
+          </a:ln>
+        </p:spPr>
+      </p:pic>
+      <p:sp>
+        <p:nvSpPr>
+          <p:cNvPr id="16" name="ZoneTexte 15"/>
+          <p:cNvSpPr txBox="1"/>
+          <p:nvPr/>
+        </p:nvSpPr>
+        <p:spPr>
+          <a:xfrm>
+            <a:off x="928662" y="1714492"/>
+            <a:ext cx="1143008" cy="369332"/>
           </a:xfrm>
           <a:prstGeom prst="rect">
             <a:avLst/>
           </a:prstGeom>
           <a:noFill/>
           <a:ln>
-            <a:solidFill>
-              <a:schemeClr val="accent6">
-                <a:lumMod val="60000"/>
-                <a:lumOff val="40000"/>
-              </a:schemeClr>
-            </a:solidFill>
+            <a:noFill/>
           </a:ln>
-        </p:spPr>
-      </p:pic>
-      <p:sp>
-        <p:nvSpPr>
-          <p:cNvPr id="16" name="ZoneTexte 15"/>
-          <p:cNvSpPr txBox="1"/>
-          <p:nvPr/>
-        </p:nvSpPr>
-        <p:spPr>
-          <a:xfrm>
-            <a:off x="928662" y="1714492"/>
-            <a:ext cx="1143008" cy="369332"/>
-          </a:xfrm>
-          <a:prstGeom prst="rect">
-            <a:avLst/>
-          </a:prstGeom>
-          <a:noFill/>
+          <a:effectLst/>
+          <a:scene3d>
+            <a:camera prst="orthographicFront">
+              <a:rot lat="0" lon="0" rev="0"/>
+            </a:camera>
+            <a:lightRig rig="chilly" dir="t">
+              <a:rot lat="0" lon="0" rev="18480000"/>
+            </a:lightRig>
+          </a:scene3d>
+          <a:sp3d prstMaterial="clear">
+            <a:bevelT h="63500"/>
+          </a:sp3d>
         </p:spPr>
         <p:txBody>
           <a:bodyPr wrap="square" rtlCol="0">
@@ -4879,13 +4918,28 @@
         </p:nvSpPr>
         <p:spPr>
           <a:xfrm>
-            <a:off x="3714744" y="1643054"/>
+            <a:off x="3714744" y="1643056"/>
             <a:ext cx="1643074" cy="646331"/>
           </a:xfrm>
           <a:prstGeom prst="rect">
             <a:avLst/>
           </a:prstGeom>
           <a:noFill/>
+          <a:ln>
+            <a:noFill/>
+          </a:ln>
+          <a:effectLst/>
+          <a:scene3d>
+            <a:camera prst="orthographicFront">
+              <a:rot lat="0" lon="0" rev="0"/>
+            </a:camera>
+            <a:lightRig rig="chilly" dir="t">
+              <a:rot lat="0" lon="0" rev="18480000"/>
+            </a:lightRig>
+          </a:scene3d>
+          <a:sp3d prstMaterial="clear">
+            <a:bevelT h="63500"/>
+          </a:sp3d>
         </p:spPr>
         <p:txBody>
           <a:bodyPr wrap="square" rtlCol="0">
@@ -4945,13 +4999,28 @@
         </p:nvSpPr>
         <p:spPr>
           <a:xfrm>
-            <a:off x="6929454" y="1714492"/>
+            <a:off x="6929454" y="1714493"/>
             <a:ext cx="1571636" cy="646331"/>
           </a:xfrm>
           <a:prstGeom prst="rect">
             <a:avLst/>
           </a:prstGeom>
           <a:noFill/>
+          <a:ln>
+            <a:noFill/>
+          </a:ln>
+          <a:effectLst/>
+          <a:scene3d>
+            <a:camera prst="orthographicFront">
+              <a:rot lat="0" lon="0" rev="0"/>
+            </a:camera>
+            <a:lightRig rig="chilly" dir="t">
+              <a:rot lat="0" lon="0" rev="18480000"/>
+            </a:lightRig>
+          </a:scene3d>
+          <a:sp3d prstMaterial="clear">
+            <a:bevelT h="63500"/>
+          </a:sp3d>
         </p:spPr>
         <p:txBody>
           <a:bodyPr wrap="square" rtlCol="0">
@@ -5045,21 +5114,34 @@
             <p:ph type="title"/>
           </p:nvPr>
         </p:nvSpPr>
-        <p:spPr>
-          <a:xfrm>
-            <a:off x="457200" y="228866"/>
-            <a:ext cx="7467600" cy="952500"/>
-          </a:xfrm>
-        </p:spPr>
+        <p:spPr/>
         <p:txBody>
           <a:bodyPr/>
           <a:lstStyle/>
           <a:p>
             <a:r>
-              <a:rPr lang="fr-FR" dirty="0" smtClean="0"/>
+              <a:rPr lang="fr-FR" dirty="0" smtClean="0">
+                <a:ln w="3175">
+                  <a:solidFill>
+                    <a:schemeClr val="tx1"/>
+                  </a:solidFill>
+                </a:ln>
+                <a:solidFill>
+                  <a:srgbClr val="0070C0"/>
+                </a:solidFill>
+              </a:rPr>
               <a:t>Tests unitaires : Sécurité</a:t>
             </a:r>
-            <a:endParaRPr lang="fr-FR" dirty="0"/>
+            <a:endParaRPr lang="fr-FR" dirty="0">
+              <a:ln w="3175">
+                <a:solidFill>
+                  <a:schemeClr val="tx1"/>
+                </a:solidFill>
+              </a:ln>
+              <a:solidFill>
+                <a:srgbClr val="0070C0"/>
+              </a:solidFill>
+            </a:endParaRPr>
           </a:p>
         </p:txBody>
       </p:sp>
@@ -5071,13 +5153,28 @@
         </p:nvSpPr>
         <p:spPr>
           <a:xfrm>
-            <a:off x="642910" y="1214426"/>
-            <a:ext cx="2236510" cy="369332"/>
+            <a:off x="642911" y="1214426"/>
+            <a:ext cx="2172390" cy="369332"/>
           </a:xfrm>
           <a:prstGeom prst="rect">
             <a:avLst/>
           </a:prstGeom>
           <a:noFill/>
+          <a:ln>
+            <a:noFill/>
+          </a:ln>
+          <a:effectLst/>
+          <a:scene3d>
+            <a:camera prst="orthographicFront">
+              <a:rot lat="0" lon="0" rev="0"/>
+            </a:camera>
+            <a:lightRig rig="chilly" dir="t">
+              <a:rot lat="0" lon="0" rev="18480000"/>
+            </a:lightRig>
+          </a:scene3d>
+          <a:sp3d prstMaterial="clear">
+            <a:bevelT h="63500"/>
+          </a:sp3d>
         </p:spPr>
         <p:txBody>
           <a:bodyPr wrap="none" rtlCol="0">
@@ -5087,7 +5184,11 @@
           <a:p>
             <a:r>
               <a:rPr lang="fr-FR" dirty="0" smtClean="0"/>
-              <a:t>Détecteur incendie :</a:t>
+              <a:t>Détecteur </a:t>
+            </a:r>
+            <a:r>
+              <a:rPr lang="fr-FR" dirty="0" smtClean="0"/>
+              <a:t>incendie</a:t>
             </a:r>
             <a:endParaRPr lang="fr-FR" dirty="0"/>
           </a:p>
@@ -5110,18 +5211,17 @@
         </p:blipFill>
         <p:spPr bwMode="auto">
           <a:xfrm>
-            <a:off x="3286116" y="2786062"/>
+            <a:off x="3286118" y="2786063"/>
             <a:ext cx="2459215" cy="1014335"/>
           </a:xfrm>
           <a:prstGeom prst="rect">
             <a:avLst/>
           </a:prstGeom>
           <a:noFill/>
-          <a:ln w="9525">
+          <a:ln w="28575">
             <a:solidFill>
-              <a:schemeClr val="accent6">
-                <a:lumMod val="60000"/>
-                <a:lumOff val="40000"/>
+              <a:schemeClr val="tx2">
+                <a:lumMod val="90000"/>
               </a:schemeClr>
             </a:solidFill>
             <a:miter lim="800000"/>
@@ -5148,18 +5248,17 @@
         </p:blipFill>
         <p:spPr bwMode="auto">
           <a:xfrm>
-            <a:off x="642910" y="1785930"/>
+            <a:off x="642912" y="1785930"/>
             <a:ext cx="1457521" cy="2181203"/>
           </a:xfrm>
           <a:prstGeom prst="rect">
             <a:avLst/>
           </a:prstGeom>
           <a:noFill/>
-          <a:ln w="9525">
+          <a:ln w="28575">
             <a:solidFill>
-              <a:schemeClr val="accent6">
-                <a:lumMod val="60000"/>
-                <a:lumOff val="40000"/>
+              <a:schemeClr val="tx2">
+                <a:lumMod val="90000"/>
               </a:schemeClr>
             </a:solidFill>
             <a:miter lim="800000"/>
@@ -5186,18 +5285,17 @@
         </p:blipFill>
         <p:spPr bwMode="auto">
           <a:xfrm>
-            <a:off x="1357290" y="4429136"/>
+            <a:off x="1357292" y="4429137"/>
             <a:ext cx="2933697" cy="1150553"/>
           </a:xfrm>
           <a:prstGeom prst="rect">
             <a:avLst/>
           </a:prstGeom>
           <a:noFill/>
-          <a:ln w="9525">
+          <a:ln w="28575">
             <a:solidFill>
-              <a:schemeClr val="accent6">
-                <a:lumMod val="60000"/>
-                <a:lumOff val="40000"/>
+              <a:schemeClr val="tx2">
+                <a:lumMod val="90000"/>
               </a:schemeClr>
             </a:solidFill>
             <a:miter lim="800000"/>
@@ -5231,11 +5329,10 @@
             <a:avLst/>
           </a:prstGeom>
           <a:noFill/>
-          <a:ln w="9525">
+          <a:ln w="28575">
             <a:solidFill>
-              <a:schemeClr val="accent6">
-                <a:lumMod val="60000"/>
-                <a:lumOff val="40000"/>
+              <a:schemeClr val="tx2">
+                <a:lumMod val="90000"/>
               </a:schemeClr>
             </a:solidFill>
             <a:miter lim="800000"/>
@@ -5293,10 +5390,28 @@
           <a:lstStyle/>
           <a:p>
             <a:r>
-              <a:rPr lang="fr-FR" dirty="0" smtClean="0"/>
+              <a:rPr lang="fr-FR" dirty="0" smtClean="0">
+                <a:ln w="3175">
+                  <a:solidFill>
+                    <a:schemeClr val="tx1"/>
+                  </a:solidFill>
+                </a:ln>
+                <a:solidFill>
+                  <a:srgbClr val="0070C0"/>
+                </a:solidFill>
+              </a:rPr>
               <a:t>Tests unitaires : Sécurité</a:t>
             </a:r>
-            <a:endParaRPr lang="fr-FR" dirty="0"/>
+            <a:endParaRPr lang="fr-FR" dirty="0">
+              <a:ln w="3175">
+                <a:solidFill>
+                  <a:schemeClr val="tx1"/>
+                </a:solidFill>
+              </a:ln>
+              <a:solidFill>
+                <a:srgbClr val="0070C0"/>
+              </a:solidFill>
+            </a:endParaRPr>
           </a:p>
         </p:txBody>
       </p:sp>
@@ -5317,18 +5432,17 @@
         </p:blipFill>
         <p:spPr bwMode="auto">
           <a:xfrm>
-            <a:off x="571472" y="2000244"/>
+            <a:off x="571472" y="2000245"/>
             <a:ext cx="1219184" cy="1219184"/>
           </a:xfrm>
           <a:prstGeom prst="rect">
             <a:avLst/>
           </a:prstGeom>
           <a:noFill/>
-          <a:ln>
+          <a:ln w="28575">
             <a:solidFill>
-              <a:schemeClr val="accent6">
-                <a:lumMod val="60000"/>
-                <a:lumOff val="40000"/>
+              <a:schemeClr val="tx2">
+                <a:lumMod val="90000"/>
               </a:schemeClr>
             </a:solidFill>
           </a:ln>
@@ -5358,11 +5472,10 @@
             <a:avLst/>
           </a:prstGeom>
           <a:noFill/>
-          <a:ln>
+          <a:ln w="28575">
             <a:solidFill>
-              <a:schemeClr val="accent6">
-                <a:lumMod val="60000"/>
-                <a:lumOff val="40000"/>
+              <a:schemeClr val="tx2">
+                <a:lumMod val="90000"/>
               </a:schemeClr>
             </a:solidFill>
           </a:ln>
@@ -5376,13 +5489,28 @@
         </p:nvSpPr>
         <p:spPr>
           <a:xfrm>
-            <a:off x="642910" y="1214426"/>
-            <a:ext cx="2903359" cy="369332"/>
+            <a:off x="642912" y="1214426"/>
+            <a:ext cx="2775119" cy="369332"/>
           </a:xfrm>
           <a:prstGeom prst="rect">
             <a:avLst/>
           </a:prstGeom>
           <a:noFill/>
+          <a:ln>
+            <a:noFill/>
+          </a:ln>
+          <a:effectLst/>
+          <a:scene3d>
+            <a:camera prst="orthographicFront">
+              <a:rot lat="0" lon="0" rev="0"/>
+            </a:camera>
+            <a:lightRig rig="chilly" dir="t">
+              <a:rot lat="0" lon="0" rev="18480000"/>
+            </a:lightRig>
+          </a:scene3d>
+          <a:sp3d prstMaterial="clear">
+            <a:bevelT h="63500"/>
+          </a:sp3d>
         </p:spPr>
         <p:txBody>
           <a:bodyPr wrap="none" rtlCol="0">
@@ -5392,7 +5520,11 @@
           <a:p>
             <a:r>
               <a:rPr lang="fr-FR" dirty="0" smtClean="0"/>
-              <a:t>Détecteur de mouvement :</a:t>
+              <a:t>Détecteur de </a:t>
+            </a:r>
+            <a:r>
+              <a:rPr lang="fr-FR" dirty="0" smtClean="0"/>
+              <a:t>mouvement</a:t>
             </a:r>
             <a:endParaRPr lang="fr-FR" dirty="0"/>
           </a:p>
@@ -5415,18 +5547,17 @@
         </p:blipFill>
         <p:spPr bwMode="auto">
           <a:xfrm>
-            <a:off x="5072066" y="2143120"/>
+            <a:off x="5072066" y="2143121"/>
             <a:ext cx="2071702" cy="2610235"/>
           </a:xfrm>
           <a:prstGeom prst="rect">
             <a:avLst/>
           </a:prstGeom>
           <a:noFill/>
-          <a:ln w="9525">
+          <a:ln w="28575">
             <a:solidFill>
-              <a:schemeClr val="accent6">
-                <a:lumMod val="60000"/>
-                <a:lumOff val="40000"/>
+              <a:schemeClr val="tx2">
+                <a:lumMod val="90000"/>
               </a:schemeClr>
             </a:solidFill>
             <a:miter lim="800000"/>
@@ -5492,11 +5623,10 @@
             <a:avLst/>
           </a:prstGeom>
           <a:noFill/>
-          <a:ln w="9525">
+          <a:ln w="28575">
             <a:solidFill>
-              <a:schemeClr val="accent6">
-                <a:lumMod val="60000"/>
-                <a:lumOff val="40000"/>
+              <a:schemeClr val="tx2">
+                <a:lumMod val="90000"/>
               </a:schemeClr>
             </a:solidFill>
             <a:miter lim="800000"/>
@@ -5529,10 +5659,28 @@
           <a:lstStyle/>
           <a:p>
             <a:r>
-              <a:rPr lang="fr-FR" dirty="0" smtClean="0"/>
+              <a:rPr lang="fr-FR" dirty="0" smtClean="0">
+                <a:ln w="3175">
+                  <a:solidFill>
+                    <a:schemeClr val="tx1"/>
+                  </a:solidFill>
+                </a:ln>
+                <a:solidFill>
+                  <a:srgbClr val="0070C0"/>
+                </a:solidFill>
+              </a:rPr>
               <a:t>Tests unitaires : Gestion des lumières</a:t>
             </a:r>
-            <a:endParaRPr lang="fr-FR" dirty="0"/>
+            <a:endParaRPr lang="fr-FR" dirty="0">
+              <a:ln w="3175">
+                <a:solidFill>
+                  <a:schemeClr val="tx1"/>
+                </a:solidFill>
+              </a:ln>
+              <a:solidFill>
+                <a:srgbClr val="0070C0"/>
+              </a:solidFill>
+            </a:endParaRPr>
           </a:p>
         </p:txBody>
       </p:sp>
@@ -5544,13 +5692,28 @@
         </p:nvSpPr>
         <p:spPr>
           <a:xfrm>
-            <a:off x="642910" y="1214426"/>
-            <a:ext cx="1659429" cy="369332"/>
+            <a:off x="642912" y="1214426"/>
+            <a:ext cx="1531188" cy="369332"/>
           </a:xfrm>
           <a:prstGeom prst="rect">
             <a:avLst/>
           </a:prstGeom>
           <a:noFill/>
+          <a:ln>
+            <a:noFill/>
+          </a:ln>
+          <a:effectLst/>
+          <a:scene3d>
+            <a:camera prst="orthographicFront">
+              <a:rot lat="0" lon="0" rev="0"/>
+            </a:camera>
+            <a:lightRig rig="chilly" dir="t">
+              <a:rot lat="0" lon="0" rev="18480000"/>
+            </a:lightRig>
+          </a:scene3d>
+          <a:sp3d prstMaterial="clear">
+            <a:bevelT h="63500"/>
+          </a:sp3d>
         </p:spPr>
         <p:txBody>
           <a:bodyPr wrap="none" rtlCol="0">
@@ -5560,7 +5723,11 @@
           <a:p>
             <a:r>
               <a:rPr lang="fr-FR" dirty="0" smtClean="0"/>
-              <a:t>Relai lumière :</a:t>
+              <a:t>Relai </a:t>
+            </a:r>
+            <a:r>
+              <a:rPr lang="fr-FR" dirty="0" smtClean="0"/>
+              <a:t>lumière</a:t>
             </a:r>
             <a:endParaRPr lang="fr-FR" dirty="0"/>
           </a:p>
@@ -5590,11 +5757,10 @@
             <a:avLst/>
           </a:prstGeom>
           <a:noFill/>
-          <a:ln w="9525">
+          <a:ln w="28575">
             <a:solidFill>
-              <a:schemeClr val="accent6">
-                <a:lumMod val="60000"/>
-                <a:lumOff val="40000"/>
+              <a:schemeClr val="tx2">
+                <a:lumMod val="90000"/>
               </a:schemeClr>
             </a:solidFill>
             <a:miter lim="800000"/>
@@ -5621,18 +5787,17 @@
         </p:blipFill>
         <p:spPr bwMode="auto">
           <a:xfrm>
-            <a:off x="785786" y="2071682"/>
+            <a:off x="785788" y="2071683"/>
             <a:ext cx="1071563" cy="1071563"/>
           </a:xfrm>
           <a:prstGeom prst="rect">
             <a:avLst/>
           </a:prstGeom>
           <a:noFill/>
-          <a:ln>
+          <a:ln w="28575">
             <a:solidFill>
-              <a:schemeClr val="accent6">
-                <a:lumMod val="60000"/>
-                <a:lumOff val="40000"/>
+              <a:schemeClr val="tx2">
+                <a:lumMod val="90000"/>
               </a:schemeClr>
             </a:solidFill>
           </a:ln>
@@ -5643,6 +5808,13 @@
   <p:clrMapOvr>
     <a:masterClrMapping/>
   </p:clrMapOvr>
+  <p:timing>
+    <p:tnLst>
+      <p:par>
+        <p:cTn id="1" dur="indefinite" restart="never" nodeType="tmRoot"/>
+      </p:par>
+    </p:tnLst>
+  </p:timing>
 </p:sld>
 </file>
 
@@ -5686,10 +5858,28 @@
           <a:lstStyle/>
           <a:p>
             <a:r>
-              <a:rPr lang="fr-FR" dirty="0" smtClean="0"/>
+              <a:rPr lang="fr-FR" dirty="0" smtClean="0">
+                <a:ln w="3175">
+                  <a:solidFill>
+                    <a:schemeClr val="tx1"/>
+                  </a:solidFill>
+                </a:ln>
+                <a:solidFill>
+                  <a:srgbClr val="0070C0"/>
+                </a:solidFill>
+              </a:rPr>
               <a:t>Tests unitaires : Gestion des volets</a:t>
             </a:r>
-            <a:endParaRPr lang="fr-FR" dirty="0"/>
+            <a:endParaRPr lang="fr-FR" dirty="0">
+              <a:ln w="3175">
+                <a:solidFill>
+                  <a:schemeClr val="tx1"/>
+                </a:solidFill>
+              </a:ln>
+              <a:solidFill>
+                <a:srgbClr val="0070C0"/>
+              </a:solidFill>
+            </a:endParaRPr>
           </a:p>
         </p:txBody>
       </p:sp>
@@ -5701,13 +5891,28 @@
         </p:nvSpPr>
         <p:spPr>
           <a:xfrm>
-            <a:off x="642910" y="1214426"/>
-            <a:ext cx="2557110" cy="369332"/>
+            <a:off x="642911" y="1214426"/>
+            <a:ext cx="2492990" cy="369332"/>
           </a:xfrm>
           <a:prstGeom prst="rect">
             <a:avLst/>
           </a:prstGeom>
           <a:noFill/>
+          <a:ln>
+            <a:noFill/>
+          </a:ln>
+          <a:effectLst/>
+          <a:scene3d>
+            <a:camera prst="orthographicFront">
+              <a:rot lat="0" lon="0" rev="0"/>
+            </a:camera>
+            <a:lightRig rig="chilly" dir="t">
+              <a:rot lat="0" lon="0" rev="18480000"/>
+            </a:lightRig>
+          </a:scene3d>
+          <a:sp3d prstMaterial="clear">
+            <a:bevelT h="63500"/>
+          </a:sp3d>
         </p:spPr>
         <p:txBody>
           <a:bodyPr wrap="none" rtlCol="0">
@@ -5717,7 +5922,11 @@
           <a:p>
             <a:r>
               <a:rPr lang="fr-FR" dirty="0" smtClean="0"/>
-              <a:t>Capteur de luminosité :</a:t>
+              <a:t>Capteur de </a:t>
+            </a:r>
+            <a:r>
+              <a:rPr lang="fr-FR" dirty="0" smtClean="0"/>
+              <a:t>luminosité</a:t>
             </a:r>
             <a:endParaRPr lang="fr-FR" dirty="0"/>
           </a:p>
@@ -5740,21 +5949,28 @@
         </p:blipFill>
         <p:spPr bwMode="auto">
           <a:xfrm>
-            <a:off x="642910" y="3714756"/>
+            <a:off x="642910" y="3714757"/>
             <a:ext cx="2681286" cy="1155423"/>
           </a:xfrm>
           <a:prstGeom prst="rect">
             <a:avLst/>
           </a:prstGeom>
-          <a:noFill/>
-          <a:ln>
+          <a:ln w="28575" cap="sq">
             <a:solidFill>
-              <a:schemeClr val="accent6">
-                <a:lumMod val="60000"/>
-                <a:lumOff val="40000"/>
+              <a:schemeClr val="tx2">
+                <a:lumMod val="90000"/>
               </a:schemeClr>
             </a:solidFill>
+            <a:prstDash val="solid"/>
+            <a:miter lim="800000"/>
           </a:ln>
+          <a:effectLst>
+            <a:outerShdw blurRad="50800" dist="38100" dir="2700000" algn="tl" rotWithShape="0">
+              <a:srgbClr val="000000">
+                <a:alpha val="43000"/>
+              </a:srgbClr>
+            </a:outerShdw>
+          </a:effectLst>
         </p:spPr>
       </p:pic>
       <p:pic>
@@ -5774,21 +5990,28 @@
         </p:blipFill>
         <p:spPr bwMode="auto">
           <a:xfrm>
-            <a:off x="1142976" y="2071682"/>
+            <a:off x="1142976" y="2071683"/>
             <a:ext cx="1096028" cy="823911"/>
           </a:xfrm>
           <a:prstGeom prst="rect">
             <a:avLst/>
           </a:prstGeom>
-          <a:noFill/>
-          <a:ln>
+          <a:ln w="28575" cap="sq">
             <a:solidFill>
-              <a:schemeClr val="accent6">
-                <a:lumMod val="60000"/>
-                <a:lumOff val="40000"/>
+              <a:schemeClr val="tx2">
+                <a:lumMod val="90000"/>
               </a:schemeClr>
             </a:solidFill>
+            <a:prstDash val="solid"/>
+            <a:miter lim="800000"/>
           </a:ln>
+          <a:effectLst>
+            <a:outerShdw blurRad="50800" dist="38100" dir="2700000" algn="tl" rotWithShape="0">
+              <a:srgbClr val="000000">
+                <a:alpha val="43000"/>
+              </a:srgbClr>
+            </a:outerShdw>
+          </a:effectLst>
         </p:spPr>
       </p:pic>
       <p:pic>
@@ -5808,25 +6031,28 @@
         </p:blipFill>
         <p:spPr bwMode="auto">
           <a:xfrm>
-            <a:off x="4857752" y="2571748"/>
+            <a:off x="4857754" y="2571748"/>
             <a:ext cx="2776537" cy="2176462"/>
           </a:xfrm>
           <a:prstGeom prst="rect">
             <a:avLst/>
           </a:prstGeom>
-          <a:noFill/>
-          <a:ln w="9525">
+          <a:ln w="28575" cap="sq">
             <a:solidFill>
-              <a:schemeClr val="accent6">
-                <a:lumMod val="60000"/>
-                <a:lumOff val="40000"/>
+              <a:schemeClr val="tx2">
+                <a:lumMod val="90000"/>
               </a:schemeClr>
             </a:solidFill>
+            <a:prstDash val="solid"/>
             <a:miter lim="800000"/>
-            <a:headEnd/>
-            <a:tailEnd/>
           </a:ln>
-          <a:effectLst/>
+          <a:effectLst>
+            <a:outerShdw blurRad="50800" dist="38100" dir="2700000" algn="tl" rotWithShape="0">
+              <a:srgbClr val="000000">
+                <a:alpha val="43000"/>
+              </a:srgbClr>
+            </a:outerShdw>
+          </a:effectLst>
         </p:spPr>
       </p:pic>
     </p:spTree>
@@ -5878,25 +6104,28 @@
         </p:blipFill>
         <p:spPr bwMode="auto">
           <a:xfrm>
-            <a:off x="5857884" y="2643186"/>
+            <a:off x="5857884" y="2643187"/>
             <a:ext cx="3186114" cy="2945455"/>
           </a:xfrm>
           <a:prstGeom prst="rect">
             <a:avLst/>
           </a:prstGeom>
-          <a:noFill/>
-          <a:ln w="9525">
+          <a:ln w="28575" cap="sq">
             <a:solidFill>
-              <a:schemeClr val="accent6">
-                <a:lumMod val="60000"/>
-                <a:lumOff val="40000"/>
+              <a:schemeClr val="tx2">
+                <a:lumMod val="90000"/>
               </a:schemeClr>
             </a:solidFill>
+            <a:prstDash val="solid"/>
             <a:miter lim="800000"/>
-            <a:headEnd/>
-            <a:tailEnd/>
           </a:ln>
-          <a:effectLst/>
+          <a:effectLst>
+            <a:outerShdw blurRad="50800" dist="38100" dir="2700000" algn="tl" rotWithShape="0">
+              <a:srgbClr val="000000">
+                <a:alpha val="43000"/>
+              </a:srgbClr>
+            </a:outerShdw>
+          </a:effectLst>
         </p:spPr>
       </p:pic>
       <p:sp>
@@ -5922,10 +6151,28 @@
           <a:lstStyle/>
           <a:p>
             <a:r>
-              <a:rPr lang="fr-FR" dirty="0" smtClean="0"/>
+              <a:rPr lang="fr-FR" dirty="0" smtClean="0">
+                <a:ln w="3175">
+                  <a:solidFill>
+                    <a:schemeClr val="tx1"/>
+                  </a:solidFill>
+                </a:ln>
+                <a:solidFill>
+                  <a:srgbClr val="0070C0"/>
+                </a:solidFill>
+              </a:rPr>
               <a:t>Tests unitaires : Gestion des volets</a:t>
             </a:r>
-            <a:endParaRPr lang="fr-FR" dirty="0"/>
+            <a:endParaRPr lang="fr-FR" dirty="0">
+              <a:ln w="3175">
+                <a:solidFill>
+                  <a:schemeClr val="tx1"/>
+                </a:solidFill>
+              </a:ln>
+              <a:solidFill>
+                <a:srgbClr val="0070C0"/>
+              </a:solidFill>
+            </a:endParaRPr>
           </a:p>
         </p:txBody>
       </p:sp>
@@ -5937,13 +6184,28 @@
         </p:nvSpPr>
         <p:spPr>
           <a:xfrm>
-            <a:off x="642910" y="1214426"/>
-            <a:ext cx="1685141" cy="369332"/>
+            <a:off x="642912" y="1214426"/>
+            <a:ext cx="1556901" cy="369332"/>
           </a:xfrm>
           <a:prstGeom prst="rect">
             <a:avLst/>
           </a:prstGeom>
           <a:noFill/>
+          <a:ln>
+            <a:noFill/>
+          </a:ln>
+          <a:effectLst/>
+          <a:scene3d>
+            <a:camera prst="orthographicFront">
+              <a:rot lat="0" lon="0" rev="0"/>
+            </a:camera>
+            <a:lightRig rig="chilly" dir="t">
+              <a:rot lat="0" lon="0" rev="18480000"/>
+            </a:lightRig>
+          </a:scene3d>
+          <a:sp3d prstMaterial="clear">
+            <a:bevelT h="63500"/>
+          </a:sp3d>
         </p:spPr>
         <p:txBody>
           <a:bodyPr wrap="none" rtlCol="0">
@@ -5953,7 +6215,11 @@
           <a:p>
             <a:r>
               <a:rPr lang="fr-FR" dirty="0" smtClean="0"/>
-              <a:t>Volet Roulant :</a:t>
+              <a:t>Volet </a:t>
+            </a:r>
+            <a:r>
+              <a:rPr lang="fr-FR" dirty="0" smtClean="0"/>
+              <a:t>Roulant</a:t>
             </a:r>
             <a:endParaRPr lang="fr-FR" dirty="0"/>
           </a:p>
@@ -5976,25 +6242,28 @@
         </p:blipFill>
         <p:spPr bwMode="auto">
           <a:xfrm>
-            <a:off x="3214678" y="2643186"/>
+            <a:off x="3214678" y="2643187"/>
             <a:ext cx="2214578" cy="2981163"/>
           </a:xfrm>
           <a:prstGeom prst="rect">
             <a:avLst/>
           </a:prstGeom>
-          <a:noFill/>
-          <a:ln w="9525">
+          <a:ln w="28575" cap="sq">
             <a:solidFill>
-              <a:schemeClr val="accent6">
-                <a:lumMod val="60000"/>
-                <a:lumOff val="40000"/>
+              <a:schemeClr val="tx2">
+                <a:lumMod val="90000"/>
               </a:schemeClr>
             </a:solidFill>
+            <a:prstDash val="solid"/>
             <a:miter lim="800000"/>
-            <a:headEnd/>
-            <a:tailEnd/>
           </a:ln>
-          <a:effectLst/>
+          <a:effectLst>
+            <a:outerShdw blurRad="50800" dist="38100" dir="2700000" algn="tl" rotWithShape="0">
+              <a:srgbClr val="000000">
+                <a:alpha val="43000"/>
+              </a:srgbClr>
+            </a:outerShdw>
+          </a:effectLst>
         </p:spPr>
       </p:pic>
       <p:pic>
@@ -6014,25 +6283,28 @@
         </p:blipFill>
         <p:spPr bwMode="auto">
           <a:xfrm>
-            <a:off x="357158" y="2143120"/>
+            <a:off x="357158" y="2143121"/>
             <a:ext cx="2357454" cy="1828419"/>
           </a:xfrm>
           <a:prstGeom prst="rect">
             <a:avLst/>
           </a:prstGeom>
-          <a:noFill/>
-          <a:ln w="9525">
+          <a:ln w="28575" cap="sq">
             <a:solidFill>
-              <a:schemeClr val="accent6">
-                <a:lumMod val="60000"/>
-                <a:lumOff val="40000"/>
+              <a:schemeClr val="tx2">
+                <a:lumMod val="90000"/>
               </a:schemeClr>
             </a:solidFill>
+            <a:prstDash val="solid"/>
             <a:miter lim="800000"/>
-            <a:headEnd/>
-            <a:tailEnd/>
           </a:ln>
-          <a:effectLst/>
+          <a:effectLst>
+            <a:outerShdw blurRad="50800" dist="38100" dir="2700000" algn="tl" rotWithShape="0">
+              <a:srgbClr val="000000">
+                <a:alpha val="43000"/>
+              </a:srgbClr>
+            </a:outerShdw>
+          </a:effectLst>
         </p:spPr>
       </p:pic>
     </p:spTree>
@@ -6040,6 +6312,13 @@
   <p:clrMapOvr>
     <a:masterClrMapping/>
   </p:clrMapOvr>
+  <p:timing>
+    <p:tnLst>
+      <p:par>
+        <p:cTn id="1" dur="indefinite" restart="never" nodeType="tmRoot"/>
+      </p:par>
+    </p:tnLst>
+  </p:timing>
 </p:sld>
 </file>
 
@@ -6083,28 +6362,120 @@
           <a:lstStyle/>
           <a:p>
             <a:r>
-              <a:rPr lang="fr-FR" dirty="0" smtClean="0"/>
+              <a:rPr lang="fr-FR" dirty="0" smtClean="0">
+                <a:ln w="3175">
+                  <a:solidFill>
+                    <a:schemeClr val="tx1"/>
+                  </a:solidFill>
+                </a:ln>
+                <a:solidFill>
+                  <a:srgbClr val="0070C0"/>
+                </a:solidFill>
+              </a:rPr>
               <a:t>Tests </a:t>
             </a:r>
             <a:r>
-              <a:rPr lang="fr-FR" dirty="0" smtClean="0"/>
-              <a:t>d’intégration </a:t>
-            </a:r>
-            <a:r>
-              <a:rPr lang="fr-FR" dirty="0" smtClean="0"/>
-              <a:t>: </a:t>
-            </a:r>
-            <a:r>
-              <a:rPr lang="fr-FR" dirty="0" smtClean="0"/>
-              <a:t>Confort</a:t>
-            </a:r>
-            <a:endParaRPr lang="fr-FR" dirty="0"/>
+              <a:rPr lang="fr-FR" dirty="0" smtClean="0">
+                <a:ln w="3175">
+                  <a:solidFill>
+                    <a:schemeClr val="tx1"/>
+                  </a:solidFill>
+                </a:ln>
+                <a:solidFill>
+                  <a:srgbClr val="0070C0"/>
+                </a:solidFill>
+              </a:rPr>
+              <a:t>d’intégration</a:t>
+            </a:r>
+            <a:endParaRPr lang="fr-FR" dirty="0">
+              <a:ln w="3175">
+                <a:solidFill>
+                  <a:schemeClr val="tx1"/>
+                </a:solidFill>
+              </a:ln>
+              <a:solidFill>
+                <a:srgbClr val="0070C0"/>
+              </a:solidFill>
+            </a:endParaRPr>
+          </a:p>
+        </p:txBody>
+      </p:sp>
+      <p:sp>
+        <p:nvSpPr>
+          <p:cNvPr id="7" name="ZoneTexte 6"/>
+          <p:cNvSpPr txBox="1"/>
+          <p:nvPr/>
+        </p:nvSpPr>
+        <p:spPr>
+          <a:xfrm>
+            <a:off x="642911" y="1214426"/>
+            <a:ext cx="4955267" cy="369332"/>
+          </a:xfrm>
+          <a:prstGeom prst="rect">
+            <a:avLst/>
+          </a:prstGeom>
+          <a:noFill/>
+          <a:ln>
+            <a:noFill/>
+          </a:ln>
+          <a:effectLst/>
+          <a:scene3d>
+            <a:camera prst="orthographicFront">
+              <a:rot lat="0" lon="0" rev="0"/>
+            </a:camera>
+            <a:lightRig rig="chilly" dir="t">
+              <a:rot lat="0" lon="0" rev="18480000"/>
+            </a:lightRig>
+          </a:scene3d>
+          <a:sp3d prstMaterial="clear">
+            <a:bevelT h="63500"/>
+          </a:sp3d>
+        </p:spPr>
+        <p:txBody>
+          <a:bodyPr wrap="none" rtlCol="0">
+            <a:spAutoFit/>
+          </a:bodyPr>
+          <a:lstStyle/>
+          <a:p>
+            <a:r>
+              <a:rPr lang="fr-FR" dirty="0" smtClean="0">
+                <a:effectLst>
+                  <a:outerShdw blurRad="38100" dist="38100" dir="2700000" algn="tl">
+                    <a:srgbClr val="000000">
+                      <a:alpha val="43137"/>
+                    </a:srgbClr>
+                  </a:outerShdw>
+                </a:effectLst>
+              </a:rPr>
+              <a:t>Volet Roulant, Capteur de luminosité, </a:t>
+            </a:r>
+            <a:r>
+              <a:rPr lang="fr-FR" dirty="0" smtClean="0">
+                <a:effectLst>
+                  <a:outerShdw blurRad="38100" dist="38100" dir="2700000" algn="tl">
+                    <a:srgbClr val="000000">
+                      <a:alpha val="43137"/>
+                    </a:srgbClr>
+                  </a:outerShdw>
+                </a:effectLst>
+              </a:rPr>
+              <a:t>Lumière</a:t>
+            </a:r>
+            <a:endParaRPr lang="fr-FR" dirty="0">
+              <a:effectLst>
+                <a:outerShdw blurRad="38100" dist="38100" dir="2700000" algn="tl">
+                  <a:srgbClr val="000000">
+                    <a:alpha val="43137"/>
+                  </a:srgbClr>
+                </a:outerShdw>
+              </a:effectLst>
+            </a:endParaRPr>
           </a:p>
         </p:txBody>
       </p:sp>
       <p:pic>
         <p:nvPicPr>
-          <p:cNvPr id="2050" name="Picture 2"/>
+          <p:cNvPr id="2" name="Picture 2" descr="Q:\Projet_Domotique_GITBTS\Materiels\Benjamin\progConfort\schema.png"/>
           <p:cNvPicPr>
             <a:picLocks noChangeAspect="1" noChangeArrowheads="1"/>
           </p:cNvPicPr>
@@ -6119,100 +6490,34 @@
         </p:blipFill>
         <p:spPr bwMode="auto">
           <a:xfrm>
-            <a:off x="642910" y="2214558"/>
-            <a:ext cx="2758183" cy="3105124"/>
+            <a:off x="1500166" y="1714492"/>
+            <a:ext cx="5572164" cy="3946124"/>
           </a:xfrm>
           <a:prstGeom prst="rect">
             <a:avLst/>
           </a:prstGeom>
           <a:noFill/>
-          <a:ln w="9525">
+          <a:ln w="28575">
             <a:solidFill>
-              <a:schemeClr val="accent6">
-                <a:lumMod val="60000"/>
-                <a:lumOff val="40000"/>
+              <a:schemeClr val="tx2">
+                <a:lumMod val="90000"/>
               </a:schemeClr>
             </a:solidFill>
-            <a:miter lim="800000"/>
-            <a:headEnd/>
-            <a:tailEnd/>
           </a:ln>
-          <a:effectLst/>
         </p:spPr>
       </p:pic>
-      <p:pic>
-        <p:nvPicPr>
-          <p:cNvPr id="2051" name="Picture 3"/>
-          <p:cNvPicPr>
-            <a:picLocks noChangeAspect="1" noChangeArrowheads="1"/>
-          </p:cNvPicPr>
-          <p:nvPr/>
-        </p:nvPicPr>
-        <p:blipFill>
-          <a:blip r:embed="rId3"/>
-          <a:srcRect/>
-          <a:stretch>
-            <a:fillRect/>
-          </a:stretch>
-        </p:blipFill>
-        <p:spPr bwMode="auto">
-          <a:xfrm>
-            <a:off x="4500562" y="2500310"/>
-            <a:ext cx="4015686" cy="2571748"/>
-          </a:xfrm>
-          <a:prstGeom prst="rect">
-            <a:avLst/>
-          </a:prstGeom>
-          <a:noFill/>
-          <a:ln w="9525">
-            <a:solidFill>
-              <a:schemeClr val="accent6">
-                <a:lumMod val="60000"/>
-                <a:lumOff val="40000"/>
-              </a:schemeClr>
-            </a:solidFill>
-            <a:miter lim="800000"/>
-            <a:headEnd/>
-            <a:tailEnd/>
-          </a:ln>
-          <a:effectLst/>
-        </p:spPr>
-      </p:pic>
-      <p:sp>
-        <p:nvSpPr>
-          <p:cNvPr id="7" name="ZoneTexte 6"/>
-          <p:cNvSpPr txBox="1"/>
-          <p:nvPr/>
-        </p:nvSpPr>
-        <p:spPr>
-          <a:xfrm>
-            <a:off x="642910" y="1214426"/>
-            <a:ext cx="5019387" cy="369332"/>
-          </a:xfrm>
-          <a:prstGeom prst="rect">
-            <a:avLst/>
-          </a:prstGeom>
-          <a:noFill/>
-        </p:spPr>
-        <p:txBody>
-          <a:bodyPr wrap="none" rtlCol="0">
-            <a:spAutoFit/>
-          </a:bodyPr>
-          <a:lstStyle/>
-          <a:p>
-            <a:r>
-              <a:rPr lang="fr-FR" dirty="0" smtClean="0"/>
-              <a:t>Volet Roulant, Capteur de luminosité, Lumière :</a:t>
-            </a:r>
-            <a:endParaRPr lang="fr-FR" dirty="0"/>
-          </a:p>
-        </p:txBody>
-      </p:sp>
     </p:spTree>
   </p:cSld>
   <p:clrMapOvr>
     <a:masterClrMapping/>
   </p:clrMapOvr>
+  <p:timing>
+    <p:tnLst>
+      <p:par>
+        <p:cTn id="1" dur="indefinite" restart="never" nodeType="tmRoot"/>
+      </p:par>
+    </p:tnLst>
+  </p:timing>
 </p:sld>
 </file>
 
@@ -6246,20 +6551,20 @@
         <p:spPr/>
         <p:txBody>
           <a:bodyPr>
-            <a:normAutofit fontScale="90000"/>
+            <a:noAutofit/>
           </a:bodyPr>
           <a:lstStyle/>
           <a:p>
             <a:r>
-              <a:rPr lang="fr-FR" dirty="0" smtClean="0">
-                <a:ln w="18415" cmpd="sng">
+              <a:rPr lang="fr-FR" sz="4000" dirty="0" smtClean="0">
+                <a:ln w="3175" cmpd="sng">
                   <a:solidFill>
                     <a:srgbClr val="FFFFFF"/>
                   </a:solidFill>
                   <a:prstDash val="solid"/>
                 </a:ln>
                 <a:solidFill>
-                  <a:srgbClr val="FFFFFF"/>
+                  <a:srgbClr val="0070C0"/>
                 </a:solidFill>
                 <a:effectLst>
                   <a:outerShdw blurRad="63500" dir="3600000" algn="tl" rotWithShape="0">
@@ -6271,15 +6576,15 @@
               </a:rPr>
               <a:t>Cahier des charges : La maison du Future </a:t>
             </a:r>
-            <a:endParaRPr lang="fr-FR" dirty="0">
-              <a:ln w="18415" cmpd="sng">
+            <a:endParaRPr lang="fr-FR" sz="4000" dirty="0">
+              <a:ln w="3175" cmpd="sng">
                 <a:solidFill>
                   <a:srgbClr val="FFFFFF"/>
                 </a:solidFill>
                 <a:prstDash val="solid"/>
               </a:ln>
               <a:solidFill>
-                <a:srgbClr val="FFFFFF"/>
+                <a:srgbClr val="0070C0"/>
               </a:solidFill>
               <a:effectLst>
                 <a:outerShdw blurRad="63500" dir="3600000" algn="tl" rotWithShape="0">
@@ -6310,15 +6615,15 @@
         </p:blipFill>
         <p:spPr>
           <a:xfrm>
-            <a:off x="4714878" y="1369208"/>
+            <a:off x="4714880" y="1369209"/>
             <a:ext cx="3009003" cy="1369229"/>
           </a:xfrm>
           <a:prstGeom prst="rect">
             <a:avLst/>
           </a:prstGeom>
-          <a:ln w="38100" cap="sq">
+          <a:ln w="28575" cap="sq">
             <a:solidFill>
-              <a:schemeClr val="accent2"/>
+              <a:srgbClr val="0070C0"/>
             </a:solidFill>
             <a:prstDash val="solid"/>
             <a:miter lim="800000"/>
@@ -6412,7 +6717,11 @@
             </a:r>
             <a:r>
               <a:rPr lang="fr-FR" sz="2000" dirty="0" smtClean="0"/>
-              <a:t>Aspect gestion des ouvrants  </a:t>
+              <a:t>Aspect </a:t>
+            </a:r>
+            <a:r>
+              <a:rPr lang="fr-FR" sz="2000" dirty="0" smtClean="0"/>
+              <a:t>gestion</a:t>
             </a:r>
             <a:endParaRPr lang="fr-FR" sz="2000" dirty="0"/>
           </a:p>
@@ -6426,8 +6735,8 @@
         </p:nvSpPr>
         <p:spPr>
           <a:xfrm>
-            <a:off x="4572002" y="3274223"/>
-            <a:ext cx="3922869" cy="1323439"/>
+            <a:off x="4572003" y="3274224"/>
+            <a:ext cx="3674724" cy="1323439"/>
           </a:xfrm>
           <a:prstGeom prst="rect">
             <a:avLst/>
@@ -6510,9 +6819,9 @@
           <a:prstGeom prst="rect">
             <a:avLst/>
           </a:prstGeom>
-          <a:ln w="38100" cap="sq">
+          <a:ln w="28575" cap="sq">
             <a:solidFill>
-              <a:schemeClr val="accent2"/>
+              <a:srgbClr val="0070C0"/>
             </a:solidFill>
             <a:prstDash val="solid"/>
             <a:miter lim="800000"/>
@@ -6581,15 +6890,15 @@
           <a:lstStyle/>
           <a:p>
             <a:r>
-              <a:rPr lang="fr-FR" dirty="0" smtClean="0">
-                <a:ln w="18415" cmpd="sng">
+              <a:rPr lang="fr-FR" sz="4800" dirty="0" smtClean="0">
+                <a:ln w="3175" cmpd="sng">
                   <a:solidFill>
                     <a:srgbClr val="FFFFFF"/>
                   </a:solidFill>
                   <a:prstDash val="solid"/>
                 </a:ln>
                 <a:solidFill>
-                  <a:srgbClr val="FFFFFF"/>
+                  <a:srgbClr val="0070C0"/>
                 </a:solidFill>
                 <a:effectLst>
                   <a:outerShdw blurRad="63500" dir="3600000" algn="tl" rotWithShape="0">
@@ -6599,7 +6908,28 @@
                   </a:outerShdw>
                 </a:effectLst>
               </a:rPr>
-              <a:t>Architecture matériel</a:t>
+              <a:t>A</a:t>
+            </a:r>
+            <a:r>
+              <a:rPr lang="fr-FR" sz="4800" dirty="0" smtClean="0">
+                <a:ln w="3175" cmpd="sng">
+                  <a:solidFill>
+                    <a:srgbClr val="FFFFFF"/>
+                  </a:solidFill>
+                  <a:prstDash val="solid"/>
+                </a:ln>
+                <a:solidFill>
+                  <a:srgbClr val="0070C0"/>
+                </a:solidFill>
+                <a:effectLst>
+                  <a:outerShdw blurRad="63500" dir="3600000" algn="tl" rotWithShape="0">
+                    <a:srgbClr val="000000">
+                      <a:alpha val="70000"/>
+                    </a:srgbClr>
+                  </a:outerShdw>
+                </a:effectLst>
+              </a:rPr>
+              <a:t>rchitecture matérielle </a:t>
             </a:r>
             <a:endParaRPr lang="fr-FR" dirty="0">
               <a:ln w="18415" cmpd="sng">
@@ -6640,15 +6970,15 @@
         </p:blipFill>
         <p:spPr>
           <a:xfrm>
-            <a:off x="178563" y="714360"/>
-            <a:ext cx="8786874" cy="4881597"/>
+            <a:off x="457200" y="1333500"/>
+            <a:ext cx="7467600" cy="3771636"/>
           </a:xfrm>
           <a:prstGeom prst="rect">
             <a:avLst/>
           </a:prstGeom>
-          <a:ln w="38100" cap="sq">
+          <a:ln w="28575" cap="sq">
             <a:solidFill>
-              <a:schemeClr val="accent2"/>
+              <a:srgbClr val="0070C0"/>
             </a:solidFill>
             <a:prstDash val="solid"/>
             <a:miter lim="800000"/>
@@ -6711,7 +7041,7 @@
         </p:blipFill>
         <p:spPr bwMode="auto">
           <a:xfrm>
-            <a:off x="174750" y="1504310"/>
+            <a:off x="174750" y="1504311"/>
             <a:ext cx="8696948" cy="3151101"/>
           </a:xfrm>
           <a:prstGeom prst="rect">
@@ -6750,7 +7080,7 @@
         </p:blipFill>
         <p:spPr bwMode="auto">
           <a:xfrm>
-            <a:off x="174574" y="1094114"/>
+            <a:off x="174576" y="1094114"/>
             <a:ext cx="8736385" cy="4178633"/>
           </a:xfrm>
           <a:prstGeom prst="rect">
@@ -6831,9 +7161,9 @@
           <a:prstGeom prst="rect">
             <a:avLst/>
           </a:prstGeom>
-          <a:ln w="38100" cap="sq">
+          <a:ln w="28575" cap="sq">
             <a:solidFill>
-              <a:schemeClr val="accent2"/>
+              <a:srgbClr val="0070C0"/>
             </a:solidFill>
             <a:prstDash val="solid"/>
             <a:miter lim="800000"/>
@@ -6855,8 +7185,8 @@
         </p:nvSpPr>
         <p:spPr>
           <a:xfrm>
-            <a:off x="5643570" y="142856"/>
-            <a:ext cx="3432350" cy="400110"/>
+            <a:off x="5643571" y="142856"/>
+            <a:ext cx="3049233" cy="400110"/>
           </a:xfrm>
           <a:prstGeom prst="rect">
             <a:avLst/>
@@ -7081,7 +7411,7 @@
         </p:nvSpPr>
         <p:spPr>
           <a:xfrm>
-            <a:off x="500035" y="4714888"/>
+            <a:off x="500035" y="4714889"/>
             <a:ext cx="2000264" cy="753524"/>
           </a:xfrm>
           <a:prstGeom prst="rect">
@@ -7127,7 +7457,7 @@
         </p:nvSpPr>
         <p:spPr>
           <a:xfrm>
-            <a:off x="3000364" y="2000244"/>
+            <a:off x="3000366" y="2000244"/>
             <a:ext cx="2428893" cy="727592"/>
           </a:xfrm>
           <a:prstGeom prst="rect">
@@ -7173,7 +7503,7 @@
         </p:nvSpPr>
         <p:spPr>
           <a:xfrm>
-            <a:off x="4132609" y="2944758"/>
+            <a:off x="4132609" y="2944759"/>
             <a:ext cx="2368218" cy="698559"/>
           </a:xfrm>
           <a:prstGeom prst="rect">
@@ -7449,7 +7779,7 @@
         </p:nvSpPr>
         <p:spPr>
           <a:xfrm>
-            <a:off x="7207381" y="3071814"/>
+            <a:off x="7207383" y="3071814"/>
             <a:ext cx="1722337" cy="642942"/>
           </a:xfrm>
           <a:prstGeom prst="rect">
@@ -7495,7 +7825,7 @@
         </p:nvSpPr>
         <p:spPr>
           <a:xfrm>
-            <a:off x="6135485" y="3929070"/>
+            <a:off x="6135487" y="3929070"/>
             <a:ext cx="1722663" cy="642942"/>
           </a:xfrm>
           <a:prstGeom prst="rect">
@@ -7555,14 +7885,14 @@
           <a:p>
             <a:r>
               <a:rPr lang="fr-FR" dirty="0" smtClean="0">
-                <a:ln w="18415" cmpd="sng">
+                <a:ln w="3175" cmpd="sng">
                   <a:solidFill>
                     <a:srgbClr val="FFFFFF"/>
                   </a:solidFill>
                   <a:prstDash val="solid"/>
                 </a:ln>
                 <a:solidFill>
-                  <a:srgbClr val="FFFFFF"/>
+                  <a:srgbClr val="0070C0"/>
                 </a:solidFill>
                 <a:effectLst>
                   <a:outerShdw blurRad="63500" dir="3600000" algn="tl" rotWithShape="0">
@@ -7575,14 +7905,14 @@
               <a:t>Analyse fonctionnel </a:t>
             </a:r>
             <a:endParaRPr lang="fr-FR" dirty="0">
-              <a:ln w="18415" cmpd="sng">
+              <a:ln w="3175" cmpd="sng">
                 <a:solidFill>
                   <a:srgbClr val="FFFFFF"/>
                 </a:solidFill>
                 <a:prstDash val="solid"/>
               </a:ln>
               <a:solidFill>
-                <a:srgbClr val="FFFFFF"/>
+                <a:srgbClr val="0070C0"/>
               </a:solidFill>
               <a:effectLst>
                 <a:outerShdw blurRad="63500" dir="3600000" algn="tl" rotWithShape="0">
@@ -8829,15 +9159,15 @@
         </p:blipFill>
         <p:spPr bwMode="auto">
           <a:xfrm>
-            <a:off x="682134" y="1428740"/>
+            <a:off x="682136" y="1428741"/>
             <a:ext cx="7779737" cy="4184909"/>
           </a:xfrm>
           <a:prstGeom prst="rect">
             <a:avLst/>
           </a:prstGeom>
-          <a:ln w="38100" cap="sq">
+          <a:ln w="28575" cap="sq">
             <a:solidFill>
-              <a:schemeClr val="accent2"/>
+              <a:srgbClr val="0070C0"/>
             </a:solidFill>
             <a:prstDash val="solid"/>
             <a:miter lim="800000"/>
@@ -8859,8 +9189,8 @@
         </p:nvSpPr>
         <p:spPr>
           <a:xfrm>
-            <a:off x="214282" y="571484"/>
-            <a:ext cx="3868367" cy="400110"/>
+            <a:off x="214283" y="571484"/>
+            <a:ext cx="3516668" cy="400110"/>
           </a:xfrm>
           <a:prstGeom prst="rect">
             <a:avLst/>
@@ -8920,15 +9250,15 @@
         </p:blipFill>
         <p:spPr bwMode="auto">
           <a:xfrm>
-            <a:off x="1000102" y="595297"/>
+            <a:off x="1000104" y="595298"/>
             <a:ext cx="5540493" cy="3155179"/>
           </a:xfrm>
           <a:prstGeom prst="rect">
             <a:avLst/>
           </a:prstGeom>
-          <a:ln w="38100" cap="sq">
+          <a:ln w="28575" cap="sq">
             <a:solidFill>
-              <a:schemeClr val="accent2"/>
+              <a:srgbClr val="0070C0"/>
             </a:solidFill>
             <a:prstDash val="solid"/>
             <a:miter lim="800000"/>
@@ -8959,15 +9289,15 @@
         </p:blipFill>
         <p:spPr bwMode="auto">
           <a:xfrm>
-            <a:off x="1643042" y="2143121"/>
+            <a:off x="1643042" y="2143122"/>
             <a:ext cx="6775622" cy="2131221"/>
           </a:xfrm>
           <a:prstGeom prst="rect">
             <a:avLst/>
           </a:prstGeom>
-          <a:ln w="38100" cap="sq">
+          <a:ln w="28575" cap="sq">
             <a:solidFill>
-              <a:schemeClr val="accent2"/>
+              <a:srgbClr val="0070C0"/>
             </a:solidFill>
             <a:prstDash val="solid"/>
             <a:miter lim="800000"/>
@@ -8998,15 +9328,15 @@
         </p:blipFill>
         <p:spPr bwMode="auto">
           <a:xfrm>
-            <a:off x="3500430" y="119044"/>
+            <a:off x="3500430" y="119045"/>
             <a:ext cx="5294816" cy="2678926"/>
           </a:xfrm>
           <a:prstGeom prst="rect">
             <a:avLst/>
           </a:prstGeom>
-          <a:ln w="38100" cap="sq">
+          <a:ln w="28575" cap="sq">
             <a:solidFill>
-              <a:schemeClr val="accent2"/>
+              <a:srgbClr val="0070C0"/>
             </a:solidFill>
             <a:prstDash val="solid"/>
             <a:miter lim="800000"/>
@@ -9043,9 +9373,9 @@
           <a:prstGeom prst="rect">
             <a:avLst/>
           </a:prstGeom>
-          <a:ln w="38100" cap="sq">
+          <a:ln w="28575" cap="sq">
             <a:solidFill>
-              <a:schemeClr val="accent2"/>
+              <a:srgbClr val="0070C0"/>
             </a:solidFill>
             <a:prstDash val="solid"/>
             <a:miter lim="800000"/>
@@ -9082,9 +9412,9 @@
           <a:prstGeom prst="rect">
             <a:avLst/>
           </a:prstGeom>
-          <a:ln w="38100" cap="sq">
+          <a:ln w="28575" cap="sq">
             <a:solidFill>
-              <a:schemeClr val="accent2"/>
+              <a:srgbClr val="0070C0"/>
             </a:solidFill>
             <a:prstDash val="solid"/>
             <a:miter lim="800000"/>
@@ -9121,9 +9451,9 @@
           <a:prstGeom prst="rect">
             <a:avLst/>
           </a:prstGeom>
-          <a:ln w="38100" cap="sq">
+          <a:ln w="28575" cap="sq">
             <a:solidFill>
-              <a:schemeClr val="accent2"/>
+              <a:srgbClr val="0070C0"/>
             </a:solidFill>
             <a:prstDash val="solid"/>
             <a:miter lim="800000"/>
@@ -9154,15 +9484,15 @@
         </p:blipFill>
         <p:spPr bwMode="auto">
           <a:xfrm>
-            <a:off x="6000762" y="4311450"/>
+            <a:off x="6000764" y="4311450"/>
             <a:ext cx="1743075" cy="1285876"/>
           </a:xfrm>
           <a:prstGeom prst="rect">
             <a:avLst/>
           </a:prstGeom>
-          <a:ln w="38100" cap="sq">
+          <a:ln w="28575" cap="sq">
             <a:solidFill>
-              <a:schemeClr val="accent2"/>
+              <a:srgbClr val="0070C0"/>
             </a:solidFill>
             <a:prstDash val="solid"/>
             <a:miter lim="800000"/>
@@ -9503,7 +9833,7 @@
 </file>
 
 <file path=ppt/slides/slide6.xml><?xml version="1.0" encoding="utf-8"?>
-<p:sld xmlns:a="http://schemas.openxmlformats.org/drawingml/2006/main" xmlns:r="http://schemas.openxmlformats.org/officeDocument/2006/relationships" xmlns:p="http://schemas.openxmlformats.org/presentationml/2006/main">
+<p:sld xmlns:a="http://schemas.openxmlformats.org/drawingml/2006/main" xmlns:r="http://schemas.openxmlformats.org/officeDocument/2006/relationships" xmlns:p="http://schemas.openxmlformats.org/presentationml/2006/main" show="0">
   <p:cSld>
     <p:spTree>
       <p:nvGrpSpPr>
@@ -9593,7 +9923,7 @@
         </p:blipFill>
         <p:spPr bwMode="auto">
           <a:xfrm>
-            <a:off x="571472" y="1026118"/>
+            <a:off x="571472" y="1026119"/>
             <a:ext cx="8001056" cy="4623189"/>
           </a:xfrm>
           <a:prstGeom prst="rect">
@@ -9620,6 +9950,7 @@
   <p:clrMapOvr>
     <a:masterClrMapping/>
   </p:clrMapOvr>
+  <p:transition/>
   <p:timing>
     <p:tnLst>
       <p:par>
@@ -9631,7 +9962,7 @@
 </file>
 
 <file path=ppt/slides/slide7.xml><?xml version="1.0" encoding="utf-8"?>
-<p:sld xmlns:a="http://schemas.openxmlformats.org/drawingml/2006/main" xmlns:r="http://schemas.openxmlformats.org/officeDocument/2006/relationships" xmlns:p="http://schemas.openxmlformats.org/presentationml/2006/main">
+<p:sld xmlns:a="http://schemas.openxmlformats.org/drawingml/2006/main" xmlns:r="http://schemas.openxmlformats.org/officeDocument/2006/relationships" xmlns:p="http://schemas.openxmlformats.org/presentationml/2006/main" show="0">
   <p:cSld>
     <p:spTree>
       <p:nvGrpSpPr>
@@ -9731,6 +10062,7 @@
   <p:clrMapOvr>
     <a:masterClrMapping/>
   </p:clrMapOvr>
+  <p:transition/>
   <p:timing>
     <p:tnLst>
       <p:par>
@@ -9742,7 +10074,7 @@
 </file>
 
 <file path=ppt/slides/slide8.xml><?xml version="1.0" encoding="utf-8"?>
-<p:sld xmlns:a="http://schemas.openxmlformats.org/drawingml/2006/main" xmlns:r="http://schemas.openxmlformats.org/officeDocument/2006/relationships" xmlns:p="http://schemas.openxmlformats.org/presentationml/2006/main">
+<p:sld xmlns:a="http://schemas.openxmlformats.org/drawingml/2006/main" xmlns:r="http://schemas.openxmlformats.org/officeDocument/2006/relationships" xmlns:p="http://schemas.openxmlformats.org/presentationml/2006/main" show="0">
   <p:cSld>
     <p:spTree>
       <p:nvGrpSpPr>
@@ -9832,7 +10164,7 @@
         </p:blipFill>
         <p:spPr bwMode="auto">
           <a:xfrm>
-            <a:off x="659132" y="1643054"/>
+            <a:off x="659134" y="1643054"/>
             <a:ext cx="7825737" cy="2577055"/>
           </a:xfrm>
           <a:prstGeom prst="rect">
@@ -9859,6 +10191,7 @@
   <p:clrMapOvr>
     <a:masterClrMapping/>
   </p:clrMapOvr>
+  <p:transition/>
   <p:timing>
     <p:tnLst>
       <p:par>
@@ -9894,8 +10227,8 @@
         </p:nvSpPr>
         <p:spPr>
           <a:xfrm>
-            <a:off x="71406" y="71418"/>
-            <a:ext cx="5014514" cy="461665"/>
+            <a:off x="71407" y="71419"/>
+            <a:ext cx="4485395" cy="461665"/>
           </a:xfrm>
           <a:prstGeom prst="rect">
             <a:avLst/>
@@ -9969,9 +10302,9 @@
           <a:prstGeom prst="rect">
             <a:avLst/>
           </a:prstGeom>
-          <a:ln w="38100" cap="sq">
+          <a:ln w="28575" cap="sq">
             <a:solidFill>
-              <a:schemeClr val="accent2"/>
+              <a:srgbClr val="0070C0"/>
             </a:solidFill>
             <a:prstDash val="solid"/>
             <a:miter lim="800000"/>
@@ -10002,7 +10335,7 @@
         </p:blipFill>
         <p:spPr bwMode="auto">
           <a:xfrm>
-            <a:off x="1142976" y="1214426"/>
+            <a:off x="1142976" y="1214427"/>
             <a:ext cx="1000132" cy="139091"/>
           </a:xfrm>
           <a:prstGeom prst="rect">
@@ -10036,7 +10369,7 @@
 <file path=ppt/theme/theme1.xml><?xml version="1.0" encoding="utf-8"?>
 <a:theme xmlns:a="http://schemas.openxmlformats.org/drawingml/2006/main" name="Technique">
   <a:themeElements>
-    <a:clrScheme name="Promenade">
+    <a:clrScheme name="Rotonde">
       <a:dk1>
         <a:sysClr val="windowText" lastClr="000000"/>
       </a:dk1>
@@ -10044,34 +10377,34 @@
         <a:sysClr val="window" lastClr="FFFFFF"/>
       </a:lt1>
       <a:dk2>
-        <a:srgbClr val="4E3B30"/>
+        <a:srgbClr val="464646"/>
       </a:dk2>
       <a:lt2>
-        <a:srgbClr val="FBEEC9"/>
+        <a:srgbClr val="DEF5FA"/>
       </a:lt2>
       <a:accent1>
-        <a:srgbClr val="F0A22E"/>
+        <a:srgbClr val="2DA2BF"/>
       </a:accent1>
       <a:accent2>
-        <a:srgbClr val="A5644E"/>
+        <a:srgbClr val="DA1F28"/>
       </a:accent2>
       <a:accent3>
-        <a:srgbClr val="B58B80"/>
+        <a:srgbClr val="EB641B"/>
       </a:accent3>
       <a:accent4>
-        <a:srgbClr val="C3986D"/>
+        <a:srgbClr val="39639D"/>
       </a:accent4>
       <a:accent5>
-        <a:srgbClr val="A19574"/>
+        <a:srgbClr val="474B78"/>
       </a:accent5>
       <a:accent6>
-        <a:srgbClr val="C17529"/>
+        <a:srgbClr val="7D3C4A"/>
       </a:accent6>
       <a:hlink>
-        <a:srgbClr val="AD1F1F"/>
+        <a:srgbClr val="FF8119"/>
       </a:hlink>
       <a:folHlink>
-        <a:srgbClr val="FFC42F"/>
+        <a:srgbClr val="44B9E8"/>
       </a:folHlink>
     </a:clrScheme>
     <a:fontScheme name="Technique">

</xml_diff>

<commit_message>
MAJ 16/04/2018 Signed-off-by: DrBlaf <chauveau.aurelien.76@gmail.com>
</commit_message>
<xml_diff>
--- a/Rapport/Benjamin/RevueDeProjet.pptx
+++ b/Rapport/Benjamin/RevueDeProjet.pptx
@@ -510,7 +510,7 @@
             <a:fld id="{7385B5F2-299D-41E4-81B4-55AECBC730DC}" type="datetimeFigureOut">
               <a:rPr lang="fr-FR" smtClean="0"/>
               <a:pPr/>
-              <a:t>15/03/2018</a:t>
+              <a:t>16/04/2018</a:t>
             </a:fld>
             <a:endParaRPr lang="fr-FR"/>
           </a:p>
@@ -677,7 +677,7 @@
             <a:fld id="{7385B5F2-299D-41E4-81B4-55AECBC730DC}" type="datetimeFigureOut">
               <a:rPr lang="fr-FR" smtClean="0"/>
               <a:pPr/>
-              <a:t>15/03/2018</a:t>
+              <a:t>16/04/2018</a:t>
             </a:fld>
             <a:endParaRPr lang="fr-FR"/>
           </a:p>
@@ -854,7 +854,7 @@
             <a:fld id="{7385B5F2-299D-41E4-81B4-55AECBC730DC}" type="datetimeFigureOut">
               <a:rPr lang="fr-FR" smtClean="0"/>
               <a:pPr/>
-              <a:t>15/03/2018</a:t>
+              <a:t>16/04/2018</a:t>
             </a:fld>
             <a:endParaRPr lang="fr-FR"/>
           </a:p>
@@ -1025,7 +1025,7 @@
             <a:fld id="{7385B5F2-299D-41E4-81B4-55AECBC730DC}" type="datetimeFigureOut">
               <a:rPr lang="fr-FR" smtClean="0"/>
               <a:pPr/>
-              <a:t>15/03/2018</a:t>
+              <a:t>16/04/2018</a:t>
             </a:fld>
             <a:endParaRPr lang="fr-FR"/>
           </a:p>
@@ -1482,7 +1482,7 @@
             <a:fld id="{7385B5F2-299D-41E4-81B4-55AECBC730DC}" type="datetimeFigureOut">
               <a:rPr lang="fr-FR" smtClean="0"/>
               <a:pPr/>
-              <a:t>15/03/2018</a:t>
+              <a:t>16/04/2018</a:t>
             </a:fld>
             <a:endParaRPr lang="fr-FR"/>
           </a:p>
@@ -1748,7 +1748,7 @@
             <a:fld id="{7385B5F2-299D-41E4-81B4-55AECBC730DC}" type="datetimeFigureOut">
               <a:rPr lang="fr-FR" smtClean="0"/>
               <a:pPr/>
-              <a:t>15/03/2018</a:t>
+              <a:t>16/04/2018</a:t>
             </a:fld>
             <a:endParaRPr lang="fr-FR"/>
           </a:p>
@@ -2124,7 +2124,7 @@
             <a:fld id="{7385B5F2-299D-41E4-81B4-55AECBC730DC}" type="datetimeFigureOut">
               <a:rPr lang="fr-FR" smtClean="0"/>
               <a:pPr/>
-              <a:t>15/03/2018</a:t>
+              <a:t>16/04/2018</a:t>
             </a:fld>
             <a:endParaRPr lang="fr-FR"/>
           </a:p>
@@ -2248,7 +2248,7 @@
             <a:fld id="{7385B5F2-299D-41E4-81B4-55AECBC730DC}" type="datetimeFigureOut">
               <a:rPr lang="fr-FR" smtClean="0"/>
               <a:pPr/>
-              <a:t>15/03/2018</a:t>
+              <a:t>16/04/2018</a:t>
             </a:fld>
             <a:endParaRPr lang="fr-FR"/>
           </a:p>
@@ -2340,7 +2340,7 @@
             <a:fld id="{7385B5F2-299D-41E4-81B4-55AECBC730DC}" type="datetimeFigureOut">
               <a:rPr lang="fr-FR" smtClean="0"/>
               <a:pPr/>
-              <a:t>15/03/2018</a:t>
+              <a:t>16/04/2018</a:t>
             </a:fld>
             <a:endParaRPr lang="fr-FR"/>
           </a:p>
@@ -2591,7 +2591,7 @@
             <a:fld id="{7385B5F2-299D-41E4-81B4-55AECBC730DC}" type="datetimeFigureOut">
               <a:rPr lang="fr-FR" smtClean="0"/>
               <a:pPr/>
-              <a:t>15/03/2018</a:t>
+              <a:t>16/04/2018</a:t>
             </a:fld>
             <a:endParaRPr lang="fr-FR"/>
           </a:p>
@@ -2852,7 +2852,7 @@
             <a:fld id="{7385B5F2-299D-41E4-81B4-55AECBC730DC}" type="datetimeFigureOut">
               <a:rPr lang="fr-FR" smtClean="0"/>
               <a:pPr/>
-              <a:t>15/03/2018</a:t>
+              <a:t>16/04/2018</a:t>
             </a:fld>
             <a:endParaRPr lang="fr-FR"/>
           </a:p>
@@ -3258,7 +3258,7 @@
             <a:fld id="{7385B5F2-299D-41E4-81B4-55AECBC730DC}" type="datetimeFigureOut">
               <a:rPr lang="fr-FR" smtClean="0"/>
               <a:pPr/>
-              <a:t>15/03/2018</a:t>
+              <a:t>16/04/2018</a:t>
             </a:fld>
             <a:endParaRPr lang="fr-FR"/>
           </a:p>
@@ -3762,7 +3762,7 @@
 </file>
 
 <file path=ppt/slides/slide10.xml><?xml version="1.0" encoding="utf-8"?>
-<p:sld xmlns:a="http://schemas.openxmlformats.org/drawingml/2006/main" xmlns:r="http://schemas.openxmlformats.org/officeDocument/2006/relationships" xmlns:p="http://schemas.openxmlformats.org/presentationml/2006/main">
+<p:sld xmlns:a="http://schemas.openxmlformats.org/drawingml/2006/main" xmlns:r="http://schemas.openxmlformats.org/officeDocument/2006/relationships" xmlns:p="http://schemas.openxmlformats.org/presentationml/2006/main" show="0">
   <p:cSld>
     <p:spTree>
       <p:nvGrpSpPr>
@@ -3882,6 +3882,7 @@
   <p:clrMapOvr>
     <a:masterClrMapping/>
   </p:clrMapOvr>
+  <p:transition/>
   <p:timing>
     <p:tnLst>
       <p:par>
@@ -3893,7 +3894,7 @@
 </file>
 
 <file path=ppt/slides/slide11.xml><?xml version="1.0" encoding="utf-8"?>
-<p:sld xmlns:a="http://schemas.openxmlformats.org/drawingml/2006/main" xmlns:r="http://schemas.openxmlformats.org/officeDocument/2006/relationships" xmlns:p="http://schemas.openxmlformats.org/presentationml/2006/main">
+<p:sld xmlns:a="http://schemas.openxmlformats.org/drawingml/2006/main" xmlns:r="http://schemas.openxmlformats.org/officeDocument/2006/relationships" xmlns:p="http://schemas.openxmlformats.org/presentationml/2006/main" show="0">
   <p:cSld>
     <p:spTree>
       <p:nvGrpSpPr>
@@ -4046,6 +4047,7 @@
   <p:clrMapOvr>
     <a:masterClrMapping/>
   </p:clrMapOvr>
+  <p:transition/>
   <p:timing>
     <p:tnLst>
       <p:par>
@@ -5184,11 +5186,7 @@
           <a:p>
             <a:r>
               <a:rPr lang="fr-FR" dirty="0" smtClean="0"/>
-              <a:t>Détecteur </a:t>
-            </a:r>
-            <a:r>
-              <a:rPr lang="fr-FR" dirty="0" smtClean="0"/>
-              <a:t>incendie</a:t>
+              <a:t>Détecteur incendie</a:t>
             </a:r>
             <a:endParaRPr lang="fr-FR" dirty="0"/>
           </a:p>
@@ -5211,7 +5209,7 @@
         </p:blipFill>
         <p:spPr bwMode="auto">
           <a:xfrm>
-            <a:off x="3286118" y="2786063"/>
+            <a:off x="5214942" y="1785930"/>
             <a:ext cx="2459215" cy="1014335"/>
           </a:xfrm>
           <a:prstGeom prst="rect">
@@ -5285,45 +5283,8 @@
         </p:blipFill>
         <p:spPr bwMode="auto">
           <a:xfrm>
-            <a:off x="1357292" y="4429137"/>
+            <a:off x="3357554" y="3714756"/>
             <a:ext cx="2933697" cy="1150553"/>
-          </a:xfrm>
-          <a:prstGeom prst="rect">
-            <a:avLst/>
-          </a:prstGeom>
-          <a:noFill/>
-          <a:ln w="28575">
-            <a:solidFill>
-              <a:schemeClr val="tx2">
-                <a:lumMod val="90000"/>
-              </a:schemeClr>
-            </a:solidFill>
-            <a:miter lim="800000"/>
-            <a:headEnd/>
-            <a:tailEnd/>
-          </a:ln>
-          <a:effectLst/>
-        </p:spPr>
-      </p:pic>
-      <p:pic>
-        <p:nvPicPr>
-          <p:cNvPr id="1026" name="Picture 2"/>
-          <p:cNvPicPr>
-            <a:picLocks noChangeAspect="1" noChangeArrowheads="1"/>
-          </p:cNvPicPr>
-          <p:nvPr/>
-        </p:nvPicPr>
-        <p:blipFill>
-          <a:blip r:embed="rId5"/>
-          <a:srcRect/>
-          <a:stretch>
-            <a:fillRect/>
-          </a:stretch>
-        </p:blipFill>
-        <p:spPr bwMode="auto">
-          <a:xfrm>
-            <a:off x="6786578" y="2714624"/>
-            <a:ext cx="1643074" cy="2547000"/>
           </a:xfrm>
           <a:prstGeom prst="rect">
             <a:avLst/>
@@ -5432,7 +5393,7 @@
         </p:blipFill>
         <p:spPr bwMode="auto">
           <a:xfrm>
-            <a:off x="571472" y="2000245"/>
+            <a:off x="1428728" y="2714624"/>
             <a:ext cx="1219184" cy="1219184"/>
           </a:xfrm>
           <a:prstGeom prst="rect">
@@ -5465,7 +5426,7 @@
         </p:blipFill>
         <p:spPr bwMode="auto">
           <a:xfrm>
-            <a:off x="571472" y="3500442"/>
+            <a:off x="4857752" y="2643186"/>
             <a:ext cx="3000396" cy="1494338"/>
           </a:xfrm>
           <a:prstGeom prst="rect">
@@ -5520,53 +5481,12 @@
           <a:p>
             <a:r>
               <a:rPr lang="fr-FR" dirty="0" smtClean="0"/>
-              <a:t>Détecteur de </a:t>
-            </a:r>
-            <a:r>
-              <a:rPr lang="fr-FR" dirty="0" smtClean="0"/>
-              <a:t>mouvement</a:t>
+              <a:t>Détecteur de mouvement</a:t>
             </a:r>
             <a:endParaRPr lang="fr-FR" dirty="0"/>
           </a:p>
         </p:txBody>
       </p:sp>
-      <p:pic>
-        <p:nvPicPr>
-          <p:cNvPr id="2050" name="Picture 2"/>
-          <p:cNvPicPr>
-            <a:picLocks noChangeAspect="1" noChangeArrowheads="1"/>
-          </p:cNvPicPr>
-          <p:nvPr/>
-        </p:nvPicPr>
-        <p:blipFill>
-          <a:blip r:embed="rId4"/>
-          <a:srcRect/>
-          <a:stretch>
-            <a:fillRect/>
-          </a:stretch>
-        </p:blipFill>
-        <p:spPr bwMode="auto">
-          <a:xfrm>
-            <a:off x="5072066" y="2143121"/>
-            <a:ext cx="2071702" cy="2610235"/>
-          </a:xfrm>
-          <a:prstGeom prst="rect">
-            <a:avLst/>
-          </a:prstGeom>
-          <a:noFill/>
-          <a:ln w="28575">
-            <a:solidFill>
-              <a:schemeClr val="tx2">
-                <a:lumMod val="90000"/>
-              </a:schemeClr>
-            </a:solidFill>
-            <a:miter lim="800000"/>
-            <a:headEnd/>
-            <a:tailEnd/>
-          </a:ln>
-          <a:effectLst/>
-        </p:spPr>
-      </p:pic>
     </p:spTree>
   </p:cSld>
   <p:clrMapOvr>
@@ -5616,7 +5536,7 @@
         </p:blipFill>
         <p:spPr bwMode="auto">
           <a:xfrm>
-            <a:off x="1214414" y="3571880"/>
+            <a:off x="4500562" y="2786062"/>
             <a:ext cx="2456738" cy="1552572"/>
           </a:xfrm>
           <a:prstGeom prst="rect">
@@ -5723,11 +5643,7 @@
           <a:p>
             <a:r>
               <a:rPr lang="fr-FR" dirty="0" smtClean="0"/>
-              <a:t>Relai </a:t>
-            </a:r>
-            <a:r>
-              <a:rPr lang="fr-FR" dirty="0" smtClean="0"/>
-              <a:t>lumière</a:t>
+              <a:t>Relai lumière</a:t>
             </a:r>
             <a:endParaRPr lang="fr-FR" dirty="0"/>
           </a:p>
@@ -5735,7 +5651,7 @@
       </p:sp>
       <p:pic>
         <p:nvPicPr>
-          <p:cNvPr id="29699" name="Picture 3"/>
+          <p:cNvPr id="29700" name="Picture 4" descr="Q:\domotique\lumier.jpg"/>
           <p:cNvPicPr>
             <a:picLocks noChangeAspect="1" noChangeArrowheads="1"/>
           </p:cNvPicPr>
@@ -5750,44 +5666,7 @@
         </p:blipFill>
         <p:spPr bwMode="auto">
           <a:xfrm>
-            <a:off x="5643570" y="2786062"/>
-            <a:ext cx="1214446" cy="1584300"/>
-          </a:xfrm>
-          <a:prstGeom prst="rect">
-            <a:avLst/>
-          </a:prstGeom>
-          <a:noFill/>
-          <a:ln w="28575">
-            <a:solidFill>
-              <a:schemeClr val="tx2">
-                <a:lumMod val="90000"/>
-              </a:schemeClr>
-            </a:solidFill>
-            <a:miter lim="800000"/>
-            <a:headEnd/>
-            <a:tailEnd/>
-          </a:ln>
-          <a:effectLst/>
-        </p:spPr>
-      </p:pic>
-      <p:pic>
-        <p:nvPicPr>
-          <p:cNvPr id="29700" name="Picture 4" descr="Q:\domotique\lumier.jpg"/>
-          <p:cNvPicPr>
-            <a:picLocks noChangeAspect="1" noChangeArrowheads="1"/>
-          </p:cNvPicPr>
-          <p:nvPr/>
-        </p:nvPicPr>
-        <p:blipFill>
-          <a:blip r:embed="rId4"/>
-          <a:srcRect/>
-          <a:stretch>
-            <a:fillRect/>
-          </a:stretch>
-        </p:blipFill>
-        <p:spPr bwMode="auto">
-          <a:xfrm>
-            <a:off x="785788" y="2071683"/>
+            <a:off x="1500166" y="2714624"/>
             <a:ext cx="1071563" cy="1071563"/>
           </a:xfrm>
           <a:prstGeom prst="rect">
@@ -5922,11 +5801,7 @@
           <a:p>
             <a:r>
               <a:rPr lang="fr-FR" dirty="0" smtClean="0"/>
-              <a:t>Capteur de </a:t>
-            </a:r>
-            <a:r>
-              <a:rPr lang="fr-FR" dirty="0" smtClean="0"/>
-              <a:t>luminosité</a:t>
+              <a:t>Capteur de luminosité</a:t>
             </a:r>
             <a:endParaRPr lang="fr-FR" dirty="0"/>
           </a:p>
@@ -5949,7 +5824,7 @@
         </p:blipFill>
         <p:spPr bwMode="auto">
           <a:xfrm>
-            <a:off x="642910" y="3714757"/>
+            <a:off x="4286248" y="3286128"/>
             <a:ext cx="2681286" cy="1155423"/>
           </a:xfrm>
           <a:prstGeom prst="rect">
@@ -5992,47 +5867,6 @@
           <a:xfrm>
             <a:off x="1142976" y="2071683"/>
             <a:ext cx="1096028" cy="823911"/>
-          </a:xfrm>
-          <a:prstGeom prst="rect">
-            <a:avLst/>
-          </a:prstGeom>
-          <a:ln w="28575" cap="sq">
-            <a:solidFill>
-              <a:schemeClr val="tx2">
-                <a:lumMod val="90000"/>
-              </a:schemeClr>
-            </a:solidFill>
-            <a:prstDash val="solid"/>
-            <a:miter lim="800000"/>
-          </a:ln>
-          <a:effectLst>
-            <a:outerShdw blurRad="50800" dist="38100" dir="2700000" algn="tl" rotWithShape="0">
-              <a:srgbClr val="000000">
-                <a:alpha val="43000"/>
-              </a:srgbClr>
-            </a:outerShdw>
-          </a:effectLst>
-        </p:spPr>
-      </p:pic>
-      <p:pic>
-        <p:nvPicPr>
-          <p:cNvPr id="1026" name="Picture 2"/>
-          <p:cNvPicPr>
-            <a:picLocks noChangeAspect="1" noChangeArrowheads="1"/>
-          </p:cNvPicPr>
-          <p:nvPr/>
-        </p:nvPicPr>
-        <p:blipFill>
-          <a:blip r:embed="rId4"/>
-          <a:srcRect/>
-          <a:stretch>
-            <a:fillRect/>
-          </a:stretch>
-        </p:blipFill>
-        <p:spPr bwMode="auto">
-          <a:xfrm>
-            <a:off x="4857754" y="2571748"/>
-            <a:ext cx="2776537" cy="2176462"/>
           </a:xfrm>
           <a:prstGeom prst="rect">
             <a:avLst/>
@@ -6087,9 +5921,102 @@
           <a:chExt cx="0" cy="0"/>
         </a:xfrm>
       </p:grpSpPr>
+      <p:sp>
+        <p:nvSpPr>
+          <p:cNvPr id="6" name="Titre 1"/>
+          <p:cNvSpPr>
+            <a:spLocks noGrp="1"/>
+          </p:cNvSpPr>
+          <p:nvPr>
+            <p:ph type="title"/>
+          </p:nvPr>
+        </p:nvSpPr>
+        <p:spPr>
+          <a:xfrm>
+            <a:off x="457200" y="228866"/>
+            <a:ext cx="8043890" cy="952500"/>
+          </a:xfrm>
+        </p:spPr>
+        <p:txBody>
+          <a:bodyPr>
+            <a:normAutofit fontScale="90000"/>
+          </a:bodyPr>
+          <a:lstStyle/>
+          <a:p>
+            <a:r>
+              <a:rPr lang="fr-FR" dirty="0" smtClean="0">
+                <a:ln w="3175">
+                  <a:solidFill>
+                    <a:schemeClr val="tx1"/>
+                  </a:solidFill>
+                </a:ln>
+                <a:solidFill>
+                  <a:srgbClr val="0070C0"/>
+                </a:solidFill>
+              </a:rPr>
+              <a:t>Tests unitaires : Gestion des volets</a:t>
+            </a:r>
+            <a:endParaRPr lang="fr-FR" dirty="0">
+              <a:ln w="3175">
+                <a:solidFill>
+                  <a:schemeClr val="tx1"/>
+                </a:solidFill>
+              </a:ln>
+              <a:solidFill>
+                <a:srgbClr val="0070C0"/>
+              </a:solidFill>
+            </a:endParaRPr>
+          </a:p>
+        </p:txBody>
+      </p:sp>
+      <p:sp>
+        <p:nvSpPr>
+          <p:cNvPr id="7" name="ZoneTexte 6"/>
+          <p:cNvSpPr txBox="1"/>
+          <p:nvPr/>
+        </p:nvSpPr>
+        <p:spPr>
+          <a:xfrm>
+            <a:off x="642912" y="1214426"/>
+            <a:ext cx="1556901" cy="369332"/>
+          </a:xfrm>
+          <a:prstGeom prst="rect">
+            <a:avLst/>
+          </a:prstGeom>
+          <a:noFill/>
+          <a:ln>
+            <a:noFill/>
+          </a:ln>
+          <a:effectLst/>
+          <a:scene3d>
+            <a:camera prst="orthographicFront">
+              <a:rot lat="0" lon="0" rev="0"/>
+            </a:camera>
+            <a:lightRig rig="chilly" dir="t">
+              <a:rot lat="0" lon="0" rev="18480000"/>
+            </a:lightRig>
+          </a:scene3d>
+          <a:sp3d prstMaterial="clear">
+            <a:bevelT h="63500"/>
+          </a:sp3d>
+        </p:spPr>
+        <p:txBody>
+          <a:bodyPr wrap="none" rtlCol="0">
+            <a:spAutoFit/>
+          </a:bodyPr>
+          <a:lstStyle/>
+          <a:p>
+            <a:r>
+              <a:rPr lang="fr-FR" dirty="0" smtClean="0"/>
+              <a:t>Volet Roulant</a:t>
+            </a:r>
+            <a:endParaRPr lang="fr-FR" dirty="0"/>
+          </a:p>
+        </p:txBody>
+      </p:sp>
       <p:pic>
         <p:nvPicPr>
-          <p:cNvPr id="1026" name="Picture 2"/>
+          <p:cNvPr id="1027" name="Picture 3"/>
           <p:cNvPicPr>
             <a:picLocks noChangeAspect="1" noChangeArrowheads="1"/>
           </p:cNvPicPr>
@@ -6104,8 +6031,8 @@
         </p:blipFill>
         <p:spPr bwMode="auto">
           <a:xfrm>
-            <a:off x="5857884" y="2643187"/>
-            <a:ext cx="3186114" cy="2945455"/>
+            <a:off x="5286380" y="2143120"/>
+            <a:ext cx="2214578" cy="2981163"/>
           </a:xfrm>
           <a:prstGeom prst="rect">
             <a:avLst/>
@@ -6128,144 +6055,6 @@
           </a:effectLst>
         </p:spPr>
       </p:pic>
-      <p:sp>
-        <p:nvSpPr>
-          <p:cNvPr id="6" name="Titre 1"/>
-          <p:cNvSpPr>
-            <a:spLocks noGrp="1"/>
-          </p:cNvSpPr>
-          <p:nvPr>
-            <p:ph type="title"/>
-          </p:nvPr>
-        </p:nvSpPr>
-        <p:spPr>
-          <a:xfrm>
-            <a:off x="457200" y="228866"/>
-            <a:ext cx="8043890" cy="952500"/>
-          </a:xfrm>
-        </p:spPr>
-        <p:txBody>
-          <a:bodyPr>
-            <a:normAutofit fontScale="90000"/>
-          </a:bodyPr>
-          <a:lstStyle/>
-          <a:p>
-            <a:r>
-              <a:rPr lang="fr-FR" dirty="0" smtClean="0">
-                <a:ln w="3175">
-                  <a:solidFill>
-                    <a:schemeClr val="tx1"/>
-                  </a:solidFill>
-                </a:ln>
-                <a:solidFill>
-                  <a:srgbClr val="0070C0"/>
-                </a:solidFill>
-              </a:rPr>
-              <a:t>Tests unitaires : Gestion des volets</a:t>
-            </a:r>
-            <a:endParaRPr lang="fr-FR" dirty="0">
-              <a:ln w="3175">
-                <a:solidFill>
-                  <a:schemeClr val="tx1"/>
-                </a:solidFill>
-              </a:ln>
-              <a:solidFill>
-                <a:srgbClr val="0070C0"/>
-              </a:solidFill>
-            </a:endParaRPr>
-          </a:p>
-        </p:txBody>
-      </p:sp>
-      <p:sp>
-        <p:nvSpPr>
-          <p:cNvPr id="7" name="ZoneTexte 6"/>
-          <p:cNvSpPr txBox="1"/>
-          <p:nvPr/>
-        </p:nvSpPr>
-        <p:spPr>
-          <a:xfrm>
-            <a:off x="642912" y="1214426"/>
-            <a:ext cx="1556901" cy="369332"/>
-          </a:xfrm>
-          <a:prstGeom prst="rect">
-            <a:avLst/>
-          </a:prstGeom>
-          <a:noFill/>
-          <a:ln>
-            <a:noFill/>
-          </a:ln>
-          <a:effectLst/>
-          <a:scene3d>
-            <a:camera prst="orthographicFront">
-              <a:rot lat="0" lon="0" rev="0"/>
-            </a:camera>
-            <a:lightRig rig="chilly" dir="t">
-              <a:rot lat="0" lon="0" rev="18480000"/>
-            </a:lightRig>
-          </a:scene3d>
-          <a:sp3d prstMaterial="clear">
-            <a:bevelT h="63500"/>
-          </a:sp3d>
-        </p:spPr>
-        <p:txBody>
-          <a:bodyPr wrap="none" rtlCol="0">
-            <a:spAutoFit/>
-          </a:bodyPr>
-          <a:lstStyle/>
-          <a:p>
-            <a:r>
-              <a:rPr lang="fr-FR" dirty="0" smtClean="0"/>
-              <a:t>Volet </a:t>
-            </a:r>
-            <a:r>
-              <a:rPr lang="fr-FR" dirty="0" smtClean="0"/>
-              <a:t>Roulant</a:t>
-            </a:r>
-            <a:endParaRPr lang="fr-FR" dirty="0"/>
-          </a:p>
-        </p:txBody>
-      </p:sp>
-      <p:pic>
-        <p:nvPicPr>
-          <p:cNvPr id="1027" name="Picture 3"/>
-          <p:cNvPicPr>
-            <a:picLocks noChangeAspect="1" noChangeArrowheads="1"/>
-          </p:cNvPicPr>
-          <p:nvPr/>
-        </p:nvPicPr>
-        <p:blipFill>
-          <a:blip r:embed="rId3"/>
-          <a:srcRect/>
-          <a:stretch>
-            <a:fillRect/>
-          </a:stretch>
-        </p:blipFill>
-        <p:spPr bwMode="auto">
-          <a:xfrm>
-            <a:off x="3214678" y="2643187"/>
-            <a:ext cx="2214578" cy="2981163"/>
-          </a:xfrm>
-          <a:prstGeom prst="rect">
-            <a:avLst/>
-          </a:prstGeom>
-          <a:ln w="28575" cap="sq">
-            <a:solidFill>
-              <a:schemeClr val="tx2">
-                <a:lumMod val="90000"/>
-              </a:schemeClr>
-            </a:solidFill>
-            <a:prstDash val="solid"/>
-            <a:miter lim="800000"/>
-          </a:ln>
-          <a:effectLst>
-            <a:outerShdw blurRad="50800" dist="38100" dir="2700000" algn="tl" rotWithShape="0">
-              <a:srgbClr val="000000">
-                <a:alpha val="43000"/>
-              </a:srgbClr>
-            </a:outerShdw>
-          </a:effectLst>
-        </p:spPr>
-      </p:pic>
       <p:pic>
         <p:nvPicPr>
           <p:cNvPr id="1028" name="Picture 4"/>
@@ -6275,7 +6064,7 @@
           <p:nvPr/>
         </p:nvPicPr>
         <p:blipFill>
-          <a:blip r:embed="rId4" cstate="print"/>
+          <a:blip r:embed="rId3" cstate="print"/>
           <a:srcRect/>
           <a:stretch>
             <a:fillRect/>
@@ -6283,7 +6072,7 @@
         </p:blipFill>
         <p:spPr bwMode="auto">
           <a:xfrm>
-            <a:off x="357158" y="2143121"/>
+            <a:off x="1071538" y="2500310"/>
             <a:ext cx="2357454" cy="1828419"/>
           </a:xfrm>
           <a:prstGeom prst="rect">
@@ -6372,20 +6161,7 @@
                   <a:srgbClr val="0070C0"/>
                 </a:solidFill>
               </a:rPr>
-              <a:t>Tests </a:t>
-            </a:r>
-            <a:r>
-              <a:rPr lang="fr-FR" dirty="0" smtClean="0">
-                <a:ln w="3175">
-                  <a:solidFill>
-                    <a:schemeClr val="tx1"/>
-                  </a:solidFill>
-                </a:ln>
-                <a:solidFill>
-                  <a:srgbClr val="0070C0"/>
-                </a:solidFill>
-              </a:rPr>
-              <a:t>d’intégration</a:t>
+              <a:t>Tests d’intégration</a:t>
             </a:r>
             <a:endParaRPr lang="fr-FR" dirty="0">
               <a:ln w="3175">
@@ -6447,19 +6223,7 @@
                   </a:outerShdw>
                 </a:effectLst>
               </a:rPr>
-              <a:t>Volet Roulant, Capteur de luminosité, </a:t>
-            </a:r>
-            <a:r>
-              <a:rPr lang="fr-FR" dirty="0" smtClean="0">
-                <a:effectLst>
-                  <a:outerShdw blurRad="38100" dist="38100" dir="2700000" algn="tl">
-                    <a:srgbClr val="000000">
-                      <a:alpha val="43137"/>
-                    </a:srgbClr>
-                  </a:outerShdw>
-                </a:effectLst>
-              </a:rPr>
-              <a:t>Lumière</a:t>
+              <a:t>Volet Roulant, Capteur de luminosité, Lumière</a:t>
             </a:r>
             <a:endParaRPr lang="fr-FR" dirty="0">
               <a:effectLst>
@@ -6473,39 +6237,6 @@
           </a:p>
         </p:txBody>
       </p:sp>
-      <p:pic>
-        <p:nvPicPr>
-          <p:cNvPr id="2" name="Picture 2" descr="Q:\Projet_Domotique_GITBTS\Materiels\Benjamin\progConfort\schema.png"/>
-          <p:cNvPicPr>
-            <a:picLocks noChangeAspect="1" noChangeArrowheads="1"/>
-          </p:cNvPicPr>
-          <p:nvPr/>
-        </p:nvPicPr>
-        <p:blipFill>
-          <a:blip r:embed="rId2"/>
-          <a:srcRect/>
-          <a:stretch>
-            <a:fillRect/>
-          </a:stretch>
-        </p:blipFill>
-        <p:spPr bwMode="auto">
-          <a:xfrm>
-            <a:off x="1500166" y="1714492"/>
-            <a:ext cx="5572164" cy="3946124"/>
-          </a:xfrm>
-          <a:prstGeom prst="rect">
-            <a:avLst/>
-          </a:prstGeom>
-          <a:noFill/>
-          <a:ln w="28575">
-            <a:solidFill>
-              <a:schemeClr val="tx2">
-                <a:lumMod val="90000"/>
-              </a:schemeClr>
-            </a:solidFill>
-          </a:ln>
-        </p:spPr>
-      </p:pic>
     </p:spTree>
   </p:cSld>
   <p:clrMapOvr>
@@ -6717,11 +6448,7 @@
             </a:r>
             <a:r>
               <a:rPr lang="fr-FR" sz="2000" dirty="0" smtClean="0"/>
-              <a:t>Aspect </a:t>
-            </a:r>
-            <a:r>
-              <a:rPr lang="fr-FR" sz="2000" dirty="0" smtClean="0"/>
-              <a:t>gestion</a:t>
+              <a:t>Aspect gestion</a:t>
             </a:r>
             <a:endParaRPr lang="fr-FR" sz="2000" dirty="0"/>
           </a:p>
@@ -6851,7 +6578,7 @@
 </file>
 
 <file path=ppt/slides/slide3.xml><?xml version="1.0" encoding="utf-8"?>
-<p:sld xmlns:a="http://schemas.openxmlformats.org/drawingml/2006/main" xmlns:r="http://schemas.openxmlformats.org/officeDocument/2006/relationships" xmlns:p="http://schemas.openxmlformats.org/presentationml/2006/main">
+<p:sld xmlns:a="http://schemas.openxmlformats.org/drawingml/2006/main" xmlns:r="http://schemas.openxmlformats.org/officeDocument/2006/relationships" xmlns:p="http://schemas.openxmlformats.org/presentationml/2006/main" show="0">
   <p:cSld>
     <p:spTree>
       <p:nvGrpSpPr>
@@ -6908,28 +6635,7 @@
                   </a:outerShdw>
                 </a:effectLst>
               </a:rPr>
-              <a:t>A</a:t>
-            </a:r>
-            <a:r>
-              <a:rPr lang="fr-FR" sz="4800" dirty="0" smtClean="0">
-                <a:ln w="3175" cmpd="sng">
-                  <a:solidFill>
-                    <a:srgbClr val="FFFFFF"/>
-                  </a:solidFill>
-                  <a:prstDash val="solid"/>
-                </a:ln>
-                <a:solidFill>
-                  <a:srgbClr val="0070C0"/>
-                </a:solidFill>
-                <a:effectLst>
-                  <a:outerShdw blurRad="63500" dir="3600000" algn="tl" rotWithShape="0">
-                    <a:srgbClr val="000000">
-                      <a:alpha val="70000"/>
-                    </a:srgbClr>
-                  </a:outerShdw>
-                </a:effectLst>
-              </a:rPr>
-              <a:t>rchitecture matérielle </a:t>
+              <a:t>Architecture matérielle </a:t>
             </a:r>
             <a:endParaRPr lang="fr-FR" dirty="0">
               <a:ln w="18415" cmpd="sng">
@@ -6997,6 +6703,7 @@
   <p:clrMapOvr>
     <a:masterClrMapping/>
   </p:clrMapOvr>
+  <p:transition/>
   <p:timing>
     <p:tnLst>
       <p:par>
@@ -7008,7 +6715,7 @@
 </file>
 
 <file path=ppt/slides/slide4.xml><?xml version="1.0" encoding="utf-8"?>
-<p:sld xmlns:a="http://schemas.openxmlformats.org/drawingml/2006/main" xmlns:r="http://schemas.openxmlformats.org/officeDocument/2006/relationships" xmlns:p="http://schemas.openxmlformats.org/presentationml/2006/main">
+<p:sld xmlns:a="http://schemas.openxmlformats.org/drawingml/2006/main" xmlns:r="http://schemas.openxmlformats.org/officeDocument/2006/relationships" xmlns:p="http://schemas.openxmlformats.org/presentationml/2006/main" show="0">
   <p:cSld>
     <p:spTree>
       <p:nvGrpSpPr>
@@ -7930,6 +7637,7 @@
   <p:clrMapOvr>
     <a:masterClrMapping/>
   </p:clrMapOvr>
+  <p:transition/>
   <p:timing>
     <p:tnLst>
       <p:par>
@@ -9128,7 +8836,7 @@
 </file>
 
 <file path=ppt/slides/slide5.xml><?xml version="1.0" encoding="utf-8"?>
-<p:sld xmlns:a="http://schemas.openxmlformats.org/drawingml/2006/main" xmlns:r="http://schemas.openxmlformats.org/officeDocument/2006/relationships" xmlns:p="http://schemas.openxmlformats.org/presentationml/2006/main">
+<p:sld xmlns:a="http://schemas.openxmlformats.org/drawingml/2006/main" xmlns:r="http://schemas.openxmlformats.org/officeDocument/2006/relationships" xmlns:p="http://schemas.openxmlformats.org/presentationml/2006/main" show="0">
   <p:cSld>
     <p:spTree>
       <p:nvGrpSpPr>
@@ -9511,6 +9219,7 @@
   <p:clrMapOvr>
     <a:masterClrMapping/>
   </p:clrMapOvr>
+  <p:transition/>
   <p:timing>
     <p:tnLst>
       <p:par>
@@ -10203,7 +9912,7 @@
 </file>
 
 <file path=ppt/slides/slide9.xml><?xml version="1.0" encoding="utf-8"?>
-<p:sld xmlns:a="http://schemas.openxmlformats.org/drawingml/2006/main" xmlns:r="http://schemas.openxmlformats.org/officeDocument/2006/relationships" xmlns:p="http://schemas.openxmlformats.org/presentationml/2006/main">
+<p:sld xmlns:a="http://schemas.openxmlformats.org/drawingml/2006/main" xmlns:r="http://schemas.openxmlformats.org/officeDocument/2006/relationships" xmlns:p="http://schemas.openxmlformats.org/presentationml/2006/main" show="0">
   <p:cSld>
     <p:spTree>
       <p:nvGrpSpPr>
@@ -10356,6 +10065,7 @@
   <p:clrMapOvr>
     <a:masterClrMapping/>
   </p:clrMapOvr>
+  <p:transition/>
   <p:timing>
     <p:tnLst>
       <p:par>

</xml_diff>